<commit_message>
Added presentation structure and several graphics.
</commit_message>
<xml_diff>
--- a/docs/proposal presentation/Proposal presentation.pptx
+++ b/docs/proposal presentation/Proposal presentation.pptx
@@ -6,14 +6,23 @@
     <p:sldMasterId id="2147483657" r:id="rId2"/>
   </p:sldMasterIdLst>
   <p:notesMasterIdLst>
-    <p:notesMasterId r:id="rId5"/>
+    <p:notesMasterId r:id="rId14"/>
   </p:notesMasterIdLst>
   <p:handoutMasterIdLst>
-    <p:handoutMasterId r:id="rId6"/>
+    <p:handoutMasterId r:id="rId15"/>
   </p:handoutMasterIdLst>
   <p:sldIdLst>
     <p:sldId id="344" r:id="rId3"/>
-    <p:sldId id="345" r:id="rId4"/>
+    <p:sldId id="348" r:id="rId4"/>
+    <p:sldId id="347" r:id="rId5"/>
+    <p:sldId id="345" r:id="rId6"/>
+    <p:sldId id="349" r:id="rId7"/>
+    <p:sldId id="350" r:id="rId8"/>
+    <p:sldId id="354" r:id="rId9"/>
+    <p:sldId id="351" r:id="rId10"/>
+    <p:sldId id="352" r:id="rId11"/>
+    <p:sldId id="353" r:id="rId12"/>
+    <p:sldId id="355" r:id="rId13"/>
   </p:sldIdLst>
   <p:sldSz cx="13004800" cy="9753600"/>
   <p:notesSz cx="6794500" cy="9931400"/>
@@ -263,7 +272,7 @@
               <a:pPr>
                 <a:defRPr/>
               </a:pPr>
-              <a:t>9/29/13</a:t>
+              <a:t>9/30/13</a:t>
             </a:fld>
             <a:endParaRPr lang="nl-NL"/>
           </a:p>
@@ -483,7 +492,7 @@
               <a:pPr>
                 <a:defRPr/>
               </a:pPr>
-              <a:t>9/29/13</a:t>
+              <a:t>9/30/13</a:t>
             </a:fld>
             <a:endParaRPr lang="nl-NL"/>
           </a:p>
@@ -986,13 +995,10 @@
           <a:bodyPr/>
           <a:lstStyle/>
           <a:p>
-            <a:r>
-              <a:rPr lang="nl-NL" smtClean="0">
-                <a:ea typeface="ＭＳ Ｐゴシック"/>
-                <a:cs typeface="ＭＳ Ｐゴシック"/>
-              </a:rPr>
-              <a:t>Meso &lt;-&gt; macro</a:t>
-            </a:r>
+            <a:endParaRPr lang="nl-NL" dirty="0" err="1" smtClean="0">
+              <a:ea typeface="ＭＳ Ｐゴシック"/>
+              <a:cs typeface="ＭＳ Ｐゴシック"/>
+            </a:endParaRPr>
           </a:p>
         </p:txBody>
       </p:sp>
@@ -1026,7 +1032,7 @@
                 <a:sym typeface="American Typewriter"/>
               </a:rPr>
               <a:pPr/>
-              <a:t>2</a:t>
+              <a:t>4</a:t>
             </a:fld>
             <a:endParaRPr lang="nl-NL" smtClean="0">
               <a:latin typeface="American Typewriter"/>
@@ -5450,6 +5456,18 @@
 <file path=ppt/slides/slide1.xml><?xml version="1.0" encoding="utf-8"?>
 <p:sld xmlns:a="http://schemas.openxmlformats.org/drawingml/2006/main" xmlns:r="http://schemas.openxmlformats.org/officeDocument/2006/relationships" xmlns:p="http://schemas.openxmlformats.org/presentationml/2006/main">
   <p:cSld>
+    <p:bg>
+      <p:bgPr>
+        <a:blipFill dpi="0" rotWithShape="0">
+          <a:blip r:embed="rId3"/>
+          <a:srcRect/>
+          <a:stretch>
+            <a:fillRect/>
+          </a:stretch>
+        </a:blipFill>
+        <a:effectLst/>
+      </p:bgPr>
+    </p:bg>
     <p:spTree>
       <p:nvGrpSpPr>
         <p:cNvPr id="1" name=""/>
@@ -5487,11 +5505,6 @@
               </a:rPr>
               <a:t>Causal Discovery for Effective Connectivity in Human Brains</a:t>
             </a:r>
-            <a:endParaRPr lang="en-US" sz="4400" dirty="0" smtClean="0">
-              <a:latin typeface="Arial" pitchFamily="34" charset="0"/>
-              <a:ea typeface="ＭＳ Ｐゴシック"/>
-              <a:cs typeface="Arial" pitchFamily="34" charset="0"/>
-            </a:endParaRPr>
           </a:p>
         </p:txBody>
       </p:sp>
@@ -5555,16 +5568,6 @@
               </a:rPr>
               <a:t> 2013</a:t>
             </a:r>
-            <a:endParaRPr lang="en-US" sz="2400" i="1" dirty="0" smtClean="0">
-              <a:solidFill>
-                <a:schemeClr val="tx1">
-                  <a:lumMod val="95000"/>
-                </a:schemeClr>
-              </a:solidFill>
-              <a:latin typeface="Arial" pitchFamily="34" charset="0"/>
-              <a:ea typeface="ＭＳ Ｐゴシック"/>
-              <a:cs typeface="Arial" pitchFamily="34" charset="0"/>
-            </a:endParaRPr>
           </a:p>
           <a:p>
             <a:endParaRPr lang="en-US" sz="2400" dirty="0" smtClean="0">
@@ -5689,6 +5692,157 @@
       </p:par>
     </p:tnLst>
   </p:timing>
+</p:sld>
+</file>
+
+<file path=ppt/slides/slide10.xml><?xml version="1.0" encoding="utf-8"?>
+<p:sld xmlns:a="http://schemas.openxmlformats.org/drawingml/2006/main" xmlns:r="http://schemas.openxmlformats.org/officeDocument/2006/relationships" xmlns:p="http://schemas.openxmlformats.org/presentationml/2006/main">
+  <p:cSld>
+    <p:spTree>
+      <p:nvGrpSpPr>
+        <p:cNvPr id="1" name=""/>
+        <p:cNvGrpSpPr/>
+        <p:nvPr/>
+      </p:nvGrpSpPr>
+      <p:grpSpPr>
+        <a:xfrm>
+          <a:off x="0" y="0"/>
+          <a:ext cx="0" cy="0"/>
+          <a:chOff x="0" y="0"/>
+          <a:chExt cx="0" cy="0"/>
+        </a:xfrm>
+      </p:grpSpPr>
+      <p:sp>
+        <p:nvSpPr>
+          <p:cNvPr id="2" name="Title 1"/>
+          <p:cNvSpPr>
+            <a:spLocks noGrp="1"/>
+          </p:cNvSpPr>
+          <p:nvPr>
+            <p:ph type="title"/>
+          </p:nvPr>
+        </p:nvSpPr>
+        <p:spPr/>
+        <p:txBody>
+          <a:bodyPr/>
+          <a:lstStyle/>
+          <a:p>
+            <a:r>
+              <a:rPr lang="en-US" dirty="0" smtClean="0"/>
+              <a:t>Strategy &amp; Timeline</a:t>
+            </a:r>
+            <a:endParaRPr lang="en-US" dirty="0"/>
+          </a:p>
+        </p:txBody>
+      </p:sp>
+      <p:sp>
+        <p:nvSpPr>
+          <p:cNvPr id="3" name="Content Placeholder 2"/>
+          <p:cNvSpPr>
+            <a:spLocks noGrp="1"/>
+          </p:cNvSpPr>
+          <p:nvPr>
+            <p:ph idx="1"/>
+          </p:nvPr>
+        </p:nvSpPr>
+        <p:spPr/>
+        <p:txBody>
+          <a:bodyPr/>
+          <a:lstStyle/>
+          <a:p>
+            <a:r>
+              <a:rPr lang="en-US" dirty="0" smtClean="0"/>
+              <a:t>Add timeline figure here</a:t>
+            </a:r>
+            <a:endParaRPr lang="en-US" dirty="0"/>
+          </a:p>
+        </p:txBody>
+      </p:sp>
+    </p:spTree>
+    <p:extLst>
+      <p:ext uri="{BB962C8B-B14F-4D97-AF65-F5344CB8AC3E}">
+        <p14:creationId xmlns:p14="http://schemas.microsoft.com/office/powerpoint/2010/main" val="362402730"/>
+      </p:ext>
+    </p:extLst>
+  </p:cSld>
+  <p:clrMapOvr>
+    <a:masterClrMapping/>
+  </p:clrMapOvr>
+  <p:transition xmlns:p14="http://schemas.microsoft.com/office/powerpoint/2010/main"/>
+</p:sld>
+</file>
+
+<file path=ppt/slides/slide11.xml><?xml version="1.0" encoding="utf-8"?>
+<p:sld xmlns:a="http://schemas.openxmlformats.org/drawingml/2006/main" xmlns:r="http://schemas.openxmlformats.org/officeDocument/2006/relationships" xmlns:p="http://schemas.openxmlformats.org/presentationml/2006/main">
+  <p:cSld>
+    <p:bg>
+      <p:bgPr>
+        <a:blipFill dpi="0" rotWithShape="0">
+          <a:blip r:embed="rId2">
+            <a:alphaModFix amt="0"/>
+          </a:blip>
+          <a:srcRect/>
+          <a:stretch>
+            <a:fillRect/>
+          </a:stretch>
+        </a:blipFill>
+        <a:effectLst/>
+      </p:bgPr>
+    </p:bg>
+    <p:spTree>
+      <p:nvGrpSpPr>
+        <p:cNvPr id="1" name=""/>
+        <p:cNvGrpSpPr/>
+        <p:nvPr/>
+      </p:nvGrpSpPr>
+      <p:grpSpPr>
+        <a:xfrm>
+          <a:off x="0" y="0"/>
+          <a:ext cx="0" cy="0"/>
+          <a:chOff x="0" y="0"/>
+          <a:chExt cx="0" cy="0"/>
+        </a:xfrm>
+      </p:grpSpPr>
+      <p:sp>
+        <p:nvSpPr>
+          <p:cNvPr id="2" name="Title 1"/>
+          <p:cNvSpPr>
+            <a:spLocks noGrp="1"/>
+          </p:cNvSpPr>
+          <p:nvPr>
+            <p:ph type="title"/>
+          </p:nvPr>
+        </p:nvSpPr>
+        <p:spPr>
+          <a:xfrm>
+            <a:off x="900113" y="990600"/>
+            <a:ext cx="11049000" cy="7126560"/>
+          </a:xfrm>
+        </p:spPr>
+        <p:txBody>
+          <a:bodyPr anchor="ctr"/>
+          <a:lstStyle/>
+          <a:p>
+            <a:pPr algn="ctr"/>
+            <a:r>
+              <a:rPr lang="en-US" dirty="0" smtClean="0"/>
+              <a:t>Thank you for your attention</a:t>
+            </a:r>
+            <a:endParaRPr lang="en-US" dirty="0"/>
+          </a:p>
+        </p:txBody>
+      </p:sp>
+    </p:spTree>
+    <p:extLst>
+      <p:ext uri="{BB962C8B-B14F-4D97-AF65-F5344CB8AC3E}">
+        <p14:creationId xmlns:p14="http://schemas.microsoft.com/office/powerpoint/2010/main" val="3900623210"/>
+      </p:ext>
+    </p:extLst>
+  </p:cSld>
+  <p:clrMapOvr>
+    <a:masterClrMapping/>
+  </p:clrMapOvr>
+  <p:transition xmlns:p14="http://schemas.microsoft.com/office/powerpoint/2010/main"/>
 </p:sld>
 </file>
 
@@ -5711,6 +5865,365 @@
       </p:grpSpPr>
       <p:sp>
         <p:nvSpPr>
+          <p:cNvPr id="2" name="Title 1"/>
+          <p:cNvSpPr>
+            <a:spLocks noGrp="1"/>
+          </p:cNvSpPr>
+          <p:nvPr>
+            <p:ph type="title"/>
+          </p:nvPr>
+        </p:nvSpPr>
+        <p:spPr/>
+        <p:txBody>
+          <a:bodyPr/>
+          <a:lstStyle/>
+          <a:p>
+            <a:r>
+              <a:rPr lang="en-US" dirty="0" smtClean="0"/>
+              <a:t>Phrenology</a:t>
+            </a:r>
+            <a:endParaRPr lang="en-US" dirty="0"/>
+          </a:p>
+        </p:txBody>
+      </p:sp>
+      <p:sp>
+        <p:nvSpPr>
+          <p:cNvPr id="3" name="Content Placeholder 2"/>
+          <p:cNvSpPr>
+            <a:spLocks noGrp="1"/>
+          </p:cNvSpPr>
+          <p:nvPr>
+            <p:ph idx="1"/>
+          </p:nvPr>
+        </p:nvSpPr>
+        <p:spPr>
+          <a:xfrm>
+            <a:off x="900113" y="2070100"/>
+            <a:ext cx="6034335" cy="6007100"/>
+          </a:xfrm>
+        </p:spPr>
+        <p:txBody>
+          <a:bodyPr/>
+          <a:lstStyle/>
+          <a:p>
+            <a:r>
+              <a:rPr lang="en-US" dirty="0" smtClean="0"/>
+              <a:t>Finding cognitive ability and personality  by measuring skull and brain</a:t>
+            </a:r>
+          </a:p>
+          <a:p>
+            <a:endParaRPr lang="en-US" dirty="0"/>
+          </a:p>
+          <a:p>
+            <a:r>
+              <a:rPr lang="en-US" dirty="0" smtClean="0"/>
+              <a:t>As late as 1848</a:t>
+            </a:r>
+          </a:p>
+        </p:txBody>
+      </p:sp>
+      <p:pic>
+        <p:nvPicPr>
+          <p:cNvPr id="4" name="Picture 3" descr="phrenology-journal-1848.jpg"/>
+          <p:cNvPicPr>
+            <a:picLocks noChangeAspect="1"/>
+          </p:cNvPicPr>
+          <p:nvPr/>
+        </p:nvPicPr>
+        <p:blipFill>
+          <a:blip r:embed="rId2">
+            <a:extLst>
+              <a:ext uri="{28A0092B-C50C-407E-A947-70E740481C1C}">
+                <a14:useLocalDpi xmlns:a14="http://schemas.microsoft.com/office/drawing/2010/main" val="0"/>
+              </a:ext>
+            </a:extLst>
+          </a:blip>
+          <a:stretch>
+            <a:fillRect/>
+          </a:stretch>
+        </p:blipFill>
+        <p:spPr>
+          <a:xfrm>
+            <a:off x="7078464" y="916360"/>
+            <a:ext cx="5184576" cy="7376630"/>
+          </a:xfrm>
+          <a:prstGeom prst="rect">
+            <a:avLst/>
+          </a:prstGeom>
+        </p:spPr>
+      </p:pic>
+    </p:spTree>
+    <p:extLst>
+      <p:ext uri="{BB962C8B-B14F-4D97-AF65-F5344CB8AC3E}">
+        <p14:creationId xmlns:p14="http://schemas.microsoft.com/office/powerpoint/2010/main" val="3860986555"/>
+      </p:ext>
+    </p:extLst>
+  </p:cSld>
+  <p:clrMapOvr>
+    <a:masterClrMapping/>
+  </p:clrMapOvr>
+  <p:transition xmlns:p14="http://schemas.microsoft.com/office/powerpoint/2010/main"/>
+  <p:timing>
+    <p:tnLst>
+      <p:par>
+        <p:cTn xmlns:p14="http://schemas.microsoft.com/office/powerpoint/2010/main" id="1" dur="indefinite" restart="never" nodeType="tmRoot"/>
+      </p:par>
+    </p:tnLst>
+  </p:timing>
+</p:sld>
+</file>
+
+<file path=ppt/slides/slide3.xml><?xml version="1.0" encoding="utf-8"?>
+<p:sld xmlns:a="http://schemas.openxmlformats.org/drawingml/2006/main" xmlns:r="http://schemas.openxmlformats.org/officeDocument/2006/relationships" xmlns:p="http://schemas.openxmlformats.org/presentationml/2006/main">
+  <p:cSld>
+    <p:spTree>
+      <p:nvGrpSpPr>
+        <p:cNvPr id="1" name=""/>
+        <p:cNvGrpSpPr/>
+        <p:nvPr/>
+      </p:nvGrpSpPr>
+      <p:grpSpPr>
+        <a:xfrm>
+          <a:off x="0" y="0"/>
+          <a:ext cx="0" cy="0"/>
+          <a:chOff x="0" y="0"/>
+          <a:chExt cx="0" cy="0"/>
+        </a:xfrm>
+      </p:grpSpPr>
+      <p:sp>
+        <p:nvSpPr>
+          <p:cNvPr id="2" name="Title 1"/>
+          <p:cNvSpPr>
+            <a:spLocks noGrp="1"/>
+          </p:cNvSpPr>
+          <p:nvPr>
+            <p:ph type="title"/>
+          </p:nvPr>
+        </p:nvSpPr>
+        <p:spPr/>
+        <p:txBody>
+          <a:bodyPr/>
+          <a:lstStyle/>
+          <a:p>
+            <a:r>
+              <a:rPr lang="en-US" dirty="0" smtClean="0"/>
+              <a:t>Modern brain science</a:t>
+            </a:r>
+            <a:endParaRPr lang="en-US" dirty="0"/>
+          </a:p>
+        </p:txBody>
+      </p:sp>
+      <p:sp>
+        <p:nvSpPr>
+          <p:cNvPr id="3" name="Content Placeholder 2"/>
+          <p:cNvSpPr>
+            <a:spLocks noGrp="1"/>
+          </p:cNvSpPr>
+          <p:nvPr>
+            <p:ph idx="1"/>
+          </p:nvPr>
+        </p:nvSpPr>
+        <p:spPr>
+          <a:xfrm>
+            <a:off x="813768" y="2068488"/>
+            <a:ext cx="11049000" cy="6007100"/>
+          </a:xfrm>
+        </p:spPr>
+        <p:txBody>
+          <a:bodyPr/>
+          <a:lstStyle/>
+          <a:p>
+            <a:r>
+              <a:rPr lang="en-US" dirty="0" smtClean="0"/>
+              <a:t>Advanced imaging techniques</a:t>
+            </a:r>
+            <a:endParaRPr lang="en-US" dirty="0"/>
+          </a:p>
+        </p:txBody>
+      </p:sp>
+      <p:pic>
+        <p:nvPicPr>
+          <p:cNvPr id="4" name="Picture 3" descr="dti.png"/>
+          <p:cNvPicPr>
+            <a:picLocks noChangeAspect="1"/>
+          </p:cNvPicPr>
+          <p:nvPr/>
+        </p:nvPicPr>
+        <p:blipFill rotWithShape="1">
+          <a:blip r:embed="rId2">
+            <a:extLst>
+              <a:ext uri="{28A0092B-C50C-407E-A947-70E740481C1C}">
+                <a14:useLocalDpi xmlns:a14="http://schemas.microsoft.com/office/drawing/2010/main" val="0"/>
+              </a:ext>
+            </a:extLst>
+          </a:blip>
+          <a:srcRect t="-7237" b="7237"/>
+          <a:stretch/>
+        </p:blipFill>
+        <p:spPr>
+          <a:xfrm>
+            <a:off x="7222480" y="2862000"/>
+            <a:ext cx="5280587" cy="3960440"/>
+          </a:xfrm>
+          <a:prstGeom prst="rect">
+            <a:avLst/>
+          </a:prstGeom>
+        </p:spPr>
+      </p:pic>
+      <p:pic>
+        <p:nvPicPr>
+          <p:cNvPr id="5" name="Picture 4" descr="fmri-brains.jpg"/>
+          <p:cNvPicPr>
+            <a:picLocks noChangeAspect="1"/>
+          </p:cNvPicPr>
+          <p:nvPr/>
+        </p:nvPicPr>
+        <p:blipFill>
+          <a:blip r:embed="rId3">
+            <a:extLst>
+              <a:ext uri="{28A0092B-C50C-407E-A947-70E740481C1C}">
+                <a14:useLocalDpi xmlns:a14="http://schemas.microsoft.com/office/drawing/2010/main" val="0"/>
+              </a:ext>
+            </a:extLst>
+          </a:blip>
+          <a:stretch>
+            <a:fillRect/>
+          </a:stretch>
+        </p:blipFill>
+        <p:spPr>
+          <a:xfrm>
+            <a:off x="1101800" y="3148607"/>
+            <a:ext cx="5328592" cy="3641781"/>
+          </a:xfrm>
+          <a:prstGeom prst="rect">
+            <a:avLst/>
+          </a:prstGeom>
+        </p:spPr>
+      </p:pic>
+      <p:sp>
+        <p:nvSpPr>
+          <p:cNvPr id="7" name="TextBox 6"/>
+          <p:cNvSpPr txBox="1"/>
+          <p:nvPr/>
+        </p:nvSpPr>
+        <p:spPr>
+          <a:xfrm>
+            <a:off x="3118024" y="7109048"/>
+            <a:ext cx="1267444" cy="707886"/>
+          </a:xfrm>
+          <a:prstGeom prst="rect">
+            <a:avLst/>
+          </a:prstGeom>
+          <a:noFill/>
+        </p:spPr>
+        <p:txBody>
+          <a:bodyPr wrap="none" rtlCol="0">
+            <a:spAutoFit/>
+          </a:bodyPr>
+          <a:lstStyle/>
+          <a:p>
+            <a:r>
+              <a:rPr lang="en-US" dirty="0" smtClean="0">
+                <a:solidFill>
+                  <a:schemeClr val="bg1"/>
+                </a:solidFill>
+                <a:latin typeface="Arial"/>
+                <a:cs typeface="Arial"/>
+              </a:rPr>
+              <a:t>fMRI</a:t>
+            </a:r>
+            <a:endParaRPr lang="en-US" dirty="0">
+              <a:solidFill>
+                <a:schemeClr val="bg1"/>
+              </a:solidFill>
+              <a:latin typeface="Arial"/>
+              <a:cs typeface="Arial"/>
+            </a:endParaRPr>
+          </a:p>
+        </p:txBody>
+      </p:sp>
+      <p:sp>
+        <p:nvSpPr>
+          <p:cNvPr id="8" name="TextBox 7"/>
+          <p:cNvSpPr txBox="1"/>
+          <p:nvPr/>
+        </p:nvSpPr>
+        <p:spPr>
+          <a:xfrm>
+            <a:off x="9238704" y="7109048"/>
+            <a:ext cx="1010964" cy="707886"/>
+          </a:xfrm>
+          <a:prstGeom prst="rect">
+            <a:avLst/>
+          </a:prstGeom>
+          <a:noFill/>
+        </p:spPr>
+        <p:txBody>
+          <a:bodyPr wrap="none" rtlCol="0">
+            <a:spAutoFit/>
+          </a:bodyPr>
+          <a:lstStyle/>
+          <a:p>
+            <a:r>
+              <a:rPr lang="en-US" dirty="0" smtClean="0">
+                <a:solidFill>
+                  <a:schemeClr val="bg1"/>
+                </a:solidFill>
+                <a:latin typeface="Arial"/>
+                <a:cs typeface="Arial"/>
+              </a:rPr>
+              <a:t>DTI</a:t>
+            </a:r>
+            <a:endParaRPr lang="en-US" dirty="0">
+              <a:solidFill>
+                <a:schemeClr val="bg1"/>
+              </a:solidFill>
+              <a:latin typeface="Arial"/>
+              <a:cs typeface="Arial"/>
+            </a:endParaRPr>
+          </a:p>
+        </p:txBody>
+      </p:sp>
+    </p:spTree>
+    <p:extLst>
+      <p:ext uri="{BB962C8B-B14F-4D97-AF65-F5344CB8AC3E}">
+        <p14:creationId xmlns:p14="http://schemas.microsoft.com/office/powerpoint/2010/main" val="2546543918"/>
+      </p:ext>
+    </p:extLst>
+  </p:cSld>
+  <p:clrMapOvr>
+    <a:masterClrMapping/>
+  </p:clrMapOvr>
+  <p:transition xmlns:p14="http://schemas.microsoft.com/office/powerpoint/2010/main"/>
+  <p:timing>
+    <p:tnLst>
+      <p:par>
+        <p:cTn xmlns:p14="http://schemas.microsoft.com/office/powerpoint/2010/main" id="1" dur="indefinite" restart="never" nodeType="tmRoot"/>
+      </p:par>
+    </p:tnLst>
+  </p:timing>
+</p:sld>
+</file>
+
+<file path=ppt/slides/slide4.xml><?xml version="1.0" encoding="utf-8"?>
+<p:sld xmlns:a="http://schemas.openxmlformats.org/drawingml/2006/main" xmlns:r="http://schemas.openxmlformats.org/officeDocument/2006/relationships" xmlns:p="http://schemas.openxmlformats.org/presentationml/2006/main">
+  <p:cSld>
+    <p:spTree>
+      <p:nvGrpSpPr>
+        <p:cNvPr id="1" name=""/>
+        <p:cNvGrpSpPr/>
+        <p:nvPr/>
+      </p:nvGrpSpPr>
+      <p:grpSpPr>
+        <a:xfrm>
+          <a:off x="0" y="0"/>
+          <a:ext cx="0" cy="0"/>
+          <a:chOff x="0" y="0"/>
+          <a:chExt cx="0" cy="0"/>
+        </a:xfrm>
+      </p:grpSpPr>
+      <p:sp>
+        <p:nvSpPr>
           <p:cNvPr id="21505" name="Titel 3"/>
           <p:cNvSpPr>
             <a:spLocks noGrp="1"/>
@@ -5724,40 +6237,45 @@
           <a:bodyPr/>
           <a:lstStyle/>
           <a:p>
-            <a:endParaRPr lang="nl-NL" dirty="0" smtClean="0">
-              <a:latin typeface="Arial" pitchFamily="34" charset="0"/>
-              <a:ea typeface="ＭＳ Ｐゴシック"/>
-              <a:cs typeface="Arial" pitchFamily="34" charset="0"/>
-            </a:endParaRPr>
-          </a:p>
-        </p:txBody>
-      </p:sp>
-      <p:sp>
-        <p:nvSpPr>
-          <p:cNvPr id="5" name="Tijdelijke aanduiding voor inhoud 4"/>
-          <p:cNvSpPr>
-            <a:spLocks noGrp="1"/>
-          </p:cNvSpPr>
+            <a:r>
+              <a:rPr lang="nl-NL" dirty="0" smtClean="0">
+                <a:latin typeface="Arial" pitchFamily="34" charset="0"/>
+                <a:ea typeface="ＭＳ Ｐゴシック"/>
+                <a:cs typeface="Arial" pitchFamily="34" charset="0"/>
+              </a:rPr>
+              <a:t>Brain Connectivity</a:t>
+            </a:r>
+          </a:p>
+        </p:txBody>
+      </p:sp>
+      <p:pic>
+        <p:nvPicPr>
+          <p:cNvPr id="8" name="Content Placeholder 7" descr="brain-connectivity.jpg"/>
+          <p:cNvPicPr>
+            <a:picLocks noGrp="1" noChangeAspect="1"/>
+          </p:cNvPicPr>
           <p:nvPr>
             <p:ph idx="1"/>
           </p:nvPr>
-        </p:nvSpPr>
-        <p:spPr/>
-        <p:txBody>
-          <a:bodyPr/>
-          <a:lstStyle/>
-          <a:p>
-            <a:pPr>
-              <a:buFont typeface="Arial" pitchFamily="34" charset="0"/>
-              <a:buChar char="•"/>
-              <a:defRPr/>
-            </a:pPr>
-            <a:endParaRPr lang="nl-NL" dirty="0" smtClean="0">
-              <a:sym typeface="Kievit-Book" charset="0"/>
-            </a:endParaRPr>
-          </a:p>
-        </p:txBody>
-      </p:sp>
+        </p:nvPicPr>
+        <p:blipFill rotWithShape="1">
+          <a:blip r:embed="rId3">
+            <a:extLst>
+              <a:ext uri="{28A0092B-C50C-407E-A947-70E740481C1C}">
+                <a14:useLocalDpi xmlns:a14="http://schemas.microsoft.com/office/drawing/2010/main" val="0"/>
+              </a:ext>
+            </a:extLst>
+          </a:blip>
+          <a:srcRect l="-6844" t="2289" r="-6556" b="15508"/>
+          <a:stretch/>
+        </p:blipFill>
+        <p:spPr>
+          <a:xfrm>
+            <a:off x="-122336" y="1316434"/>
+            <a:ext cx="12906375" cy="7016750"/>
+          </a:xfrm>
+        </p:spPr>
+      </p:pic>
     </p:spTree>
   </p:cSld>
   <p:clrMapOvr>
@@ -5771,6 +6289,603 @@
       </p:par>
     </p:tnLst>
   </p:timing>
+</p:sld>
+</file>
+
+<file path=ppt/slides/slide5.xml><?xml version="1.0" encoding="utf-8"?>
+<p:sld xmlns:a="http://schemas.openxmlformats.org/drawingml/2006/main" xmlns:r="http://schemas.openxmlformats.org/officeDocument/2006/relationships" xmlns:p="http://schemas.openxmlformats.org/presentationml/2006/main">
+  <p:cSld>
+    <p:spTree>
+      <p:nvGrpSpPr>
+        <p:cNvPr id="1" name=""/>
+        <p:cNvGrpSpPr/>
+        <p:nvPr/>
+      </p:nvGrpSpPr>
+      <p:grpSpPr>
+        <a:xfrm>
+          <a:off x="0" y="0"/>
+          <a:ext cx="0" cy="0"/>
+          <a:chOff x="0" y="0"/>
+          <a:chExt cx="0" cy="0"/>
+        </a:xfrm>
+      </p:grpSpPr>
+      <p:sp>
+        <p:nvSpPr>
+          <p:cNvPr id="2" name="Title 1"/>
+          <p:cNvSpPr>
+            <a:spLocks noGrp="1"/>
+          </p:cNvSpPr>
+          <p:nvPr>
+            <p:ph type="title"/>
+          </p:nvPr>
+        </p:nvSpPr>
+        <p:spPr/>
+        <p:txBody>
+          <a:bodyPr/>
+          <a:lstStyle/>
+          <a:p>
+            <a:r>
+              <a:rPr lang="en-US" dirty="0" smtClean="0"/>
+              <a:t>Causal discovery methods</a:t>
+            </a:r>
+            <a:endParaRPr lang="en-US" dirty="0"/>
+          </a:p>
+        </p:txBody>
+      </p:sp>
+      <p:sp>
+        <p:nvSpPr>
+          <p:cNvPr id="5" name="Content Placeholder 4"/>
+          <p:cNvSpPr>
+            <a:spLocks noGrp="1"/>
+          </p:cNvSpPr>
+          <p:nvPr>
+            <p:ph idx="1"/>
+          </p:nvPr>
+        </p:nvSpPr>
+        <p:spPr/>
+        <p:txBody>
+          <a:bodyPr/>
+          <a:lstStyle/>
+          <a:p>
+            <a:endParaRPr lang="en-US" dirty="0"/>
+          </a:p>
+        </p:txBody>
+      </p:sp>
+      <p:pic>
+        <p:nvPicPr>
+          <p:cNvPr id="7" name="Picture 6" descr="undirected-graph.png"/>
+          <p:cNvPicPr>
+            <a:picLocks noChangeAspect="1"/>
+          </p:cNvPicPr>
+          <p:nvPr/>
+        </p:nvPicPr>
+        <p:blipFill>
+          <a:blip r:embed="rId2">
+            <a:extLst>
+              <a:ext uri="{28A0092B-C50C-407E-A947-70E740481C1C}">
+                <a14:useLocalDpi xmlns:a14="http://schemas.microsoft.com/office/drawing/2010/main" val="0"/>
+              </a:ext>
+            </a:extLst>
+          </a:blip>
+          <a:stretch>
+            <a:fillRect/>
+          </a:stretch>
+        </p:blipFill>
+        <p:spPr>
+          <a:xfrm>
+            <a:off x="381720" y="2932584"/>
+            <a:ext cx="5760640" cy="4173231"/>
+          </a:xfrm>
+          <a:prstGeom prst="rect">
+            <a:avLst/>
+          </a:prstGeom>
+        </p:spPr>
+      </p:pic>
+      <p:pic>
+        <p:nvPicPr>
+          <p:cNvPr id="8" name="Picture 7" descr="directed-graph.png"/>
+          <p:cNvPicPr>
+            <a:picLocks noChangeAspect="1"/>
+          </p:cNvPicPr>
+          <p:nvPr/>
+        </p:nvPicPr>
+        <p:blipFill>
+          <a:blip r:embed="rId3">
+            <a:extLst>
+              <a:ext uri="{28A0092B-C50C-407E-A947-70E740481C1C}">
+                <a14:useLocalDpi xmlns:a14="http://schemas.microsoft.com/office/drawing/2010/main" val="0"/>
+              </a:ext>
+            </a:extLst>
+          </a:blip>
+          <a:stretch>
+            <a:fillRect/>
+          </a:stretch>
+        </p:blipFill>
+        <p:spPr>
+          <a:xfrm>
+            <a:off x="7150472" y="3004592"/>
+            <a:ext cx="5446481" cy="4049029"/>
+          </a:xfrm>
+          <a:prstGeom prst="rect">
+            <a:avLst/>
+          </a:prstGeom>
+        </p:spPr>
+      </p:pic>
+      <p:sp>
+        <p:nvSpPr>
+          <p:cNvPr id="11" name="Right Arrow 10"/>
+          <p:cNvSpPr/>
+          <p:nvPr/>
+        </p:nvSpPr>
+        <p:spPr bwMode="auto">
+          <a:xfrm>
+            <a:off x="6502400" y="4732784"/>
+            <a:ext cx="720080" cy="576064"/>
+          </a:xfrm>
+          <a:prstGeom prst="rightArrow">
+            <a:avLst/>
+          </a:prstGeom>
+          <a:blipFill dpi="0" rotWithShape="0">
+            <a:blip r:embed="rId4"/>
+            <a:srcRect/>
+            <a:tile tx="0" ty="0" sx="100000" sy="100000" flip="none" algn="tl"/>
+          </a:blipFill>
+          <a:ln w="12700" cap="flat" cmpd="sng" algn="ctr">
+            <a:noFill/>
+            <a:prstDash val="solid"/>
+            <a:round/>
+            <a:headEnd type="none" w="med" len="med"/>
+            <a:tailEnd type="none" w="med" len="med"/>
+          </a:ln>
+          <a:effectLst/>
+        </p:spPr>
+        <p:txBody>
+          <a:bodyPr vert="horz" wrap="square" lIns="91440" tIns="45720" rIns="91440" bIns="45720" numCol="1" rtlCol="0" anchor="t" anchorCtr="0" compatLnSpc="1">
+            <a:prstTxWarp prst="textNoShape">
+              <a:avLst/>
+            </a:prstTxWarp>
+          </a:bodyPr>
+          <a:lstStyle/>
+          <a:p>
+            <a:pPr marL="0" marR="0" indent="0" algn="ctr" defTabSz="914400" rtl="0" eaLnBrk="1" fontAlgn="base" latinLnBrk="0" hangingPunct="1">
+              <a:lnSpc>
+                <a:spcPct val="100000"/>
+              </a:lnSpc>
+              <a:spcBef>
+                <a:spcPct val="0"/>
+              </a:spcBef>
+              <a:spcAft>
+                <a:spcPct val="0"/>
+              </a:spcAft>
+              <a:buClrTx/>
+              <a:buSzTx/>
+              <a:buFontTx/>
+              <a:buNone/>
+              <a:tabLst/>
+            </a:pPr>
+            <a:endParaRPr kumimoji="0" lang="en-US" sz="4000" b="0" i="0" u="none" strike="noStrike" cap="none" normalizeH="0" baseline="0">
+              <a:ln>
+                <a:noFill/>
+              </a:ln>
+              <a:solidFill>
+                <a:srgbClr val="FFFFFF"/>
+              </a:solidFill>
+              <a:effectLst/>
+              <a:latin typeface="American Typewriter" charset="0"/>
+              <a:ea typeface="ヒラギノ明朝 ProN W3" charset="-128"/>
+              <a:cs typeface="ヒラギノ明朝 ProN W3" charset="-128"/>
+              <a:sym typeface="American Typewriter" charset="0"/>
+            </a:endParaRPr>
+          </a:p>
+        </p:txBody>
+      </p:sp>
+    </p:spTree>
+    <p:extLst>
+      <p:ext uri="{BB962C8B-B14F-4D97-AF65-F5344CB8AC3E}">
+        <p14:creationId xmlns:p14="http://schemas.microsoft.com/office/powerpoint/2010/main" val="2674181576"/>
+      </p:ext>
+    </p:extLst>
+  </p:cSld>
+  <p:clrMapOvr>
+    <a:masterClrMapping/>
+  </p:clrMapOvr>
+  <p:transition xmlns:p14="http://schemas.microsoft.com/office/powerpoint/2010/main"/>
+  <p:timing>
+    <p:tnLst>
+      <p:par>
+        <p:cTn xmlns:p14="http://schemas.microsoft.com/office/powerpoint/2010/main" id="1" dur="indefinite" restart="never" nodeType="tmRoot"/>
+      </p:par>
+    </p:tnLst>
+  </p:timing>
+</p:sld>
+</file>
+
+<file path=ppt/slides/slide6.xml><?xml version="1.0" encoding="utf-8"?>
+<p:sld xmlns:a="http://schemas.openxmlformats.org/drawingml/2006/main" xmlns:r="http://schemas.openxmlformats.org/officeDocument/2006/relationships" xmlns:p="http://schemas.openxmlformats.org/presentationml/2006/main">
+  <p:cSld>
+    <p:spTree>
+      <p:nvGrpSpPr>
+        <p:cNvPr id="1" name=""/>
+        <p:cNvGrpSpPr/>
+        <p:nvPr/>
+      </p:nvGrpSpPr>
+      <p:grpSpPr>
+        <a:xfrm>
+          <a:off x="0" y="0"/>
+          <a:ext cx="0" cy="0"/>
+          <a:chOff x="0" y="0"/>
+          <a:chExt cx="0" cy="0"/>
+        </a:xfrm>
+      </p:grpSpPr>
+      <p:sp>
+        <p:nvSpPr>
+          <p:cNvPr id="2" name="Title 1"/>
+          <p:cNvSpPr>
+            <a:spLocks noGrp="1"/>
+          </p:cNvSpPr>
+          <p:nvPr>
+            <p:ph type="title"/>
+          </p:nvPr>
+        </p:nvSpPr>
+        <p:spPr/>
+        <p:txBody>
+          <a:bodyPr anchor="t"/>
+          <a:lstStyle/>
+          <a:p>
+            <a:r>
+              <a:rPr lang="en-US" dirty="0" smtClean="0"/>
+              <a:t>Research problem</a:t>
+            </a:r>
+            <a:endParaRPr lang="en-US" dirty="0"/>
+          </a:p>
+        </p:txBody>
+      </p:sp>
+      <p:sp>
+        <p:nvSpPr>
+          <p:cNvPr id="3" name="Content Placeholder 2"/>
+          <p:cNvSpPr>
+            <a:spLocks noGrp="1"/>
+          </p:cNvSpPr>
+          <p:nvPr>
+            <p:ph idx="1"/>
+          </p:nvPr>
+        </p:nvSpPr>
+        <p:spPr/>
+        <p:txBody>
+          <a:bodyPr vert="horz" anchor="t"/>
+          <a:lstStyle/>
+          <a:p>
+            <a:pPr marL="0" indent="0">
+              <a:buNone/>
+            </a:pPr>
+            <a:r>
+              <a:rPr lang="en-US" sz="3600" dirty="0" smtClean="0"/>
+              <a:t>Is causal discovery a </a:t>
+            </a:r>
+            <a:r>
+              <a:rPr lang="en-US" sz="3600" i="1" dirty="0" smtClean="0"/>
+              <a:t>good </a:t>
+            </a:r>
+            <a:r>
+              <a:rPr lang="en-US" sz="3600" dirty="0" smtClean="0"/>
+              <a:t>means of finding Effective Connectivity?</a:t>
+            </a:r>
+            <a:endParaRPr lang="en-US" sz="3600" dirty="0"/>
+          </a:p>
+        </p:txBody>
+      </p:sp>
+    </p:spTree>
+    <p:extLst>
+      <p:ext uri="{BB962C8B-B14F-4D97-AF65-F5344CB8AC3E}">
+        <p14:creationId xmlns:p14="http://schemas.microsoft.com/office/powerpoint/2010/main" val="869085038"/>
+      </p:ext>
+    </p:extLst>
+  </p:cSld>
+  <p:clrMapOvr>
+    <a:masterClrMapping/>
+  </p:clrMapOvr>
+  <p:transition xmlns:p14="http://schemas.microsoft.com/office/powerpoint/2010/main"/>
+  <p:timing>
+    <p:tnLst>
+      <p:par>
+        <p:cTn xmlns:p14="http://schemas.microsoft.com/office/powerpoint/2010/main" id="1" dur="indefinite" restart="never" nodeType="tmRoot"/>
+      </p:par>
+    </p:tnLst>
+  </p:timing>
+</p:sld>
+</file>
+
+<file path=ppt/slides/slide7.xml><?xml version="1.0" encoding="utf-8"?>
+<p:sld xmlns:a="http://schemas.openxmlformats.org/drawingml/2006/main" xmlns:r="http://schemas.openxmlformats.org/officeDocument/2006/relationships" xmlns:p="http://schemas.openxmlformats.org/presentationml/2006/main">
+  <p:cSld>
+    <p:spTree>
+      <p:nvGrpSpPr>
+        <p:cNvPr id="1" name=""/>
+        <p:cNvGrpSpPr/>
+        <p:nvPr/>
+      </p:nvGrpSpPr>
+      <p:grpSpPr>
+        <a:xfrm>
+          <a:off x="0" y="0"/>
+          <a:ext cx="0" cy="0"/>
+          <a:chOff x="0" y="0"/>
+          <a:chExt cx="0" cy="0"/>
+        </a:xfrm>
+      </p:grpSpPr>
+      <p:sp>
+        <p:nvSpPr>
+          <p:cNvPr id="2" name="Title 1"/>
+          <p:cNvSpPr>
+            <a:spLocks noGrp="1"/>
+          </p:cNvSpPr>
+          <p:nvPr>
+            <p:ph type="title"/>
+          </p:nvPr>
+        </p:nvSpPr>
+        <p:spPr/>
+        <p:txBody>
+          <a:bodyPr/>
+          <a:lstStyle/>
+          <a:p>
+            <a:r>
+              <a:rPr lang="en-US" dirty="0" smtClean="0"/>
+              <a:t>Problems with causal inference in fMRI</a:t>
+            </a:r>
+            <a:endParaRPr lang="en-US" dirty="0"/>
+          </a:p>
+        </p:txBody>
+      </p:sp>
+      <p:sp>
+        <p:nvSpPr>
+          <p:cNvPr id="3" name="Content Placeholder 2"/>
+          <p:cNvSpPr>
+            <a:spLocks noGrp="1"/>
+          </p:cNvSpPr>
+          <p:nvPr>
+            <p:ph idx="1"/>
+          </p:nvPr>
+        </p:nvSpPr>
+        <p:spPr/>
+        <p:txBody>
+          <a:bodyPr/>
+          <a:lstStyle/>
+          <a:p>
+            <a:r>
+              <a:rPr lang="en-US" dirty="0" smtClean="0"/>
+              <a:t>Scalability</a:t>
+            </a:r>
+          </a:p>
+          <a:p>
+            <a:r>
+              <a:rPr lang="en-US" dirty="0" smtClean="0"/>
+              <a:t>Variance between subjects</a:t>
+            </a:r>
+          </a:p>
+          <a:p>
+            <a:r>
+              <a:rPr lang="en-US" dirty="0" smtClean="0"/>
+              <a:t>Indirect measurement</a:t>
+            </a:r>
+          </a:p>
+          <a:p>
+            <a:r>
+              <a:rPr lang="en-US" dirty="0" smtClean="0"/>
+              <a:t>Latent sources</a:t>
+            </a:r>
+            <a:endParaRPr lang="en-US" dirty="0"/>
+          </a:p>
+        </p:txBody>
+      </p:sp>
+    </p:spTree>
+    <p:extLst>
+      <p:ext uri="{BB962C8B-B14F-4D97-AF65-F5344CB8AC3E}">
+        <p14:creationId xmlns:p14="http://schemas.microsoft.com/office/powerpoint/2010/main" val="3691841903"/>
+      </p:ext>
+    </p:extLst>
+  </p:cSld>
+  <p:clrMapOvr>
+    <a:masterClrMapping/>
+  </p:clrMapOvr>
+  <p:transition xmlns:p14="http://schemas.microsoft.com/office/powerpoint/2010/main"/>
+</p:sld>
+</file>
+
+<file path=ppt/slides/slide8.xml><?xml version="1.0" encoding="utf-8"?>
+<p:sld xmlns:a="http://schemas.openxmlformats.org/drawingml/2006/main" xmlns:r="http://schemas.openxmlformats.org/officeDocument/2006/relationships" xmlns:p="http://schemas.openxmlformats.org/presentationml/2006/main">
+  <p:cSld>
+    <p:spTree>
+      <p:nvGrpSpPr>
+        <p:cNvPr id="1" name=""/>
+        <p:cNvGrpSpPr/>
+        <p:nvPr/>
+      </p:nvGrpSpPr>
+      <p:grpSpPr>
+        <a:xfrm>
+          <a:off x="0" y="0"/>
+          <a:ext cx="0" cy="0"/>
+          <a:chOff x="0" y="0"/>
+          <a:chExt cx="0" cy="0"/>
+        </a:xfrm>
+      </p:grpSpPr>
+      <p:sp>
+        <p:nvSpPr>
+          <p:cNvPr id="2" name="Title 1"/>
+          <p:cNvSpPr>
+            <a:spLocks noGrp="1"/>
+          </p:cNvSpPr>
+          <p:nvPr>
+            <p:ph type="title"/>
+          </p:nvPr>
+        </p:nvSpPr>
+        <p:spPr/>
+        <p:txBody>
+          <a:bodyPr/>
+          <a:lstStyle/>
+          <a:p>
+            <a:r>
+              <a:rPr lang="en-US" dirty="0" smtClean="0"/>
+              <a:t>Methods</a:t>
+            </a:r>
+            <a:endParaRPr lang="en-US" dirty="0"/>
+          </a:p>
+        </p:txBody>
+      </p:sp>
+      <p:sp>
+        <p:nvSpPr>
+          <p:cNvPr id="3" name="Content Placeholder 2"/>
+          <p:cNvSpPr>
+            <a:spLocks noGrp="1"/>
+          </p:cNvSpPr>
+          <p:nvPr>
+            <p:ph idx="1"/>
+          </p:nvPr>
+        </p:nvSpPr>
+        <p:spPr/>
+        <p:txBody>
+          <a:bodyPr/>
+          <a:lstStyle/>
+          <a:p>
+            <a:r>
+              <a:rPr lang="en-US" dirty="0" smtClean="0"/>
+              <a:t>PC (implement ourselves)</a:t>
+            </a:r>
+          </a:p>
+          <a:p>
+            <a:r>
+              <a:rPr lang="en-US" dirty="0" smtClean="0"/>
+              <a:t>BCCD (implementation available)</a:t>
+            </a:r>
+            <a:endParaRPr lang="en-US" dirty="0"/>
+          </a:p>
+        </p:txBody>
+      </p:sp>
+    </p:spTree>
+    <p:extLst>
+      <p:ext uri="{BB962C8B-B14F-4D97-AF65-F5344CB8AC3E}">
+        <p14:creationId xmlns:p14="http://schemas.microsoft.com/office/powerpoint/2010/main" val="2161218610"/>
+      </p:ext>
+    </p:extLst>
+  </p:cSld>
+  <p:clrMapOvr>
+    <a:masterClrMapping/>
+  </p:clrMapOvr>
+  <p:transition xmlns:p14="http://schemas.microsoft.com/office/powerpoint/2010/main"/>
+  <p:timing>
+    <p:tnLst>
+      <p:par>
+        <p:cTn xmlns:p14="http://schemas.microsoft.com/office/powerpoint/2010/main" id="1" dur="indefinite" restart="never" nodeType="tmRoot"/>
+      </p:par>
+    </p:tnLst>
+  </p:timing>
+</p:sld>
+</file>
+
+<file path=ppt/slides/slide9.xml><?xml version="1.0" encoding="utf-8"?>
+<p:sld xmlns:a="http://schemas.openxmlformats.org/drawingml/2006/main" xmlns:r="http://schemas.openxmlformats.org/officeDocument/2006/relationships" xmlns:p="http://schemas.openxmlformats.org/presentationml/2006/main">
+  <p:cSld>
+    <p:spTree>
+      <p:nvGrpSpPr>
+        <p:cNvPr id="1" name=""/>
+        <p:cNvGrpSpPr/>
+        <p:nvPr/>
+      </p:nvGrpSpPr>
+      <p:grpSpPr>
+        <a:xfrm>
+          <a:off x="0" y="0"/>
+          <a:ext cx="0" cy="0"/>
+          <a:chOff x="0" y="0"/>
+          <a:chExt cx="0" cy="0"/>
+        </a:xfrm>
+      </p:grpSpPr>
+      <p:sp>
+        <p:nvSpPr>
+          <p:cNvPr id="2" name="Title 1"/>
+          <p:cNvSpPr>
+            <a:spLocks noGrp="1"/>
+          </p:cNvSpPr>
+          <p:nvPr>
+            <p:ph type="title"/>
+          </p:nvPr>
+        </p:nvSpPr>
+        <p:spPr>
+          <a:xfrm>
+            <a:off x="813768" y="988368"/>
+            <a:ext cx="11049000" cy="1054100"/>
+          </a:xfrm>
+        </p:spPr>
+        <p:txBody>
+          <a:bodyPr/>
+          <a:lstStyle/>
+          <a:p>
+            <a:r>
+              <a:rPr lang="en-US" dirty="0" smtClean="0"/>
+              <a:t>Data acquisition</a:t>
+            </a:r>
+            <a:endParaRPr lang="en-US" dirty="0"/>
+          </a:p>
+        </p:txBody>
+      </p:sp>
+      <p:sp>
+        <p:nvSpPr>
+          <p:cNvPr id="3" name="Content Placeholder 2"/>
+          <p:cNvSpPr>
+            <a:spLocks noGrp="1"/>
+          </p:cNvSpPr>
+          <p:nvPr>
+            <p:ph idx="1"/>
+          </p:nvPr>
+        </p:nvSpPr>
+        <p:spPr/>
+        <p:txBody>
+          <a:bodyPr/>
+          <a:lstStyle/>
+          <a:p>
+            <a:r>
+              <a:rPr lang="en-US" dirty="0" smtClean="0"/>
+              <a:t>6 subjects</a:t>
+            </a:r>
+          </a:p>
+          <a:p>
+            <a:r>
+              <a:rPr lang="en-US" dirty="0" smtClean="0"/>
+              <a:t>fMRI and DTI data</a:t>
+            </a:r>
+          </a:p>
+          <a:p>
+            <a:r>
+              <a:rPr lang="en-US" dirty="0" smtClean="0"/>
+              <a:t>Structural data and voxel time-series</a:t>
+            </a:r>
+          </a:p>
+          <a:p>
+            <a:r>
+              <a:rPr lang="en-US" dirty="0" smtClean="0"/>
+              <a:t>114 voxels</a:t>
+            </a:r>
+          </a:p>
+          <a:p>
+            <a:endParaRPr lang="en-US" dirty="0"/>
+          </a:p>
+          <a:p>
+            <a:r>
+              <a:rPr lang="en-US" dirty="0" smtClean="0"/>
+              <a:t>Data is already available</a:t>
+            </a:r>
+            <a:endParaRPr lang="en-US" dirty="0"/>
+          </a:p>
+        </p:txBody>
+      </p:sp>
+    </p:spTree>
+    <p:extLst>
+      <p:ext uri="{BB962C8B-B14F-4D97-AF65-F5344CB8AC3E}">
+        <p14:creationId xmlns:p14="http://schemas.microsoft.com/office/powerpoint/2010/main" val="2122703585"/>
+      </p:ext>
+    </p:extLst>
+  </p:cSld>
+  <p:clrMapOvr>
+    <a:masterClrMapping/>
+  </p:clrMapOvr>
+  <p:transition xmlns:p14="http://schemas.microsoft.com/office/powerpoint/2010/main"/>
 </p:sld>
 </file>
 
@@ -6678,6 +7793,25 @@
         </a:defPPr>
       </a:lstStyle>
     </a:lnDef>
+    <a:txDef>
+      <a:spPr>
+        <a:noFill/>
+      </a:spPr>
+      <a:bodyPr wrap="none" rtlCol="0">
+        <a:spAutoFit/>
+      </a:bodyPr>
+      <a:lstStyle>
+        <a:defPPr>
+          <a:defRPr dirty="0" smtClean="0">
+            <a:solidFill>
+              <a:schemeClr val="bg1"/>
+            </a:solidFill>
+            <a:latin typeface="Arial"/>
+            <a:cs typeface="Arial"/>
+          </a:defRPr>
+        </a:defPPr>
+      </a:lstStyle>
+    </a:txDef>
   </a:objectDefaults>
   <a:extraClrSchemeLst>
     <a:extraClrScheme>

</xml_diff>

<commit_message>
Removed accidentally commited tmp files from repository. Added slide on neuro-disease.
</commit_message>
<xml_diff>
--- a/docs/proposal presentation/Proposal presentation.pptx
+++ b/docs/proposal presentation/Proposal presentation.pptx
@@ -6,23 +6,24 @@
     <p:sldMasterId id="2147483657" r:id="rId2"/>
   </p:sldMasterIdLst>
   <p:notesMasterIdLst>
-    <p:notesMasterId r:id="rId14"/>
+    <p:notesMasterId r:id="rId15"/>
   </p:notesMasterIdLst>
   <p:handoutMasterIdLst>
-    <p:handoutMasterId r:id="rId15"/>
+    <p:handoutMasterId r:id="rId16"/>
   </p:handoutMasterIdLst>
   <p:sldIdLst>
     <p:sldId id="344" r:id="rId3"/>
     <p:sldId id="348" r:id="rId4"/>
     <p:sldId id="347" r:id="rId5"/>
     <p:sldId id="345" r:id="rId6"/>
-    <p:sldId id="349" r:id="rId7"/>
-    <p:sldId id="350" r:id="rId8"/>
-    <p:sldId id="354" r:id="rId9"/>
-    <p:sldId id="351" r:id="rId10"/>
-    <p:sldId id="352" r:id="rId11"/>
-    <p:sldId id="353" r:id="rId12"/>
-    <p:sldId id="355" r:id="rId13"/>
+    <p:sldId id="356" r:id="rId7"/>
+    <p:sldId id="349" r:id="rId8"/>
+    <p:sldId id="350" r:id="rId9"/>
+    <p:sldId id="354" r:id="rId10"/>
+    <p:sldId id="351" r:id="rId11"/>
+    <p:sldId id="352" r:id="rId12"/>
+    <p:sldId id="353" r:id="rId13"/>
+    <p:sldId id="355" r:id="rId14"/>
   </p:sldIdLst>
   <p:sldSz cx="13004800" cy="9753600"/>
   <p:notesSz cx="6794500" cy="9931400"/>
@@ -5722,6 +5723,115 @@
             <p:ph type="title"/>
           </p:nvPr>
         </p:nvSpPr>
+        <p:spPr>
+          <a:xfrm>
+            <a:off x="813768" y="988368"/>
+            <a:ext cx="11049000" cy="1054100"/>
+          </a:xfrm>
+        </p:spPr>
+        <p:txBody>
+          <a:bodyPr/>
+          <a:lstStyle/>
+          <a:p>
+            <a:r>
+              <a:rPr lang="en-US" dirty="0" smtClean="0"/>
+              <a:t>Data acquisition</a:t>
+            </a:r>
+            <a:endParaRPr lang="en-US" dirty="0"/>
+          </a:p>
+        </p:txBody>
+      </p:sp>
+      <p:sp>
+        <p:nvSpPr>
+          <p:cNvPr id="3" name="Content Placeholder 2"/>
+          <p:cNvSpPr>
+            <a:spLocks noGrp="1"/>
+          </p:cNvSpPr>
+          <p:nvPr>
+            <p:ph idx="1"/>
+          </p:nvPr>
+        </p:nvSpPr>
+        <p:spPr/>
+        <p:txBody>
+          <a:bodyPr/>
+          <a:lstStyle/>
+          <a:p>
+            <a:r>
+              <a:rPr lang="en-US" dirty="0" smtClean="0"/>
+              <a:t>6 subjects</a:t>
+            </a:r>
+          </a:p>
+          <a:p>
+            <a:r>
+              <a:rPr lang="en-US" dirty="0" smtClean="0"/>
+              <a:t>fMRI and DTI data</a:t>
+            </a:r>
+          </a:p>
+          <a:p>
+            <a:r>
+              <a:rPr lang="en-US" dirty="0" smtClean="0"/>
+              <a:t>Structural data and voxel time-series</a:t>
+            </a:r>
+          </a:p>
+          <a:p>
+            <a:r>
+              <a:rPr lang="en-US" dirty="0" smtClean="0"/>
+              <a:t>114 voxels</a:t>
+            </a:r>
+          </a:p>
+          <a:p>
+            <a:endParaRPr lang="en-US" dirty="0"/>
+          </a:p>
+          <a:p>
+            <a:r>
+              <a:rPr lang="en-US" dirty="0" smtClean="0"/>
+              <a:t>Data is already available</a:t>
+            </a:r>
+            <a:endParaRPr lang="en-US" dirty="0"/>
+          </a:p>
+        </p:txBody>
+      </p:sp>
+    </p:spTree>
+    <p:extLst>
+      <p:ext uri="{BB962C8B-B14F-4D97-AF65-F5344CB8AC3E}">
+        <p14:creationId xmlns:p14="http://schemas.microsoft.com/office/powerpoint/2010/main" val="2122703585"/>
+      </p:ext>
+    </p:extLst>
+  </p:cSld>
+  <p:clrMapOvr>
+    <a:masterClrMapping/>
+  </p:clrMapOvr>
+  <p:transition xmlns:p14="http://schemas.microsoft.com/office/powerpoint/2010/main"/>
+</p:sld>
+</file>
+
+<file path=ppt/slides/slide11.xml><?xml version="1.0" encoding="utf-8"?>
+<p:sld xmlns:a="http://schemas.openxmlformats.org/drawingml/2006/main" xmlns:r="http://schemas.openxmlformats.org/officeDocument/2006/relationships" xmlns:p="http://schemas.openxmlformats.org/presentationml/2006/main">
+  <p:cSld>
+    <p:spTree>
+      <p:nvGrpSpPr>
+        <p:cNvPr id="1" name=""/>
+        <p:cNvGrpSpPr/>
+        <p:nvPr/>
+      </p:nvGrpSpPr>
+      <p:grpSpPr>
+        <a:xfrm>
+          <a:off x="0" y="0"/>
+          <a:ext cx="0" cy="0"/>
+          <a:chOff x="0" y="0"/>
+          <a:chExt cx="0" cy="0"/>
+        </a:xfrm>
+      </p:grpSpPr>
+      <p:sp>
+        <p:nvSpPr>
+          <p:cNvPr id="2" name="Title 1"/>
+          <p:cNvSpPr>
+            <a:spLocks noGrp="1"/>
+          </p:cNvSpPr>
+          <p:nvPr>
+            <p:ph type="title"/>
+          </p:nvPr>
+        </p:nvSpPr>
         <p:spPr/>
         <p:txBody>
           <a:bodyPr/>
@@ -5772,7 +5882,7 @@
 </p:sld>
 </file>
 
-<file path=ppt/slides/slide11.xml><?xml version="1.0" encoding="utf-8"?>
+<file path=ppt/slides/slide12.xml><?xml version="1.0" encoding="utf-8"?>
 <p:sld xmlns:a="http://schemas.openxmlformats.org/drawingml/2006/main" xmlns:r="http://schemas.openxmlformats.org/officeDocument/2006/relationships" xmlns:p="http://schemas.openxmlformats.org/presentationml/2006/main">
   <p:cSld>
     <p:bg>
@@ -6222,32 +6332,6 @@
           <a:chExt cx="0" cy="0"/>
         </a:xfrm>
       </p:grpSpPr>
-      <p:sp>
-        <p:nvSpPr>
-          <p:cNvPr id="21505" name="Titel 3"/>
-          <p:cNvSpPr>
-            <a:spLocks noGrp="1"/>
-          </p:cNvSpPr>
-          <p:nvPr>
-            <p:ph type="title"/>
-          </p:nvPr>
-        </p:nvSpPr>
-        <p:spPr/>
-        <p:txBody>
-          <a:bodyPr/>
-          <a:lstStyle/>
-          <a:p>
-            <a:r>
-              <a:rPr lang="nl-NL" dirty="0" smtClean="0">
-                <a:latin typeface="Arial" pitchFamily="34" charset="0"/>
-                <a:ea typeface="ＭＳ Ｐゴシック"/>
-                <a:cs typeface="Arial" pitchFamily="34" charset="0"/>
-              </a:rPr>
-              <a:t>Brain Connectivity</a:t>
-            </a:r>
-          </a:p>
-        </p:txBody>
-      </p:sp>
       <p:pic>
         <p:nvPicPr>
           <p:cNvPr id="8" name="Content Placeholder 7" descr="brain-connectivity.jpg"/>
@@ -6276,6 +6360,32 @@
           </a:xfrm>
         </p:spPr>
       </p:pic>
+      <p:sp>
+        <p:nvSpPr>
+          <p:cNvPr id="21505" name="Titel 3"/>
+          <p:cNvSpPr>
+            <a:spLocks noGrp="1"/>
+          </p:cNvSpPr>
+          <p:nvPr>
+            <p:ph type="title"/>
+          </p:nvPr>
+        </p:nvSpPr>
+        <p:spPr/>
+        <p:txBody>
+          <a:bodyPr/>
+          <a:lstStyle/>
+          <a:p>
+            <a:r>
+              <a:rPr lang="nl-NL" dirty="0" smtClean="0">
+                <a:latin typeface="Arial" pitchFamily="34" charset="0"/>
+                <a:ea typeface="ＭＳ Ｐゴシック"/>
+                <a:cs typeface="Arial" pitchFamily="34" charset="0"/>
+              </a:rPr>
+              <a:t>Brain Connectivity</a:t>
+            </a:r>
+          </a:p>
+        </p:txBody>
+      </p:sp>
     </p:spTree>
   </p:cSld>
   <p:clrMapOvr>
@@ -6293,6 +6403,94 @@
 </file>
 
 <file path=ppt/slides/slide5.xml><?xml version="1.0" encoding="utf-8"?>
+<p:sld xmlns:a="http://schemas.openxmlformats.org/drawingml/2006/main" xmlns:r="http://schemas.openxmlformats.org/officeDocument/2006/relationships" xmlns:p="http://schemas.openxmlformats.org/presentationml/2006/main">
+  <p:cSld>
+    <p:spTree>
+      <p:nvGrpSpPr>
+        <p:cNvPr id="1" name=""/>
+        <p:cNvGrpSpPr/>
+        <p:nvPr/>
+      </p:nvGrpSpPr>
+      <p:grpSpPr>
+        <a:xfrm>
+          <a:off x="0" y="0"/>
+          <a:ext cx="0" cy="0"/>
+          <a:chOff x="0" y="0"/>
+          <a:chExt cx="0" cy="0"/>
+        </a:xfrm>
+      </p:grpSpPr>
+      <p:sp>
+        <p:nvSpPr>
+          <p:cNvPr id="2" name="Title 1"/>
+          <p:cNvSpPr>
+            <a:spLocks noGrp="1"/>
+          </p:cNvSpPr>
+          <p:nvPr>
+            <p:ph type="title"/>
+          </p:nvPr>
+        </p:nvSpPr>
+        <p:spPr/>
+        <p:txBody>
+          <a:bodyPr/>
+          <a:lstStyle/>
+          <a:p>
+            <a:r>
+              <a:rPr lang="en-US" dirty="0" err="1" smtClean="0"/>
+              <a:t>Neuro</a:t>
+            </a:r>
+            <a:r>
+              <a:rPr lang="en-US" dirty="0" smtClean="0"/>
+              <a:t>-degenerative diseases</a:t>
+            </a:r>
+            <a:endParaRPr lang="en-US" dirty="0"/>
+          </a:p>
+        </p:txBody>
+      </p:sp>
+      <p:pic>
+        <p:nvPicPr>
+          <p:cNvPr id="4" name="Picture 3" descr="alzheimer's-disease.jpg"/>
+          <p:cNvPicPr>
+            <a:picLocks noChangeAspect="1"/>
+          </p:cNvPicPr>
+          <p:nvPr/>
+        </p:nvPicPr>
+        <p:blipFill>
+          <a:blip r:embed="rId2">
+            <a:extLst>
+              <a:ext uri="{28A0092B-C50C-407E-A947-70E740481C1C}">
+                <a14:useLocalDpi xmlns:a14="http://schemas.microsoft.com/office/drawing/2010/main" val="0"/>
+              </a:ext>
+            </a:extLst>
+          </a:blip>
+          <a:stretch>
+            <a:fillRect/>
+          </a:stretch>
+        </p:blipFill>
+        <p:spPr>
+          <a:xfrm>
+            <a:off x="2109912" y="1924472"/>
+            <a:ext cx="9144000" cy="6858000"/>
+          </a:xfrm>
+          <a:prstGeom prst="rect">
+            <a:avLst/>
+          </a:prstGeom>
+        </p:spPr>
+      </p:pic>
+    </p:spTree>
+    <p:extLst>
+      <p:ext uri="{BB962C8B-B14F-4D97-AF65-F5344CB8AC3E}">
+        <p14:creationId xmlns:p14="http://schemas.microsoft.com/office/powerpoint/2010/main" val="254796501"/>
+      </p:ext>
+    </p:extLst>
+  </p:cSld>
+  <p:clrMapOvr>
+    <a:masterClrMapping/>
+  </p:clrMapOvr>
+  <p:transition xmlns:p14="http://schemas.microsoft.com/office/powerpoint/2010/main"/>
+</p:sld>
+</file>
+
+<file path=ppt/slides/slide6.xml><?xml version="1.0" encoding="utf-8"?>
 <p:sld xmlns:a="http://schemas.openxmlformats.org/drawingml/2006/main" xmlns:r="http://schemas.openxmlformats.org/officeDocument/2006/relationships" xmlns:p="http://schemas.openxmlformats.org/presentationml/2006/main">
   <p:cSld>
     <p:spTree>
@@ -6500,7 +6698,7 @@
 </p:sld>
 </file>
 
-<file path=ppt/slides/slide6.xml><?xml version="1.0" encoding="utf-8"?>
+<file path=ppt/slides/slide7.xml><?xml version="1.0" encoding="utf-8"?>
 <p:sld xmlns:a="http://schemas.openxmlformats.org/drawingml/2006/main" xmlns:r="http://schemas.openxmlformats.org/officeDocument/2006/relationships" xmlns:p="http://schemas.openxmlformats.org/presentationml/2006/main">
   <p:cSld>
     <p:spTree>
@@ -6595,101 +6793,6 @@
 </p:sld>
 </file>
 
-<file path=ppt/slides/slide7.xml><?xml version="1.0" encoding="utf-8"?>
-<p:sld xmlns:a="http://schemas.openxmlformats.org/drawingml/2006/main" xmlns:r="http://schemas.openxmlformats.org/officeDocument/2006/relationships" xmlns:p="http://schemas.openxmlformats.org/presentationml/2006/main">
-  <p:cSld>
-    <p:spTree>
-      <p:nvGrpSpPr>
-        <p:cNvPr id="1" name=""/>
-        <p:cNvGrpSpPr/>
-        <p:nvPr/>
-      </p:nvGrpSpPr>
-      <p:grpSpPr>
-        <a:xfrm>
-          <a:off x="0" y="0"/>
-          <a:ext cx="0" cy="0"/>
-          <a:chOff x="0" y="0"/>
-          <a:chExt cx="0" cy="0"/>
-        </a:xfrm>
-      </p:grpSpPr>
-      <p:sp>
-        <p:nvSpPr>
-          <p:cNvPr id="2" name="Title 1"/>
-          <p:cNvSpPr>
-            <a:spLocks noGrp="1"/>
-          </p:cNvSpPr>
-          <p:nvPr>
-            <p:ph type="title"/>
-          </p:nvPr>
-        </p:nvSpPr>
-        <p:spPr/>
-        <p:txBody>
-          <a:bodyPr/>
-          <a:lstStyle/>
-          <a:p>
-            <a:r>
-              <a:rPr lang="en-US" dirty="0" smtClean="0"/>
-              <a:t>Problems with causal inference in fMRI</a:t>
-            </a:r>
-            <a:endParaRPr lang="en-US" dirty="0"/>
-          </a:p>
-        </p:txBody>
-      </p:sp>
-      <p:sp>
-        <p:nvSpPr>
-          <p:cNvPr id="3" name="Content Placeholder 2"/>
-          <p:cNvSpPr>
-            <a:spLocks noGrp="1"/>
-          </p:cNvSpPr>
-          <p:nvPr>
-            <p:ph idx="1"/>
-          </p:nvPr>
-        </p:nvSpPr>
-        <p:spPr/>
-        <p:txBody>
-          <a:bodyPr/>
-          <a:lstStyle/>
-          <a:p>
-            <a:r>
-              <a:rPr lang="en-US" dirty="0" smtClean="0"/>
-              <a:t>Scalability</a:t>
-            </a:r>
-          </a:p>
-          <a:p>
-            <a:r>
-              <a:rPr lang="en-US" dirty="0" smtClean="0"/>
-              <a:t>Variance between subjects</a:t>
-            </a:r>
-          </a:p>
-          <a:p>
-            <a:r>
-              <a:rPr lang="en-US" dirty="0" smtClean="0"/>
-              <a:t>Indirect measurement</a:t>
-            </a:r>
-          </a:p>
-          <a:p>
-            <a:r>
-              <a:rPr lang="en-US" dirty="0" smtClean="0"/>
-              <a:t>Latent sources</a:t>
-            </a:r>
-            <a:endParaRPr lang="en-US" dirty="0"/>
-          </a:p>
-        </p:txBody>
-      </p:sp>
-    </p:spTree>
-    <p:extLst>
-      <p:ext uri="{BB962C8B-B14F-4D97-AF65-F5344CB8AC3E}">
-        <p14:creationId xmlns:p14="http://schemas.microsoft.com/office/powerpoint/2010/main" val="3691841903"/>
-      </p:ext>
-    </p:extLst>
-  </p:cSld>
-  <p:clrMapOvr>
-    <a:masterClrMapping/>
-  </p:clrMapOvr>
-  <p:transition xmlns:p14="http://schemas.microsoft.com/office/powerpoint/2010/main"/>
-</p:sld>
-</file>
-
 <file path=ppt/slides/slide8.xml><?xml version="1.0" encoding="utf-8"?>
 <p:sld xmlns:a="http://schemas.openxmlformats.org/drawingml/2006/main" xmlns:r="http://schemas.openxmlformats.org/officeDocument/2006/relationships" xmlns:p="http://schemas.openxmlformats.org/presentationml/2006/main">
   <p:cSld>
@@ -6724,7 +6827,7 @@
           <a:p>
             <a:r>
               <a:rPr lang="en-US" dirty="0" smtClean="0"/>
-              <a:t>Methods</a:t>
+              <a:t>Problems with causal inference in fMRI</a:t>
             </a:r>
             <a:endParaRPr lang="en-US" dirty="0"/>
           </a:p>
@@ -6747,13 +6850,25 @@
           <a:p>
             <a:r>
               <a:rPr lang="en-US" dirty="0" smtClean="0"/>
-              <a:t>PC (implement ourselves)</a:t>
+              <a:t>Scalability</a:t>
             </a:r>
           </a:p>
           <a:p>
             <a:r>
               <a:rPr lang="en-US" dirty="0" smtClean="0"/>
-              <a:t>BCCD (implementation available)</a:t>
+              <a:t>Variance between subjects</a:t>
+            </a:r>
+          </a:p>
+          <a:p>
+            <a:r>
+              <a:rPr lang="en-US" dirty="0" smtClean="0"/>
+              <a:t>Indirect measurement</a:t>
+            </a:r>
+          </a:p>
+          <a:p>
+            <a:r>
+              <a:rPr lang="en-US" dirty="0" smtClean="0"/>
+              <a:t>Latent sources</a:t>
             </a:r>
             <a:endParaRPr lang="en-US" dirty="0"/>
           </a:p>
@@ -6762,7 +6877,7 @@
     </p:spTree>
     <p:extLst>
       <p:ext uri="{BB962C8B-B14F-4D97-AF65-F5344CB8AC3E}">
-        <p14:creationId xmlns:p14="http://schemas.microsoft.com/office/powerpoint/2010/main" val="2161218610"/>
+        <p14:creationId xmlns:p14="http://schemas.microsoft.com/office/powerpoint/2010/main" val="3691841903"/>
       </p:ext>
     </p:extLst>
   </p:cSld>
@@ -6770,13 +6885,6 @@
     <a:masterClrMapping/>
   </p:clrMapOvr>
   <p:transition xmlns:p14="http://schemas.microsoft.com/office/powerpoint/2010/main"/>
-  <p:timing>
-    <p:tnLst>
-      <p:par>
-        <p:cTn xmlns:p14="http://schemas.microsoft.com/office/powerpoint/2010/main" id="1" dur="indefinite" restart="never" nodeType="tmRoot"/>
-      </p:par>
-    </p:tnLst>
-  </p:timing>
 </p:sld>
 </file>
 
@@ -6807,19 +6915,14 @@
             <p:ph type="title"/>
           </p:nvPr>
         </p:nvSpPr>
-        <p:spPr>
-          <a:xfrm>
-            <a:off x="813768" y="988368"/>
-            <a:ext cx="11049000" cy="1054100"/>
-          </a:xfrm>
-        </p:spPr>
+        <p:spPr/>
         <p:txBody>
           <a:bodyPr/>
           <a:lstStyle/>
           <a:p>
             <a:r>
               <a:rPr lang="en-US" dirty="0" smtClean="0"/>
-              <a:t>Data acquisition</a:t>
+              <a:t>Methods</a:t>
             </a:r>
             <a:endParaRPr lang="en-US" dirty="0"/>
           </a:p>
@@ -6842,34 +6945,13 @@
           <a:p>
             <a:r>
               <a:rPr lang="en-US" dirty="0" smtClean="0"/>
-              <a:t>6 subjects</a:t>
+              <a:t>PC (implement ourselves)</a:t>
             </a:r>
           </a:p>
           <a:p>
             <a:r>
               <a:rPr lang="en-US" dirty="0" smtClean="0"/>
-              <a:t>fMRI and DTI data</a:t>
-            </a:r>
-          </a:p>
-          <a:p>
-            <a:r>
-              <a:rPr lang="en-US" dirty="0" smtClean="0"/>
-              <a:t>Structural data and voxel time-series</a:t>
-            </a:r>
-          </a:p>
-          <a:p>
-            <a:r>
-              <a:rPr lang="en-US" dirty="0" smtClean="0"/>
-              <a:t>114 voxels</a:t>
-            </a:r>
-          </a:p>
-          <a:p>
-            <a:endParaRPr lang="en-US" dirty="0"/>
-          </a:p>
-          <a:p>
-            <a:r>
-              <a:rPr lang="en-US" dirty="0" smtClean="0"/>
-              <a:t>Data is already available</a:t>
+              <a:t>BCCD (implementation available)</a:t>
             </a:r>
             <a:endParaRPr lang="en-US" dirty="0"/>
           </a:p>
@@ -6878,7 +6960,7 @@
     </p:spTree>
     <p:extLst>
       <p:ext uri="{BB962C8B-B14F-4D97-AF65-F5344CB8AC3E}">
-        <p14:creationId xmlns:p14="http://schemas.microsoft.com/office/powerpoint/2010/main" val="2122703585"/>
+        <p14:creationId xmlns:p14="http://schemas.microsoft.com/office/powerpoint/2010/main" val="2161218610"/>
       </p:ext>
     </p:extLst>
   </p:cSld>
@@ -6886,6 +6968,13 @@
     <a:masterClrMapping/>
   </p:clrMapOvr>
   <p:transition xmlns:p14="http://schemas.microsoft.com/office/powerpoint/2010/main"/>
+  <p:timing>
+    <p:tnLst>
+      <p:par>
+        <p:cTn xmlns:p14="http://schemas.microsoft.com/office/powerpoint/2010/main" id="1" dur="indefinite" restart="never" nodeType="tmRoot"/>
+      </p:par>
+    </p:tnLst>
+  </p:timing>
 </p:sld>
 </file>
 

</xml_diff>

<commit_message>
enkele details aan slides toegevoegd
</commit_message>
<xml_diff>
--- a/docs/proposal presentation/Proposal presentation.pptx
+++ b/docs/proposal presentation/Proposal presentation.pptx
@@ -273,7 +273,7 @@
               <a:pPr>
                 <a:defRPr/>
               </a:pPr>
-              <a:t>9/30/13</a:t>
+              <a:t>1-10-2013</a:t>
             </a:fld>
             <a:endParaRPr lang="nl-NL"/>
           </a:p>
@@ -375,7 +375,7 @@
     </p:spTree>
     <p:extLst>
       <p:ext uri="{BB962C8B-B14F-4D97-AF65-F5344CB8AC3E}">
-        <p14:creationId xmlns:p14="http://schemas.microsoft.com/office/powerpoint/2010/main" val="91630567"/>
+        <p14:creationId xmlns:p14="http://schemas.microsoft.com/office/powerpoint/2010/main" xmlns="" val="91630567"/>
       </p:ext>
     </p:extLst>
   </p:cSld>
@@ -493,7 +493,7 @@
               <a:pPr>
                 <a:defRPr/>
               </a:pPr>
-              <a:t>9/30/13</a:t>
+              <a:t>1-10-2013</a:t>
             </a:fld>
             <a:endParaRPr lang="nl-NL"/>
           </a:p>
@@ -697,7 +697,7 @@
     </p:spTree>
     <p:extLst>
       <p:ext uri="{BB962C8B-B14F-4D97-AF65-F5344CB8AC3E}">
-        <p14:creationId xmlns:p14="http://schemas.microsoft.com/office/powerpoint/2010/main" val="1528357099"/>
+        <p14:creationId xmlns:p14="http://schemas.microsoft.com/office/powerpoint/2010/main" xmlns="" val="1528357099"/>
       </p:ext>
     </p:extLst>
   </p:cSld>
@@ -1201,7 +1201,7 @@
   <p:clrMapOvr>
     <a:masterClrMapping/>
   </p:clrMapOvr>
-  <p:transition xmlns:p14="http://schemas.microsoft.com/office/powerpoint/2010/main"/>
+  <p:transition/>
 </p:sldLayout>
 </file>
 
@@ -1432,7 +1432,7 @@
   <p:clrMapOvr>
     <a:masterClrMapping/>
   </p:clrMapOvr>
-  <p:transition xmlns:p14="http://schemas.microsoft.com/office/powerpoint/2010/main"/>
+  <p:transition/>
 </p:sldLayout>
 </file>
 
@@ -1653,7 +1653,7 @@
   <p:clrMapOvr>
     <a:masterClrMapping/>
   </p:clrMapOvr>
-  <p:transition xmlns:p14="http://schemas.microsoft.com/office/powerpoint/2010/main"/>
+  <p:transition/>
 </p:sldLayout>
 </file>
 
@@ -1793,7 +1793,7 @@
   <p:clrMapOvr>
     <a:masterClrMapping/>
   </p:clrMapOvr>
-  <p:transition xmlns:p14="http://schemas.microsoft.com/office/powerpoint/2010/main"/>
+  <p:transition/>
 </p:sldLayout>
 </file>
 
@@ -2152,7 +2152,7 @@
   <p:clrMapOvr>
     <a:masterClrMapping/>
   </p:clrMapOvr>
-  <p:transition xmlns:p14="http://schemas.microsoft.com/office/powerpoint/2010/main"/>
+  <p:transition/>
 </p:sldLayout>
 </file>
 
@@ -2386,7 +2386,7 @@
   <p:clrMapOvr>
     <a:masterClrMapping/>
   </p:clrMapOvr>
-  <p:transition xmlns:p14="http://schemas.microsoft.com/office/powerpoint/2010/main"/>
+  <p:transition/>
 </p:sldLayout>
 </file>
 
@@ -2538,7 +2538,7 @@
   <p:clrMapOvr>
     <a:masterClrMapping/>
   </p:clrMapOvr>
-  <p:transition xmlns:p14="http://schemas.microsoft.com/office/powerpoint/2010/main"/>
+  <p:transition/>
 </p:sldLayout>
 </file>
 
@@ -2941,7 +2941,7 @@
   <p:clrMapOvr>
     <a:masterClrMapping/>
   </p:clrMapOvr>
-  <p:transition xmlns:p14="http://schemas.microsoft.com/office/powerpoint/2010/main"/>
+  <p:transition/>
 </p:sldLayout>
 </file>
 
@@ -3333,7 +3333,7 @@
   <p:clrMapOvr>
     <a:masterClrMapping/>
   </p:clrMapOvr>
-  <p:transition xmlns:p14="http://schemas.microsoft.com/office/powerpoint/2010/main"/>
+  <p:transition/>
 </p:sldLayout>
 </file>
 
@@ -3469,7 +3469,7 @@
   <p:clrMapOvr>
     <a:masterClrMapping/>
   </p:clrMapOvr>
-  <p:transition xmlns:p14="http://schemas.microsoft.com/office/powerpoint/2010/main"/>
+  <p:transition/>
 </p:sldLayout>
 </file>
 
@@ -3604,7 +3604,7 @@
   <p:clrMapOvr>
     <a:masterClrMapping/>
   </p:clrMapOvr>
-  <p:transition xmlns:p14="http://schemas.microsoft.com/office/powerpoint/2010/main"/>
+  <p:transition/>
 </p:sldLayout>
 </file>
 
@@ -3745,7 +3745,7 @@
   <p:clrMapOvr>
     <a:masterClrMapping/>
   </p:clrMapOvr>
-  <p:transition xmlns:p14="http://schemas.microsoft.com/office/powerpoint/2010/main"/>
+  <p:transition/>
 </p:sldLayout>
 </file>
 
@@ -3885,7 +3885,7 @@
   <p:clrMapOvr>
     <a:masterClrMapping/>
   </p:clrMapOvr>
-  <p:transition xmlns:p14="http://schemas.microsoft.com/office/powerpoint/2010/main"/>
+  <p:transition/>
 </p:sldLayout>
 </file>
 
@@ -4117,7 +4117,7 @@
   <p:clrMapOvr>
     <a:masterClrMapping/>
   </p:clrMapOvr>
-  <p:transition xmlns:p14="http://schemas.microsoft.com/office/powerpoint/2010/main"/>
+  <p:transition/>
 </p:sldLayout>
 </file>
 
@@ -4361,11 +4361,11 @@
     <p:sldLayoutId id="2147483664" r:id="rId3"/>
     <p:sldLayoutId id="2147483665" r:id="rId4"/>
   </p:sldLayoutIdLst>
-  <p:transition xmlns:p14="http://schemas.microsoft.com/office/powerpoint/2010/main"/>
+  <p:transition/>
   <p:timing>
     <p:tnLst>
       <p:par>
-        <p:cTn xmlns:p14="http://schemas.microsoft.com/office/powerpoint/2010/main" id="1" dur="indefinite" restart="never" nodeType="tmRoot"/>
+        <p:cTn id="1" dur="indefinite" restart="never" nodeType="tmRoot"/>
       </p:par>
     </p:tnLst>
   </p:timing>
@@ -5030,11 +5030,11 @@
     <p:sldLayoutId id="2147483674" r:id="rId9"/>
     <p:sldLayoutId id="2147483675" r:id="rId10"/>
   </p:sldLayoutIdLst>
-  <p:transition xmlns:p14="http://schemas.microsoft.com/office/powerpoint/2010/main"/>
+  <p:transition/>
   <p:timing>
     <p:tnLst>
       <p:par>
-        <p:cTn xmlns:p14="http://schemas.microsoft.com/office/powerpoint/2010/main" id="1" dur="indefinite" restart="never" nodeType="tmRoot"/>
+        <p:cTn id="1" dur="indefinite" restart="never" nodeType="tmRoot"/>
       </p:par>
     </p:tnLst>
   </p:timing>
@@ -5685,11 +5685,11 @@
   <p:clrMapOvr>
     <a:masterClrMapping/>
   </p:clrMapOvr>
-  <p:transition xmlns:p14="http://schemas.microsoft.com/office/powerpoint/2010/main"/>
+  <p:transition/>
   <p:timing>
     <p:tnLst>
       <p:par>
-        <p:cTn xmlns:p14="http://schemas.microsoft.com/office/powerpoint/2010/main" id="1" dur="indefinite" restart="never" nodeType="tmRoot"/>
+        <p:cTn id="1" dur="indefinite" restart="never" nodeType="tmRoot"/>
       </p:par>
     </p:tnLst>
   </p:timing>
@@ -5794,14 +5794,14 @@
     </p:spTree>
     <p:extLst>
       <p:ext uri="{BB962C8B-B14F-4D97-AF65-F5344CB8AC3E}">
-        <p14:creationId xmlns:p14="http://schemas.microsoft.com/office/powerpoint/2010/main" val="2122703585"/>
+        <p14:creationId xmlns:p14="http://schemas.microsoft.com/office/powerpoint/2010/main" xmlns="" val="2122703585"/>
       </p:ext>
     </p:extLst>
   </p:cSld>
   <p:clrMapOvr>
     <a:masterClrMapping/>
   </p:clrMapOvr>
-  <p:transition xmlns:p14="http://schemas.microsoft.com/office/powerpoint/2010/main"/>
+  <p:transition/>
 </p:sld>
 </file>
 
@@ -5845,40 +5845,2083 @@
           </a:p>
         </p:txBody>
       </p:sp>
-      <p:sp>
-        <p:nvSpPr>
-          <p:cNvPr id="3" name="Content Placeholder 2"/>
-          <p:cNvSpPr>
-            <a:spLocks noGrp="1"/>
-          </p:cNvSpPr>
-          <p:nvPr>
-            <p:ph idx="1"/>
-          </p:nvPr>
-        </p:nvSpPr>
-        <p:spPr/>
-        <p:txBody>
-          <a:bodyPr/>
-          <a:lstStyle/>
-          <a:p>
-            <a:r>
-              <a:rPr lang="en-US" dirty="0" smtClean="0"/>
-              <a:t>Add timeline figure here</a:t>
-            </a:r>
-            <a:endParaRPr lang="en-US" dirty="0"/>
-          </a:p>
-        </p:txBody>
-      </p:sp>
+      <p:graphicFrame>
+        <p:nvGraphicFramePr>
+          <p:cNvPr id="6" name="Table 5"/>
+          <p:cNvGraphicFramePr>
+            <a:graphicFrameLocks noGrp="1"/>
+          </p:cNvGraphicFramePr>
+          <p:nvPr/>
+        </p:nvGraphicFramePr>
+        <p:xfrm>
+          <a:off x="957783" y="1996480"/>
+          <a:ext cx="11161240" cy="1854200"/>
+        </p:xfrm>
+        <a:graphic>
+          <a:graphicData uri="http://schemas.openxmlformats.org/drawingml/2006/table">
+            <a:tbl>
+              <a:tblPr firstRow="1" bandRow="1">
+                <a:tableStyleId>{21E4AEA4-8DFA-4A89-87EB-49C32662AFE0}</a:tableStyleId>
+              </a:tblPr>
+              <a:tblGrid>
+                <a:gridCol w="1334770"/>
+                <a:gridCol w="982647"/>
+                <a:gridCol w="982647"/>
+                <a:gridCol w="982647"/>
+                <a:gridCol w="757850"/>
+                <a:gridCol w="1207444"/>
+                <a:gridCol w="880788"/>
+                <a:gridCol w="1224136"/>
+                <a:gridCol w="843017"/>
+                <a:gridCol w="982647"/>
+                <a:gridCol w="982647"/>
+              </a:tblGrid>
+              <a:tr h="370840">
+                <a:tc>
+                  <a:txBody>
+                    <a:bodyPr/>
+                    <a:lstStyle/>
+                    <a:p>
+                      <a:pPr algn="ctr"/>
+                      <a:r>
+                        <a:rPr lang="en-US" dirty="0" smtClean="0"/>
+                        <a:t>Week</a:t>
+                      </a:r>
+                      <a:endParaRPr lang="en-US" dirty="0"/>
+                    </a:p>
+                  </a:txBody>
+                  <a:tcPr>
+                    <a:lnB w="12700" cap="flat" cmpd="sng" algn="ctr">
+                      <a:solidFill>
+                        <a:schemeClr val="tx1"/>
+                      </a:solidFill>
+                      <a:prstDash val="solid"/>
+                      <a:round/>
+                      <a:headEnd type="none" w="med" len="med"/>
+                      <a:tailEnd type="none" w="med" len="med"/>
+                    </a:lnB>
+                  </a:tcPr>
+                </a:tc>
+                <a:tc>
+                  <a:txBody>
+                    <a:bodyPr/>
+                    <a:lstStyle/>
+                    <a:p>
+                      <a:pPr algn="ctr"/>
+                      <a:r>
+                        <a:rPr lang="en-US" dirty="0" smtClean="0"/>
+                        <a:t>41</a:t>
+                      </a:r>
+                      <a:endParaRPr lang="en-US" dirty="0"/>
+                    </a:p>
+                  </a:txBody>
+                  <a:tcPr>
+                    <a:lnB w="12700" cap="flat" cmpd="sng" algn="ctr">
+                      <a:solidFill>
+                        <a:schemeClr val="tx1"/>
+                      </a:solidFill>
+                      <a:prstDash val="solid"/>
+                      <a:round/>
+                      <a:headEnd type="none" w="med" len="med"/>
+                      <a:tailEnd type="none" w="med" len="med"/>
+                    </a:lnB>
+                  </a:tcPr>
+                </a:tc>
+                <a:tc>
+                  <a:txBody>
+                    <a:bodyPr/>
+                    <a:lstStyle/>
+                    <a:p>
+                      <a:pPr algn="ctr"/>
+                      <a:r>
+                        <a:rPr lang="en-US" dirty="0" smtClean="0"/>
+                        <a:t>42</a:t>
+                      </a:r>
+                      <a:endParaRPr lang="en-US" dirty="0"/>
+                    </a:p>
+                  </a:txBody>
+                  <a:tcPr>
+                    <a:lnB w="12700" cap="flat" cmpd="sng" algn="ctr">
+                      <a:solidFill>
+                        <a:schemeClr val="tx1"/>
+                      </a:solidFill>
+                      <a:prstDash val="solid"/>
+                      <a:round/>
+                      <a:headEnd type="none" w="med" len="med"/>
+                      <a:tailEnd type="none" w="med" len="med"/>
+                    </a:lnB>
+                  </a:tcPr>
+                </a:tc>
+                <a:tc>
+                  <a:txBody>
+                    <a:bodyPr/>
+                    <a:lstStyle/>
+                    <a:p>
+                      <a:pPr algn="ctr"/>
+                      <a:r>
+                        <a:rPr lang="en-US" dirty="0" smtClean="0"/>
+                        <a:t>43</a:t>
+                      </a:r>
+                      <a:endParaRPr lang="en-US" dirty="0"/>
+                    </a:p>
+                  </a:txBody>
+                  <a:tcPr>
+                    <a:lnB w="12700" cap="flat" cmpd="sng" algn="ctr">
+                      <a:solidFill>
+                        <a:schemeClr val="tx1"/>
+                      </a:solidFill>
+                      <a:prstDash val="solid"/>
+                      <a:round/>
+                      <a:headEnd type="none" w="med" len="med"/>
+                      <a:tailEnd type="none" w="med" len="med"/>
+                    </a:lnB>
+                  </a:tcPr>
+                </a:tc>
+                <a:tc>
+                  <a:txBody>
+                    <a:bodyPr/>
+                    <a:lstStyle/>
+                    <a:p>
+                      <a:pPr algn="ctr"/>
+                      <a:r>
+                        <a:rPr lang="en-US" dirty="0" smtClean="0"/>
+                        <a:t>44</a:t>
+                      </a:r>
+                      <a:endParaRPr lang="en-US" dirty="0"/>
+                    </a:p>
+                  </a:txBody>
+                  <a:tcPr>
+                    <a:lnB w="12700" cap="flat" cmpd="sng" algn="ctr">
+                      <a:solidFill>
+                        <a:schemeClr val="tx1"/>
+                      </a:solidFill>
+                      <a:prstDash val="solid"/>
+                      <a:round/>
+                      <a:headEnd type="none" w="med" len="med"/>
+                      <a:tailEnd type="none" w="med" len="med"/>
+                    </a:lnB>
+                  </a:tcPr>
+                </a:tc>
+                <a:tc>
+                  <a:txBody>
+                    <a:bodyPr/>
+                    <a:lstStyle/>
+                    <a:p>
+                      <a:pPr algn="ctr"/>
+                      <a:r>
+                        <a:rPr lang="en-US" dirty="0" smtClean="0"/>
+                        <a:t>45</a:t>
+                      </a:r>
+                      <a:endParaRPr lang="en-US" dirty="0"/>
+                    </a:p>
+                  </a:txBody>
+                  <a:tcPr>
+                    <a:lnB w="12700" cap="flat" cmpd="sng" algn="ctr">
+                      <a:solidFill>
+                        <a:schemeClr val="tx1"/>
+                      </a:solidFill>
+                      <a:prstDash val="solid"/>
+                      <a:round/>
+                      <a:headEnd type="none" w="med" len="med"/>
+                      <a:tailEnd type="none" w="med" len="med"/>
+                    </a:lnB>
+                  </a:tcPr>
+                </a:tc>
+                <a:tc>
+                  <a:txBody>
+                    <a:bodyPr/>
+                    <a:lstStyle/>
+                    <a:p>
+                      <a:pPr algn="ctr"/>
+                      <a:r>
+                        <a:rPr lang="en-US" dirty="0" smtClean="0"/>
+                        <a:t>46</a:t>
+                      </a:r>
+                      <a:endParaRPr lang="en-US" dirty="0"/>
+                    </a:p>
+                  </a:txBody>
+                  <a:tcPr>
+                    <a:lnB w="12700" cap="flat" cmpd="sng" algn="ctr">
+                      <a:solidFill>
+                        <a:schemeClr val="tx1"/>
+                      </a:solidFill>
+                      <a:prstDash val="solid"/>
+                      <a:round/>
+                      <a:headEnd type="none" w="med" len="med"/>
+                      <a:tailEnd type="none" w="med" len="med"/>
+                    </a:lnB>
+                  </a:tcPr>
+                </a:tc>
+                <a:tc>
+                  <a:txBody>
+                    <a:bodyPr/>
+                    <a:lstStyle/>
+                    <a:p>
+                      <a:pPr algn="ctr"/>
+                      <a:r>
+                        <a:rPr lang="en-US" dirty="0" smtClean="0"/>
+                        <a:t>47</a:t>
+                      </a:r>
+                      <a:endParaRPr lang="en-US" dirty="0"/>
+                    </a:p>
+                  </a:txBody>
+                  <a:tcPr>
+                    <a:lnB w="12700" cap="flat" cmpd="sng" algn="ctr">
+                      <a:solidFill>
+                        <a:schemeClr val="tx1"/>
+                      </a:solidFill>
+                      <a:prstDash val="solid"/>
+                      <a:round/>
+                      <a:headEnd type="none" w="med" len="med"/>
+                      <a:tailEnd type="none" w="med" len="med"/>
+                    </a:lnB>
+                  </a:tcPr>
+                </a:tc>
+                <a:tc>
+                  <a:txBody>
+                    <a:bodyPr/>
+                    <a:lstStyle/>
+                    <a:p>
+                      <a:pPr algn="ctr"/>
+                      <a:r>
+                        <a:rPr lang="en-US" dirty="0" smtClean="0"/>
+                        <a:t>48</a:t>
+                      </a:r>
+                      <a:endParaRPr lang="en-US" dirty="0"/>
+                    </a:p>
+                  </a:txBody>
+                  <a:tcPr>
+                    <a:lnB w="12700" cap="flat" cmpd="sng" algn="ctr">
+                      <a:solidFill>
+                        <a:schemeClr val="tx1"/>
+                      </a:solidFill>
+                      <a:prstDash val="solid"/>
+                      <a:round/>
+                      <a:headEnd type="none" w="med" len="med"/>
+                      <a:tailEnd type="none" w="med" len="med"/>
+                    </a:lnB>
+                  </a:tcPr>
+                </a:tc>
+                <a:tc>
+                  <a:txBody>
+                    <a:bodyPr/>
+                    <a:lstStyle/>
+                    <a:p>
+                      <a:pPr algn="ctr"/>
+                      <a:r>
+                        <a:rPr lang="en-US" dirty="0" smtClean="0"/>
+                        <a:t>49</a:t>
+                      </a:r>
+                      <a:endParaRPr lang="en-US" dirty="0"/>
+                    </a:p>
+                  </a:txBody>
+                  <a:tcPr>
+                    <a:lnB w="12700" cap="flat" cmpd="sng" algn="ctr">
+                      <a:solidFill>
+                        <a:schemeClr val="tx1"/>
+                      </a:solidFill>
+                      <a:prstDash val="solid"/>
+                      <a:round/>
+                      <a:headEnd type="none" w="med" len="med"/>
+                      <a:tailEnd type="none" w="med" len="med"/>
+                    </a:lnB>
+                  </a:tcPr>
+                </a:tc>
+                <a:tc>
+                  <a:txBody>
+                    <a:bodyPr/>
+                    <a:lstStyle/>
+                    <a:p>
+                      <a:pPr algn="ctr"/>
+                      <a:r>
+                        <a:rPr lang="en-US" dirty="0" smtClean="0"/>
+                        <a:t>50</a:t>
+                      </a:r>
+                      <a:endParaRPr lang="en-US" dirty="0"/>
+                    </a:p>
+                  </a:txBody>
+                  <a:tcPr>
+                    <a:lnB w="12700" cap="flat" cmpd="sng" algn="ctr">
+                      <a:solidFill>
+                        <a:schemeClr val="tx1"/>
+                      </a:solidFill>
+                      <a:prstDash val="solid"/>
+                      <a:round/>
+                      <a:headEnd type="none" w="med" len="med"/>
+                      <a:tailEnd type="none" w="med" len="med"/>
+                    </a:lnB>
+                  </a:tcPr>
+                </a:tc>
+              </a:tr>
+              <a:tr h="370840">
+                <a:tc>
+                  <a:txBody>
+                    <a:bodyPr/>
+                    <a:lstStyle/>
+                    <a:p>
+                      <a:r>
+                        <a:rPr lang="en-US" dirty="0" smtClean="0"/>
+                        <a:t>PC</a:t>
+                      </a:r>
+                      <a:endParaRPr lang="en-US" dirty="0"/>
+                    </a:p>
+                  </a:txBody>
+                  <a:tcPr>
+                    <a:lnL w="12700" cap="flat" cmpd="sng" algn="ctr">
+                      <a:solidFill>
+                        <a:schemeClr val="tx1"/>
+                      </a:solidFill>
+                      <a:prstDash val="solid"/>
+                      <a:round/>
+                      <a:headEnd type="none" w="med" len="med"/>
+                      <a:tailEnd type="none" w="med" len="med"/>
+                    </a:lnL>
+                    <a:lnR w="12700" cap="flat" cmpd="sng" algn="ctr">
+                      <a:solidFill>
+                        <a:schemeClr val="tx1"/>
+                      </a:solidFill>
+                      <a:prstDash val="solid"/>
+                      <a:round/>
+                      <a:headEnd type="none" w="med" len="med"/>
+                      <a:tailEnd type="none" w="med" len="med"/>
+                    </a:lnR>
+                    <a:lnT w="12700" cap="flat" cmpd="sng" algn="ctr">
+                      <a:solidFill>
+                        <a:schemeClr val="tx1"/>
+                      </a:solidFill>
+                      <a:prstDash val="solid"/>
+                      <a:round/>
+                      <a:headEnd type="none" w="med" len="med"/>
+                      <a:tailEnd type="none" w="med" len="med"/>
+                    </a:lnT>
+                    <a:lnB w="12700" cap="flat" cmpd="sng" algn="ctr">
+                      <a:solidFill>
+                        <a:schemeClr val="tx1"/>
+                      </a:solidFill>
+                      <a:prstDash val="solid"/>
+                      <a:round/>
+                      <a:headEnd type="none" w="med" len="med"/>
+                      <a:tailEnd type="none" w="med" len="med"/>
+                    </a:lnB>
+                  </a:tcPr>
+                </a:tc>
+                <a:tc gridSpan="2">
+                  <a:txBody>
+                    <a:bodyPr/>
+                    <a:lstStyle/>
+                    <a:p>
+                      <a:pPr algn="ctr"/>
+                      <a:r>
+                        <a:rPr lang="en-US" dirty="0" smtClean="0"/>
+                        <a:t>implement</a:t>
+                      </a:r>
+                      <a:endParaRPr lang="en-US" dirty="0"/>
+                    </a:p>
+                  </a:txBody>
+                  <a:tcPr>
+                    <a:lnL w="12700" cap="flat" cmpd="sng" algn="ctr">
+                      <a:solidFill>
+                        <a:schemeClr val="tx1"/>
+                      </a:solidFill>
+                      <a:prstDash val="solid"/>
+                      <a:round/>
+                      <a:headEnd type="none" w="med" len="med"/>
+                      <a:tailEnd type="none" w="med" len="med"/>
+                    </a:lnL>
+                    <a:lnR w="12700" cap="flat" cmpd="sng" algn="ctr">
+                      <a:solidFill>
+                        <a:schemeClr val="tx1"/>
+                      </a:solidFill>
+                      <a:prstDash val="solid"/>
+                      <a:round/>
+                      <a:headEnd type="none" w="med" len="med"/>
+                      <a:tailEnd type="none" w="med" len="med"/>
+                    </a:lnR>
+                    <a:lnT w="12700" cap="flat" cmpd="sng" algn="ctr">
+                      <a:solidFill>
+                        <a:schemeClr val="tx1"/>
+                      </a:solidFill>
+                      <a:prstDash val="solid"/>
+                      <a:round/>
+                      <a:headEnd type="none" w="med" len="med"/>
+                      <a:tailEnd type="none" w="med" len="med"/>
+                    </a:lnT>
+                    <a:lnB w="12700" cap="flat" cmpd="sng" algn="ctr">
+                      <a:solidFill>
+                        <a:schemeClr val="tx1"/>
+                      </a:solidFill>
+                      <a:prstDash val="solid"/>
+                      <a:round/>
+                      <a:headEnd type="none" w="med" len="med"/>
+                      <a:tailEnd type="none" w="med" len="med"/>
+                    </a:lnB>
+                  </a:tcPr>
+                </a:tc>
+                <a:tc hMerge="1">
+                  <a:txBody>
+                    <a:bodyPr/>
+                    <a:lstStyle/>
+                    <a:p>
+                      <a:endParaRPr lang="en-US" dirty="0"/>
+                    </a:p>
+                  </a:txBody>
+                  <a:tcPr/>
+                </a:tc>
+                <a:tc gridSpan="2">
+                  <a:txBody>
+                    <a:bodyPr/>
+                    <a:lstStyle/>
+                    <a:p>
+                      <a:pPr algn="ctr"/>
+                      <a:r>
+                        <a:rPr lang="en-US" dirty="0" smtClean="0"/>
+                        <a:t>structural</a:t>
+                      </a:r>
+                      <a:endParaRPr lang="en-US" dirty="0"/>
+                    </a:p>
+                  </a:txBody>
+                  <a:tcPr>
+                    <a:lnL w="12700" cap="flat" cmpd="sng" algn="ctr">
+                      <a:solidFill>
+                        <a:schemeClr val="tx1"/>
+                      </a:solidFill>
+                      <a:prstDash val="solid"/>
+                      <a:round/>
+                      <a:headEnd type="none" w="med" len="med"/>
+                      <a:tailEnd type="none" w="med" len="med"/>
+                    </a:lnL>
+                    <a:lnR w="12700" cap="flat" cmpd="sng" algn="ctr">
+                      <a:solidFill>
+                        <a:schemeClr val="tx1"/>
+                      </a:solidFill>
+                      <a:prstDash val="solid"/>
+                      <a:round/>
+                      <a:headEnd type="none" w="med" len="med"/>
+                      <a:tailEnd type="none" w="med" len="med"/>
+                    </a:lnR>
+                    <a:lnT w="12700" cap="flat" cmpd="sng" algn="ctr">
+                      <a:solidFill>
+                        <a:schemeClr val="tx1"/>
+                      </a:solidFill>
+                      <a:prstDash val="solid"/>
+                      <a:round/>
+                      <a:headEnd type="none" w="med" len="med"/>
+                      <a:tailEnd type="none" w="med" len="med"/>
+                    </a:lnT>
+                    <a:lnB w="12700" cap="flat" cmpd="sng" algn="ctr">
+                      <a:solidFill>
+                        <a:schemeClr val="tx1"/>
+                      </a:solidFill>
+                      <a:prstDash val="solid"/>
+                      <a:round/>
+                      <a:headEnd type="none" w="med" len="med"/>
+                      <a:tailEnd type="none" w="med" len="med"/>
+                    </a:lnB>
+                  </a:tcPr>
+                </a:tc>
+                <a:tc hMerge="1">
+                  <a:txBody>
+                    <a:bodyPr/>
+                    <a:lstStyle/>
+                    <a:p>
+                      <a:endParaRPr lang="en-US" dirty="0"/>
+                    </a:p>
+                  </a:txBody>
+                  <a:tcPr/>
+                </a:tc>
+                <a:tc>
+                  <a:txBody>
+                    <a:bodyPr/>
+                    <a:lstStyle/>
+                    <a:p>
+                      <a:pPr algn="ctr"/>
+                      <a:r>
+                        <a:rPr lang="en-US" dirty="0" smtClean="0"/>
+                        <a:t>functional</a:t>
+                      </a:r>
+                      <a:endParaRPr lang="en-US" dirty="0"/>
+                    </a:p>
+                  </a:txBody>
+                  <a:tcPr>
+                    <a:lnL w="12700" cap="flat" cmpd="sng" algn="ctr">
+                      <a:solidFill>
+                        <a:schemeClr val="tx1"/>
+                      </a:solidFill>
+                      <a:prstDash val="solid"/>
+                      <a:round/>
+                      <a:headEnd type="none" w="med" len="med"/>
+                      <a:tailEnd type="none" w="med" len="med"/>
+                    </a:lnL>
+                    <a:lnR w="12700" cap="flat" cmpd="sng" algn="ctr">
+                      <a:solidFill>
+                        <a:schemeClr val="tx1"/>
+                      </a:solidFill>
+                      <a:prstDash val="solid"/>
+                      <a:round/>
+                      <a:headEnd type="none" w="med" len="med"/>
+                      <a:tailEnd type="none" w="med" len="med"/>
+                    </a:lnR>
+                    <a:lnT w="12700" cap="flat" cmpd="sng" algn="ctr">
+                      <a:solidFill>
+                        <a:schemeClr val="tx1"/>
+                      </a:solidFill>
+                      <a:prstDash val="solid"/>
+                      <a:round/>
+                      <a:headEnd type="none" w="med" len="med"/>
+                      <a:tailEnd type="none" w="med" len="med"/>
+                    </a:lnT>
+                    <a:lnB w="12700" cap="flat" cmpd="sng" algn="ctr">
+                      <a:solidFill>
+                        <a:schemeClr val="tx1"/>
+                      </a:solidFill>
+                      <a:prstDash val="solid"/>
+                      <a:round/>
+                      <a:headEnd type="none" w="med" len="med"/>
+                      <a:tailEnd type="none" w="med" len="med"/>
+                    </a:lnB>
+                  </a:tcPr>
+                </a:tc>
+                <a:tc>
+                  <a:txBody>
+                    <a:bodyPr/>
+                    <a:lstStyle/>
+                    <a:p>
+                      <a:pPr algn="ctr"/>
+                      <a:endParaRPr lang="en-US" dirty="0"/>
+                    </a:p>
+                  </a:txBody>
+                  <a:tcPr>
+                    <a:lnL w="12700" cap="flat" cmpd="sng" algn="ctr">
+                      <a:solidFill>
+                        <a:schemeClr val="tx1"/>
+                      </a:solidFill>
+                      <a:prstDash val="solid"/>
+                      <a:round/>
+                      <a:headEnd type="none" w="med" len="med"/>
+                      <a:tailEnd type="none" w="med" len="med"/>
+                    </a:lnL>
+                    <a:lnR w="12700" cap="flat" cmpd="sng" algn="ctr">
+                      <a:solidFill>
+                        <a:schemeClr val="tx1"/>
+                      </a:solidFill>
+                      <a:prstDash val="solid"/>
+                      <a:round/>
+                      <a:headEnd type="none" w="med" len="med"/>
+                      <a:tailEnd type="none" w="med" len="med"/>
+                    </a:lnR>
+                    <a:lnT w="12700" cap="flat" cmpd="sng" algn="ctr">
+                      <a:solidFill>
+                        <a:schemeClr val="tx1"/>
+                      </a:solidFill>
+                      <a:prstDash val="solid"/>
+                      <a:round/>
+                      <a:headEnd type="none" w="med" len="med"/>
+                      <a:tailEnd type="none" w="med" len="med"/>
+                    </a:lnT>
+                    <a:lnB w="12700" cap="flat" cmpd="sng" algn="ctr">
+                      <a:solidFill>
+                        <a:schemeClr val="tx1"/>
+                      </a:solidFill>
+                      <a:prstDash val="solid"/>
+                      <a:round/>
+                      <a:headEnd type="none" w="med" len="med"/>
+                      <a:tailEnd type="none" w="med" len="med"/>
+                    </a:lnB>
+                  </a:tcPr>
+                </a:tc>
+                <a:tc>
+                  <a:txBody>
+                    <a:bodyPr/>
+                    <a:lstStyle/>
+                    <a:p>
+                      <a:pPr algn="ctr"/>
+                      <a:endParaRPr lang="en-US" dirty="0"/>
+                    </a:p>
+                  </a:txBody>
+                  <a:tcPr>
+                    <a:lnL w="12700" cap="flat" cmpd="sng" algn="ctr">
+                      <a:solidFill>
+                        <a:schemeClr val="tx1"/>
+                      </a:solidFill>
+                      <a:prstDash val="solid"/>
+                      <a:round/>
+                      <a:headEnd type="none" w="med" len="med"/>
+                      <a:tailEnd type="none" w="med" len="med"/>
+                    </a:lnL>
+                    <a:lnR w="12700" cap="flat" cmpd="sng" algn="ctr">
+                      <a:solidFill>
+                        <a:schemeClr val="tx1"/>
+                      </a:solidFill>
+                      <a:prstDash val="solid"/>
+                      <a:round/>
+                      <a:headEnd type="none" w="med" len="med"/>
+                      <a:tailEnd type="none" w="med" len="med"/>
+                    </a:lnR>
+                    <a:lnT w="12700" cap="flat" cmpd="sng" algn="ctr">
+                      <a:solidFill>
+                        <a:schemeClr val="tx1"/>
+                      </a:solidFill>
+                      <a:prstDash val="solid"/>
+                      <a:round/>
+                      <a:headEnd type="none" w="med" len="med"/>
+                      <a:tailEnd type="none" w="med" len="med"/>
+                    </a:lnT>
+                    <a:lnB w="12700" cap="flat" cmpd="sng" algn="ctr">
+                      <a:solidFill>
+                        <a:schemeClr val="tx1"/>
+                      </a:solidFill>
+                      <a:prstDash val="solid"/>
+                      <a:round/>
+                      <a:headEnd type="none" w="med" len="med"/>
+                      <a:tailEnd type="none" w="med" len="med"/>
+                    </a:lnB>
+                  </a:tcPr>
+                </a:tc>
+                <a:tc>
+                  <a:txBody>
+                    <a:bodyPr/>
+                    <a:lstStyle/>
+                    <a:p>
+                      <a:pPr algn="ctr"/>
+                      <a:endParaRPr lang="en-US" dirty="0"/>
+                    </a:p>
+                  </a:txBody>
+                  <a:tcPr>
+                    <a:lnL w="12700" cap="flat" cmpd="sng" algn="ctr">
+                      <a:solidFill>
+                        <a:schemeClr val="tx1"/>
+                      </a:solidFill>
+                      <a:prstDash val="solid"/>
+                      <a:round/>
+                      <a:headEnd type="none" w="med" len="med"/>
+                      <a:tailEnd type="none" w="med" len="med"/>
+                    </a:lnL>
+                    <a:lnR w="12700" cap="flat" cmpd="sng" algn="ctr">
+                      <a:solidFill>
+                        <a:schemeClr val="tx1"/>
+                      </a:solidFill>
+                      <a:prstDash val="solid"/>
+                      <a:round/>
+                      <a:headEnd type="none" w="med" len="med"/>
+                      <a:tailEnd type="none" w="med" len="med"/>
+                    </a:lnR>
+                    <a:lnT w="12700" cap="flat" cmpd="sng" algn="ctr">
+                      <a:solidFill>
+                        <a:schemeClr val="tx1"/>
+                      </a:solidFill>
+                      <a:prstDash val="solid"/>
+                      <a:round/>
+                      <a:headEnd type="none" w="med" len="med"/>
+                      <a:tailEnd type="none" w="med" len="med"/>
+                    </a:lnT>
+                    <a:lnB w="12700" cap="flat" cmpd="sng" algn="ctr">
+                      <a:solidFill>
+                        <a:schemeClr val="tx1"/>
+                      </a:solidFill>
+                      <a:prstDash val="solid"/>
+                      <a:round/>
+                      <a:headEnd type="none" w="med" len="med"/>
+                      <a:tailEnd type="none" w="med" len="med"/>
+                    </a:lnB>
+                  </a:tcPr>
+                </a:tc>
+                <a:tc>
+                  <a:txBody>
+                    <a:bodyPr/>
+                    <a:lstStyle/>
+                    <a:p>
+                      <a:pPr algn="ctr"/>
+                      <a:endParaRPr lang="en-US" dirty="0"/>
+                    </a:p>
+                  </a:txBody>
+                  <a:tcPr>
+                    <a:lnL w="12700" cap="flat" cmpd="sng" algn="ctr">
+                      <a:solidFill>
+                        <a:schemeClr val="tx1"/>
+                      </a:solidFill>
+                      <a:prstDash val="solid"/>
+                      <a:round/>
+                      <a:headEnd type="none" w="med" len="med"/>
+                      <a:tailEnd type="none" w="med" len="med"/>
+                    </a:lnL>
+                    <a:lnR w="12700" cap="flat" cmpd="sng" algn="ctr">
+                      <a:solidFill>
+                        <a:schemeClr val="tx1"/>
+                      </a:solidFill>
+                      <a:prstDash val="solid"/>
+                      <a:round/>
+                      <a:headEnd type="none" w="med" len="med"/>
+                      <a:tailEnd type="none" w="med" len="med"/>
+                    </a:lnR>
+                    <a:lnT w="12700" cap="flat" cmpd="sng" algn="ctr">
+                      <a:solidFill>
+                        <a:schemeClr val="tx1"/>
+                      </a:solidFill>
+                      <a:prstDash val="solid"/>
+                      <a:round/>
+                      <a:headEnd type="none" w="med" len="med"/>
+                      <a:tailEnd type="none" w="med" len="med"/>
+                    </a:lnT>
+                    <a:lnB w="12700" cap="flat" cmpd="sng" algn="ctr">
+                      <a:solidFill>
+                        <a:schemeClr val="tx1"/>
+                      </a:solidFill>
+                      <a:prstDash val="solid"/>
+                      <a:round/>
+                      <a:headEnd type="none" w="med" len="med"/>
+                      <a:tailEnd type="none" w="med" len="med"/>
+                    </a:lnB>
+                  </a:tcPr>
+                </a:tc>
+                <a:tc>
+                  <a:txBody>
+                    <a:bodyPr/>
+                    <a:lstStyle/>
+                    <a:p>
+                      <a:pPr algn="ctr"/>
+                      <a:endParaRPr lang="en-US" dirty="0"/>
+                    </a:p>
+                  </a:txBody>
+                  <a:tcPr>
+                    <a:lnL w="12700" cap="flat" cmpd="sng" algn="ctr">
+                      <a:solidFill>
+                        <a:schemeClr val="tx1"/>
+                      </a:solidFill>
+                      <a:prstDash val="solid"/>
+                      <a:round/>
+                      <a:headEnd type="none" w="med" len="med"/>
+                      <a:tailEnd type="none" w="med" len="med"/>
+                    </a:lnL>
+                    <a:lnR w="12700" cap="flat" cmpd="sng" algn="ctr">
+                      <a:solidFill>
+                        <a:schemeClr val="tx1"/>
+                      </a:solidFill>
+                      <a:prstDash val="solid"/>
+                      <a:round/>
+                      <a:headEnd type="none" w="med" len="med"/>
+                      <a:tailEnd type="none" w="med" len="med"/>
+                    </a:lnR>
+                    <a:lnT w="12700" cap="flat" cmpd="sng" algn="ctr">
+                      <a:solidFill>
+                        <a:schemeClr val="tx1"/>
+                      </a:solidFill>
+                      <a:prstDash val="solid"/>
+                      <a:round/>
+                      <a:headEnd type="none" w="med" len="med"/>
+                      <a:tailEnd type="none" w="med" len="med"/>
+                    </a:lnT>
+                    <a:lnB w="12700" cap="flat" cmpd="sng" algn="ctr">
+                      <a:solidFill>
+                        <a:schemeClr val="tx1"/>
+                      </a:solidFill>
+                      <a:prstDash val="solid"/>
+                      <a:round/>
+                      <a:headEnd type="none" w="med" len="med"/>
+                      <a:tailEnd type="none" w="med" len="med"/>
+                    </a:lnB>
+                  </a:tcPr>
+                </a:tc>
+              </a:tr>
+              <a:tr h="370840">
+                <a:tc>
+                  <a:txBody>
+                    <a:bodyPr/>
+                    <a:lstStyle/>
+                    <a:p>
+                      <a:r>
+                        <a:rPr lang="en-US" dirty="0" smtClean="0"/>
+                        <a:t>BCCD</a:t>
+                      </a:r>
+                      <a:endParaRPr lang="en-US" dirty="0"/>
+                    </a:p>
+                  </a:txBody>
+                  <a:tcPr>
+                    <a:lnL w="12700" cap="flat" cmpd="sng" algn="ctr">
+                      <a:solidFill>
+                        <a:schemeClr val="tx1"/>
+                      </a:solidFill>
+                      <a:prstDash val="solid"/>
+                      <a:round/>
+                      <a:headEnd type="none" w="med" len="med"/>
+                      <a:tailEnd type="none" w="med" len="med"/>
+                    </a:lnL>
+                    <a:lnR w="12700" cap="flat" cmpd="sng" algn="ctr">
+                      <a:solidFill>
+                        <a:schemeClr val="tx1"/>
+                      </a:solidFill>
+                      <a:prstDash val="solid"/>
+                      <a:round/>
+                      <a:headEnd type="none" w="med" len="med"/>
+                      <a:tailEnd type="none" w="med" len="med"/>
+                    </a:lnR>
+                    <a:lnT w="12700" cap="flat" cmpd="sng" algn="ctr">
+                      <a:solidFill>
+                        <a:schemeClr val="tx1"/>
+                      </a:solidFill>
+                      <a:prstDash val="solid"/>
+                      <a:round/>
+                      <a:headEnd type="none" w="med" len="med"/>
+                      <a:tailEnd type="none" w="med" len="med"/>
+                    </a:lnT>
+                    <a:lnB w="12700" cap="flat" cmpd="sng" algn="ctr">
+                      <a:solidFill>
+                        <a:schemeClr val="tx1"/>
+                      </a:solidFill>
+                      <a:prstDash val="solid"/>
+                      <a:round/>
+                      <a:headEnd type="none" w="med" len="med"/>
+                      <a:tailEnd type="none" w="med" len="med"/>
+                    </a:lnB>
+                  </a:tcPr>
+                </a:tc>
+                <a:tc>
+                  <a:txBody>
+                    <a:bodyPr/>
+                    <a:lstStyle/>
+                    <a:p>
+                      <a:pPr algn="ctr"/>
+                      <a:endParaRPr lang="en-US" dirty="0"/>
+                    </a:p>
+                  </a:txBody>
+                  <a:tcPr>
+                    <a:lnL w="12700" cap="flat" cmpd="sng" algn="ctr">
+                      <a:solidFill>
+                        <a:schemeClr val="tx1"/>
+                      </a:solidFill>
+                      <a:prstDash val="solid"/>
+                      <a:round/>
+                      <a:headEnd type="none" w="med" len="med"/>
+                      <a:tailEnd type="none" w="med" len="med"/>
+                    </a:lnL>
+                    <a:lnR w="12700" cap="flat" cmpd="sng" algn="ctr">
+                      <a:solidFill>
+                        <a:schemeClr val="tx1"/>
+                      </a:solidFill>
+                      <a:prstDash val="solid"/>
+                      <a:round/>
+                      <a:headEnd type="none" w="med" len="med"/>
+                      <a:tailEnd type="none" w="med" len="med"/>
+                    </a:lnR>
+                    <a:lnT w="12700" cap="flat" cmpd="sng" algn="ctr">
+                      <a:solidFill>
+                        <a:schemeClr val="tx1"/>
+                      </a:solidFill>
+                      <a:prstDash val="solid"/>
+                      <a:round/>
+                      <a:headEnd type="none" w="med" len="med"/>
+                      <a:tailEnd type="none" w="med" len="med"/>
+                    </a:lnT>
+                    <a:lnB w="12700" cap="flat" cmpd="sng" algn="ctr">
+                      <a:solidFill>
+                        <a:schemeClr val="tx1"/>
+                      </a:solidFill>
+                      <a:prstDash val="solid"/>
+                      <a:round/>
+                      <a:headEnd type="none" w="med" len="med"/>
+                      <a:tailEnd type="none" w="med" len="med"/>
+                    </a:lnB>
+                  </a:tcPr>
+                </a:tc>
+                <a:tc>
+                  <a:txBody>
+                    <a:bodyPr/>
+                    <a:lstStyle/>
+                    <a:p>
+                      <a:pPr algn="ctr"/>
+                      <a:endParaRPr lang="en-US" dirty="0"/>
+                    </a:p>
+                  </a:txBody>
+                  <a:tcPr>
+                    <a:lnL w="12700" cap="flat" cmpd="sng" algn="ctr">
+                      <a:solidFill>
+                        <a:schemeClr val="tx1"/>
+                      </a:solidFill>
+                      <a:prstDash val="solid"/>
+                      <a:round/>
+                      <a:headEnd type="none" w="med" len="med"/>
+                      <a:tailEnd type="none" w="med" len="med"/>
+                    </a:lnL>
+                    <a:lnR w="12700" cap="flat" cmpd="sng" algn="ctr">
+                      <a:solidFill>
+                        <a:schemeClr val="tx1"/>
+                      </a:solidFill>
+                      <a:prstDash val="solid"/>
+                      <a:round/>
+                      <a:headEnd type="none" w="med" len="med"/>
+                      <a:tailEnd type="none" w="med" len="med"/>
+                    </a:lnR>
+                    <a:lnT w="12700" cap="flat" cmpd="sng" algn="ctr">
+                      <a:solidFill>
+                        <a:schemeClr val="tx1"/>
+                      </a:solidFill>
+                      <a:prstDash val="solid"/>
+                      <a:round/>
+                      <a:headEnd type="none" w="med" len="med"/>
+                      <a:tailEnd type="none" w="med" len="med"/>
+                    </a:lnT>
+                    <a:lnB w="12700" cap="flat" cmpd="sng" algn="ctr">
+                      <a:solidFill>
+                        <a:schemeClr val="tx1"/>
+                      </a:solidFill>
+                      <a:prstDash val="solid"/>
+                      <a:round/>
+                      <a:headEnd type="none" w="med" len="med"/>
+                      <a:tailEnd type="none" w="med" len="med"/>
+                    </a:lnB>
+                  </a:tcPr>
+                </a:tc>
+                <a:tc>
+                  <a:txBody>
+                    <a:bodyPr/>
+                    <a:lstStyle/>
+                    <a:p>
+                      <a:pPr algn="ctr"/>
+                      <a:endParaRPr lang="en-US" dirty="0"/>
+                    </a:p>
+                  </a:txBody>
+                  <a:tcPr>
+                    <a:lnL w="12700" cap="flat" cmpd="sng" algn="ctr">
+                      <a:solidFill>
+                        <a:schemeClr val="tx1"/>
+                      </a:solidFill>
+                      <a:prstDash val="solid"/>
+                      <a:round/>
+                      <a:headEnd type="none" w="med" len="med"/>
+                      <a:tailEnd type="none" w="med" len="med"/>
+                    </a:lnL>
+                    <a:lnR w="12700" cap="flat" cmpd="sng" algn="ctr">
+                      <a:solidFill>
+                        <a:schemeClr val="tx1"/>
+                      </a:solidFill>
+                      <a:prstDash val="solid"/>
+                      <a:round/>
+                      <a:headEnd type="none" w="med" len="med"/>
+                      <a:tailEnd type="none" w="med" len="med"/>
+                    </a:lnR>
+                    <a:lnT w="12700" cap="flat" cmpd="sng" algn="ctr">
+                      <a:solidFill>
+                        <a:schemeClr val="tx1"/>
+                      </a:solidFill>
+                      <a:prstDash val="solid"/>
+                      <a:round/>
+                      <a:headEnd type="none" w="med" len="med"/>
+                      <a:tailEnd type="none" w="med" len="med"/>
+                    </a:lnT>
+                    <a:lnB w="12700" cap="flat" cmpd="sng" algn="ctr">
+                      <a:solidFill>
+                        <a:schemeClr val="tx1"/>
+                      </a:solidFill>
+                      <a:prstDash val="solid"/>
+                      <a:round/>
+                      <a:headEnd type="none" w="med" len="med"/>
+                      <a:tailEnd type="none" w="med" len="med"/>
+                    </a:lnB>
+                  </a:tcPr>
+                </a:tc>
+                <a:tc>
+                  <a:txBody>
+                    <a:bodyPr/>
+                    <a:lstStyle/>
+                    <a:p>
+                      <a:pPr algn="ctr"/>
+                      <a:endParaRPr lang="en-US" dirty="0"/>
+                    </a:p>
+                  </a:txBody>
+                  <a:tcPr>
+                    <a:lnL w="12700" cap="flat" cmpd="sng" algn="ctr">
+                      <a:solidFill>
+                        <a:schemeClr val="tx1"/>
+                      </a:solidFill>
+                      <a:prstDash val="solid"/>
+                      <a:round/>
+                      <a:headEnd type="none" w="med" len="med"/>
+                      <a:tailEnd type="none" w="med" len="med"/>
+                    </a:lnL>
+                    <a:lnR w="12700" cap="flat" cmpd="sng" algn="ctr">
+                      <a:solidFill>
+                        <a:schemeClr val="tx1"/>
+                      </a:solidFill>
+                      <a:prstDash val="solid"/>
+                      <a:round/>
+                      <a:headEnd type="none" w="med" len="med"/>
+                      <a:tailEnd type="none" w="med" len="med"/>
+                    </a:lnR>
+                    <a:lnT w="12700" cap="flat" cmpd="sng" algn="ctr">
+                      <a:solidFill>
+                        <a:schemeClr val="tx1"/>
+                      </a:solidFill>
+                      <a:prstDash val="solid"/>
+                      <a:round/>
+                      <a:headEnd type="none" w="med" len="med"/>
+                      <a:tailEnd type="none" w="med" len="med"/>
+                    </a:lnT>
+                    <a:lnB w="12700" cap="flat" cmpd="sng" algn="ctr">
+                      <a:solidFill>
+                        <a:schemeClr val="tx1"/>
+                      </a:solidFill>
+                      <a:prstDash val="solid"/>
+                      <a:round/>
+                      <a:headEnd type="none" w="med" len="med"/>
+                      <a:tailEnd type="none" w="med" len="med"/>
+                    </a:lnB>
+                  </a:tcPr>
+                </a:tc>
+                <a:tc gridSpan="2">
+                  <a:txBody>
+                    <a:bodyPr/>
+                    <a:lstStyle/>
+                    <a:p>
+                      <a:pPr algn="ctr"/>
+                      <a:r>
+                        <a:rPr lang="en-US" dirty="0" smtClean="0"/>
+                        <a:t>structural</a:t>
+                      </a:r>
+                      <a:endParaRPr lang="en-US" dirty="0"/>
+                    </a:p>
+                  </a:txBody>
+                  <a:tcPr>
+                    <a:lnL w="12700" cap="flat" cmpd="sng" algn="ctr">
+                      <a:solidFill>
+                        <a:schemeClr val="tx1"/>
+                      </a:solidFill>
+                      <a:prstDash val="solid"/>
+                      <a:round/>
+                      <a:headEnd type="none" w="med" len="med"/>
+                      <a:tailEnd type="none" w="med" len="med"/>
+                    </a:lnL>
+                    <a:lnR w="12700" cap="flat" cmpd="sng" algn="ctr">
+                      <a:solidFill>
+                        <a:schemeClr val="tx1"/>
+                      </a:solidFill>
+                      <a:prstDash val="solid"/>
+                      <a:round/>
+                      <a:headEnd type="none" w="med" len="med"/>
+                      <a:tailEnd type="none" w="med" len="med"/>
+                    </a:lnR>
+                    <a:lnT w="12700" cap="flat" cmpd="sng" algn="ctr">
+                      <a:solidFill>
+                        <a:schemeClr val="tx1"/>
+                      </a:solidFill>
+                      <a:prstDash val="solid"/>
+                      <a:round/>
+                      <a:headEnd type="none" w="med" len="med"/>
+                      <a:tailEnd type="none" w="med" len="med"/>
+                    </a:lnT>
+                    <a:lnB w="12700" cap="flat" cmpd="sng" algn="ctr">
+                      <a:solidFill>
+                        <a:schemeClr val="tx1"/>
+                      </a:solidFill>
+                      <a:prstDash val="solid"/>
+                      <a:round/>
+                      <a:headEnd type="none" w="med" len="med"/>
+                      <a:tailEnd type="none" w="med" len="med"/>
+                    </a:lnB>
+                  </a:tcPr>
+                </a:tc>
+                <a:tc hMerge="1">
+                  <a:txBody>
+                    <a:bodyPr/>
+                    <a:lstStyle/>
+                    <a:p>
+                      <a:endParaRPr lang="en-US" dirty="0"/>
+                    </a:p>
+                  </a:txBody>
+                  <a:tcPr/>
+                </a:tc>
+                <a:tc>
+                  <a:txBody>
+                    <a:bodyPr/>
+                    <a:lstStyle/>
+                    <a:p>
+                      <a:pPr algn="ctr"/>
+                      <a:r>
+                        <a:rPr lang="en-US" dirty="0" smtClean="0"/>
+                        <a:t>functional</a:t>
+                      </a:r>
+                      <a:endParaRPr lang="en-US" dirty="0"/>
+                    </a:p>
+                  </a:txBody>
+                  <a:tcPr>
+                    <a:lnL w="12700" cap="flat" cmpd="sng" algn="ctr">
+                      <a:solidFill>
+                        <a:schemeClr val="tx1"/>
+                      </a:solidFill>
+                      <a:prstDash val="solid"/>
+                      <a:round/>
+                      <a:headEnd type="none" w="med" len="med"/>
+                      <a:tailEnd type="none" w="med" len="med"/>
+                    </a:lnL>
+                    <a:lnR w="12700" cap="flat" cmpd="sng" algn="ctr">
+                      <a:solidFill>
+                        <a:schemeClr val="tx1"/>
+                      </a:solidFill>
+                      <a:prstDash val="solid"/>
+                      <a:round/>
+                      <a:headEnd type="none" w="med" len="med"/>
+                      <a:tailEnd type="none" w="med" len="med"/>
+                    </a:lnR>
+                    <a:lnT w="12700" cap="flat" cmpd="sng" algn="ctr">
+                      <a:solidFill>
+                        <a:schemeClr val="tx1"/>
+                      </a:solidFill>
+                      <a:prstDash val="solid"/>
+                      <a:round/>
+                      <a:headEnd type="none" w="med" len="med"/>
+                      <a:tailEnd type="none" w="med" len="med"/>
+                    </a:lnT>
+                    <a:lnB w="12700" cap="flat" cmpd="sng" algn="ctr">
+                      <a:solidFill>
+                        <a:schemeClr val="tx1"/>
+                      </a:solidFill>
+                      <a:prstDash val="solid"/>
+                      <a:round/>
+                      <a:headEnd type="none" w="med" len="med"/>
+                      <a:tailEnd type="none" w="med" len="med"/>
+                    </a:lnB>
+                  </a:tcPr>
+                </a:tc>
+                <a:tc>
+                  <a:txBody>
+                    <a:bodyPr/>
+                    <a:lstStyle/>
+                    <a:p>
+                      <a:pPr algn="ctr"/>
+                      <a:endParaRPr lang="en-US" dirty="0"/>
+                    </a:p>
+                  </a:txBody>
+                  <a:tcPr>
+                    <a:lnL w="12700" cap="flat" cmpd="sng" algn="ctr">
+                      <a:solidFill>
+                        <a:schemeClr val="tx1"/>
+                      </a:solidFill>
+                      <a:prstDash val="solid"/>
+                      <a:round/>
+                      <a:headEnd type="none" w="med" len="med"/>
+                      <a:tailEnd type="none" w="med" len="med"/>
+                    </a:lnL>
+                    <a:lnR w="12700" cap="flat" cmpd="sng" algn="ctr">
+                      <a:solidFill>
+                        <a:schemeClr val="tx1"/>
+                      </a:solidFill>
+                      <a:prstDash val="solid"/>
+                      <a:round/>
+                      <a:headEnd type="none" w="med" len="med"/>
+                      <a:tailEnd type="none" w="med" len="med"/>
+                    </a:lnR>
+                    <a:lnT w="12700" cap="flat" cmpd="sng" algn="ctr">
+                      <a:solidFill>
+                        <a:schemeClr val="tx1"/>
+                      </a:solidFill>
+                      <a:prstDash val="solid"/>
+                      <a:round/>
+                      <a:headEnd type="none" w="med" len="med"/>
+                      <a:tailEnd type="none" w="med" len="med"/>
+                    </a:lnT>
+                    <a:lnB w="12700" cap="flat" cmpd="sng" algn="ctr">
+                      <a:solidFill>
+                        <a:schemeClr val="tx1"/>
+                      </a:solidFill>
+                      <a:prstDash val="solid"/>
+                      <a:round/>
+                      <a:headEnd type="none" w="med" len="med"/>
+                      <a:tailEnd type="none" w="med" len="med"/>
+                    </a:lnB>
+                  </a:tcPr>
+                </a:tc>
+                <a:tc>
+                  <a:txBody>
+                    <a:bodyPr/>
+                    <a:lstStyle/>
+                    <a:p>
+                      <a:pPr algn="ctr"/>
+                      <a:endParaRPr lang="en-US" dirty="0"/>
+                    </a:p>
+                  </a:txBody>
+                  <a:tcPr>
+                    <a:lnL w="12700" cap="flat" cmpd="sng" algn="ctr">
+                      <a:solidFill>
+                        <a:schemeClr val="tx1"/>
+                      </a:solidFill>
+                      <a:prstDash val="solid"/>
+                      <a:round/>
+                      <a:headEnd type="none" w="med" len="med"/>
+                      <a:tailEnd type="none" w="med" len="med"/>
+                    </a:lnL>
+                    <a:lnR w="12700" cap="flat" cmpd="sng" algn="ctr">
+                      <a:solidFill>
+                        <a:schemeClr val="tx1"/>
+                      </a:solidFill>
+                      <a:prstDash val="solid"/>
+                      <a:round/>
+                      <a:headEnd type="none" w="med" len="med"/>
+                      <a:tailEnd type="none" w="med" len="med"/>
+                    </a:lnR>
+                    <a:lnT w="12700" cap="flat" cmpd="sng" algn="ctr">
+                      <a:solidFill>
+                        <a:schemeClr val="tx1"/>
+                      </a:solidFill>
+                      <a:prstDash val="solid"/>
+                      <a:round/>
+                      <a:headEnd type="none" w="med" len="med"/>
+                      <a:tailEnd type="none" w="med" len="med"/>
+                    </a:lnT>
+                    <a:lnB w="12700" cap="flat" cmpd="sng" algn="ctr">
+                      <a:solidFill>
+                        <a:schemeClr val="tx1"/>
+                      </a:solidFill>
+                      <a:prstDash val="solid"/>
+                      <a:round/>
+                      <a:headEnd type="none" w="med" len="med"/>
+                      <a:tailEnd type="none" w="med" len="med"/>
+                    </a:lnB>
+                  </a:tcPr>
+                </a:tc>
+                <a:tc>
+                  <a:txBody>
+                    <a:bodyPr/>
+                    <a:lstStyle/>
+                    <a:p>
+                      <a:pPr algn="ctr"/>
+                      <a:endParaRPr lang="en-US" dirty="0"/>
+                    </a:p>
+                  </a:txBody>
+                  <a:tcPr>
+                    <a:lnL w="12700" cap="flat" cmpd="sng" algn="ctr">
+                      <a:solidFill>
+                        <a:schemeClr val="tx1"/>
+                      </a:solidFill>
+                      <a:prstDash val="solid"/>
+                      <a:round/>
+                      <a:headEnd type="none" w="med" len="med"/>
+                      <a:tailEnd type="none" w="med" len="med"/>
+                    </a:lnL>
+                    <a:lnR w="12700" cap="flat" cmpd="sng" algn="ctr">
+                      <a:solidFill>
+                        <a:schemeClr val="tx1"/>
+                      </a:solidFill>
+                      <a:prstDash val="solid"/>
+                      <a:round/>
+                      <a:headEnd type="none" w="med" len="med"/>
+                      <a:tailEnd type="none" w="med" len="med"/>
+                    </a:lnR>
+                    <a:lnT w="12700" cap="flat" cmpd="sng" algn="ctr">
+                      <a:solidFill>
+                        <a:schemeClr val="tx1"/>
+                      </a:solidFill>
+                      <a:prstDash val="solid"/>
+                      <a:round/>
+                      <a:headEnd type="none" w="med" len="med"/>
+                      <a:tailEnd type="none" w="med" len="med"/>
+                    </a:lnT>
+                    <a:lnB w="12700" cap="flat" cmpd="sng" algn="ctr">
+                      <a:solidFill>
+                        <a:schemeClr val="tx1"/>
+                      </a:solidFill>
+                      <a:prstDash val="solid"/>
+                      <a:round/>
+                      <a:headEnd type="none" w="med" len="med"/>
+                      <a:tailEnd type="none" w="med" len="med"/>
+                    </a:lnB>
+                  </a:tcPr>
+                </a:tc>
+              </a:tr>
+              <a:tr h="370840">
+                <a:tc>
+                  <a:txBody>
+                    <a:bodyPr/>
+                    <a:lstStyle/>
+                    <a:p>
+                      <a:r>
+                        <a:rPr lang="en-US" dirty="0" smtClean="0"/>
+                        <a:t>Analysis</a:t>
+                      </a:r>
+                      <a:endParaRPr lang="en-US" dirty="0"/>
+                    </a:p>
+                  </a:txBody>
+                  <a:tcPr>
+                    <a:lnL w="12700" cap="flat" cmpd="sng" algn="ctr">
+                      <a:solidFill>
+                        <a:schemeClr val="tx1"/>
+                      </a:solidFill>
+                      <a:prstDash val="solid"/>
+                      <a:round/>
+                      <a:headEnd type="none" w="med" len="med"/>
+                      <a:tailEnd type="none" w="med" len="med"/>
+                    </a:lnL>
+                    <a:lnR w="12700" cap="flat" cmpd="sng" algn="ctr">
+                      <a:solidFill>
+                        <a:schemeClr val="tx1"/>
+                      </a:solidFill>
+                      <a:prstDash val="solid"/>
+                      <a:round/>
+                      <a:headEnd type="none" w="med" len="med"/>
+                      <a:tailEnd type="none" w="med" len="med"/>
+                    </a:lnR>
+                    <a:lnT w="12700" cap="flat" cmpd="sng" algn="ctr">
+                      <a:solidFill>
+                        <a:schemeClr val="tx1"/>
+                      </a:solidFill>
+                      <a:prstDash val="solid"/>
+                      <a:round/>
+                      <a:headEnd type="none" w="med" len="med"/>
+                      <a:tailEnd type="none" w="med" len="med"/>
+                    </a:lnT>
+                    <a:lnB w="12700" cap="flat" cmpd="sng" algn="ctr">
+                      <a:solidFill>
+                        <a:schemeClr val="tx1"/>
+                      </a:solidFill>
+                      <a:prstDash val="solid"/>
+                      <a:round/>
+                      <a:headEnd type="none" w="med" len="med"/>
+                      <a:tailEnd type="none" w="med" len="med"/>
+                    </a:lnB>
+                  </a:tcPr>
+                </a:tc>
+                <a:tc>
+                  <a:txBody>
+                    <a:bodyPr/>
+                    <a:lstStyle/>
+                    <a:p>
+                      <a:pPr algn="ctr"/>
+                      <a:endParaRPr lang="en-US"/>
+                    </a:p>
+                  </a:txBody>
+                  <a:tcPr>
+                    <a:lnL w="12700" cap="flat" cmpd="sng" algn="ctr">
+                      <a:solidFill>
+                        <a:schemeClr val="tx1"/>
+                      </a:solidFill>
+                      <a:prstDash val="solid"/>
+                      <a:round/>
+                      <a:headEnd type="none" w="med" len="med"/>
+                      <a:tailEnd type="none" w="med" len="med"/>
+                    </a:lnL>
+                    <a:lnR w="12700" cap="flat" cmpd="sng" algn="ctr">
+                      <a:solidFill>
+                        <a:schemeClr val="tx1"/>
+                      </a:solidFill>
+                      <a:prstDash val="solid"/>
+                      <a:round/>
+                      <a:headEnd type="none" w="med" len="med"/>
+                      <a:tailEnd type="none" w="med" len="med"/>
+                    </a:lnR>
+                    <a:lnT w="12700" cap="flat" cmpd="sng" algn="ctr">
+                      <a:solidFill>
+                        <a:schemeClr val="tx1"/>
+                      </a:solidFill>
+                      <a:prstDash val="solid"/>
+                      <a:round/>
+                      <a:headEnd type="none" w="med" len="med"/>
+                      <a:tailEnd type="none" w="med" len="med"/>
+                    </a:lnT>
+                    <a:lnB w="12700" cap="flat" cmpd="sng" algn="ctr">
+                      <a:solidFill>
+                        <a:schemeClr val="tx1"/>
+                      </a:solidFill>
+                      <a:prstDash val="solid"/>
+                      <a:round/>
+                      <a:headEnd type="none" w="med" len="med"/>
+                      <a:tailEnd type="none" w="med" len="med"/>
+                    </a:lnB>
+                  </a:tcPr>
+                </a:tc>
+                <a:tc>
+                  <a:txBody>
+                    <a:bodyPr/>
+                    <a:lstStyle/>
+                    <a:p>
+                      <a:pPr algn="ctr"/>
+                      <a:endParaRPr lang="en-US"/>
+                    </a:p>
+                  </a:txBody>
+                  <a:tcPr>
+                    <a:lnL w="12700" cap="flat" cmpd="sng" algn="ctr">
+                      <a:solidFill>
+                        <a:schemeClr val="tx1"/>
+                      </a:solidFill>
+                      <a:prstDash val="solid"/>
+                      <a:round/>
+                      <a:headEnd type="none" w="med" len="med"/>
+                      <a:tailEnd type="none" w="med" len="med"/>
+                    </a:lnL>
+                    <a:lnR w="12700" cap="flat" cmpd="sng" algn="ctr">
+                      <a:solidFill>
+                        <a:schemeClr val="tx1"/>
+                      </a:solidFill>
+                      <a:prstDash val="solid"/>
+                      <a:round/>
+                      <a:headEnd type="none" w="med" len="med"/>
+                      <a:tailEnd type="none" w="med" len="med"/>
+                    </a:lnR>
+                    <a:lnT w="12700" cap="flat" cmpd="sng" algn="ctr">
+                      <a:solidFill>
+                        <a:schemeClr val="tx1"/>
+                      </a:solidFill>
+                      <a:prstDash val="solid"/>
+                      <a:round/>
+                      <a:headEnd type="none" w="med" len="med"/>
+                      <a:tailEnd type="none" w="med" len="med"/>
+                    </a:lnT>
+                    <a:lnB w="12700" cap="flat" cmpd="sng" algn="ctr">
+                      <a:solidFill>
+                        <a:schemeClr val="tx1"/>
+                      </a:solidFill>
+                      <a:prstDash val="solid"/>
+                      <a:round/>
+                      <a:headEnd type="none" w="med" len="med"/>
+                      <a:tailEnd type="none" w="med" len="med"/>
+                    </a:lnB>
+                  </a:tcPr>
+                </a:tc>
+                <a:tc>
+                  <a:txBody>
+                    <a:bodyPr/>
+                    <a:lstStyle/>
+                    <a:p>
+                      <a:pPr algn="ctr"/>
+                      <a:endParaRPr lang="en-US" dirty="0"/>
+                    </a:p>
+                  </a:txBody>
+                  <a:tcPr>
+                    <a:lnL w="12700" cap="flat" cmpd="sng" algn="ctr">
+                      <a:solidFill>
+                        <a:schemeClr val="tx1"/>
+                      </a:solidFill>
+                      <a:prstDash val="solid"/>
+                      <a:round/>
+                      <a:headEnd type="none" w="med" len="med"/>
+                      <a:tailEnd type="none" w="med" len="med"/>
+                    </a:lnL>
+                    <a:lnR w="12700" cap="flat" cmpd="sng" algn="ctr">
+                      <a:solidFill>
+                        <a:schemeClr val="tx1"/>
+                      </a:solidFill>
+                      <a:prstDash val="solid"/>
+                      <a:round/>
+                      <a:headEnd type="none" w="med" len="med"/>
+                      <a:tailEnd type="none" w="med" len="med"/>
+                    </a:lnR>
+                    <a:lnT w="12700" cap="flat" cmpd="sng" algn="ctr">
+                      <a:solidFill>
+                        <a:schemeClr val="tx1"/>
+                      </a:solidFill>
+                      <a:prstDash val="solid"/>
+                      <a:round/>
+                      <a:headEnd type="none" w="med" len="med"/>
+                      <a:tailEnd type="none" w="med" len="med"/>
+                    </a:lnT>
+                    <a:lnB w="12700" cap="flat" cmpd="sng" algn="ctr">
+                      <a:solidFill>
+                        <a:schemeClr val="tx1"/>
+                      </a:solidFill>
+                      <a:prstDash val="solid"/>
+                      <a:round/>
+                      <a:headEnd type="none" w="med" len="med"/>
+                      <a:tailEnd type="none" w="med" len="med"/>
+                    </a:lnB>
+                  </a:tcPr>
+                </a:tc>
+                <a:tc gridSpan="2">
+                  <a:txBody>
+                    <a:bodyPr/>
+                    <a:lstStyle/>
+                    <a:p>
+                      <a:pPr algn="ctr"/>
+                      <a:r>
+                        <a:rPr lang="en-US" dirty="0" smtClean="0"/>
+                        <a:t>PC</a:t>
+                      </a:r>
+                      <a:endParaRPr lang="en-US" dirty="0"/>
+                    </a:p>
+                  </a:txBody>
+                  <a:tcPr>
+                    <a:lnL w="12700" cap="flat" cmpd="sng" algn="ctr">
+                      <a:solidFill>
+                        <a:schemeClr val="tx1"/>
+                      </a:solidFill>
+                      <a:prstDash val="solid"/>
+                      <a:round/>
+                      <a:headEnd type="none" w="med" len="med"/>
+                      <a:tailEnd type="none" w="med" len="med"/>
+                    </a:lnL>
+                    <a:lnR w="12700" cap="flat" cmpd="sng" algn="ctr">
+                      <a:solidFill>
+                        <a:schemeClr val="tx1"/>
+                      </a:solidFill>
+                      <a:prstDash val="solid"/>
+                      <a:round/>
+                      <a:headEnd type="none" w="med" len="med"/>
+                      <a:tailEnd type="none" w="med" len="med"/>
+                    </a:lnR>
+                    <a:lnT w="12700" cap="flat" cmpd="sng" algn="ctr">
+                      <a:solidFill>
+                        <a:schemeClr val="tx1"/>
+                      </a:solidFill>
+                      <a:prstDash val="solid"/>
+                      <a:round/>
+                      <a:headEnd type="none" w="med" len="med"/>
+                      <a:tailEnd type="none" w="med" len="med"/>
+                    </a:lnT>
+                    <a:lnB w="12700" cap="flat" cmpd="sng" algn="ctr">
+                      <a:solidFill>
+                        <a:schemeClr val="tx1"/>
+                      </a:solidFill>
+                      <a:prstDash val="solid"/>
+                      <a:round/>
+                      <a:headEnd type="none" w="med" len="med"/>
+                      <a:tailEnd type="none" w="med" len="med"/>
+                    </a:lnB>
+                  </a:tcPr>
+                </a:tc>
+                <a:tc hMerge="1">
+                  <a:txBody>
+                    <a:bodyPr/>
+                    <a:lstStyle/>
+                    <a:p>
+                      <a:pPr algn="ctr"/>
+                      <a:endParaRPr lang="en-US" dirty="0"/>
+                    </a:p>
+                  </a:txBody>
+                  <a:tcPr/>
+                </a:tc>
+                <a:tc>
+                  <a:txBody>
+                    <a:bodyPr/>
+                    <a:lstStyle/>
+                    <a:p>
+                      <a:pPr algn="ctr"/>
+                      <a:endParaRPr lang="en-US" dirty="0"/>
+                    </a:p>
+                  </a:txBody>
+                  <a:tcPr>
+                    <a:lnL w="12700" cap="flat" cmpd="sng" algn="ctr">
+                      <a:solidFill>
+                        <a:schemeClr val="tx1"/>
+                      </a:solidFill>
+                      <a:prstDash val="solid"/>
+                      <a:round/>
+                      <a:headEnd type="none" w="med" len="med"/>
+                      <a:tailEnd type="none" w="med" len="med"/>
+                    </a:lnL>
+                    <a:lnR w="12700" cap="flat" cmpd="sng" algn="ctr">
+                      <a:solidFill>
+                        <a:schemeClr val="tx1"/>
+                      </a:solidFill>
+                      <a:prstDash val="solid"/>
+                      <a:round/>
+                      <a:headEnd type="none" w="med" len="med"/>
+                      <a:tailEnd type="none" w="med" len="med"/>
+                    </a:lnR>
+                    <a:lnT w="12700" cap="flat" cmpd="sng" algn="ctr">
+                      <a:solidFill>
+                        <a:schemeClr val="tx1"/>
+                      </a:solidFill>
+                      <a:prstDash val="solid"/>
+                      <a:round/>
+                      <a:headEnd type="none" w="med" len="med"/>
+                      <a:tailEnd type="none" w="med" len="med"/>
+                    </a:lnT>
+                    <a:lnB w="12700" cap="flat" cmpd="sng" algn="ctr">
+                      <a:solidFill>
+                        <a:schemeClr val="tx1"/>
+                      </a:solidFill>
+                      <a:prstDash val="solid"/>
+                      <a:round/>
+                      <a:headEnd type="none" w="med" len="med"/>
+                      <a:tailEnd type="none" w="med" len="med"/>
+                    </a:lnB>
+                  </a:tcPr>
+                </a:tc>
+                <a:tc gridSpan="2">
+                  <a:txBody>
+                    <a:bodyPr/>
+                    <a:lstStyle/>
+                    <a:p>
+                      <a:pPr algn="ctr"/>
+                      <a:r>
+                        <a:rPr lang="en-US" dirty="0" smtClean="0"/>
+                        <a:t>BCCD</a:t>
+                      </a:r>
+                      <a:endParaRPr lang="en-US" dirty="0"/>
+                    </a:p>
+                  </a:txBody>
+                  <a:tcPr>
+                    <a:lnL w="12700" cap="flat" cmpd="sng" algn="ctr">
+                      <a:solidFill>
+                        <a:schemeClr val="tx1"/>
+                      </a:solidFill>
+                      <a:prstDash val="solid"/>
+                      <a:round/>
+                      <a:headEnd type="none" w="med" len="med"/>
+                      <a:tailEnd type="none" w="med" len="med"/>
+                    </a:lnL>
+                    <a:lnR w="12700" cap="flat" cmpd="sng" algn="ctr">
+                      <a:solidFill>
+                        <a:schemeClr val="tx1"/>
+                      </a:solidFill>
+                      <a:prstDash val="solid"/>
+                      <a:round/>
+                      <a:headEnd type="none" w="med" len="med"/>
+                      <a:tailEnd type="none" w="med" len="med"/>
+                    </a:lnR>
+                    <a:lnT w="12700" cap="flat" cmpd="sng" algn="ctr">
+                      <a:solidFill>
+                        <a:schemeClr val="tx1"/>
+                      </a:solidFill>
+                      <a:prstDash val="solid"/>
+                      <a:round/>
+                      <a:headEnd type="none" w="med" len="med"/>
+                      <a:tailEnd type="none" w="med" len="med"/>
+                    </a:lnT>
+                    <a:lnB w="12700" cap="flat" cmpd="sng" algn="ctr">
+                      <a:solidFill>
+                        <a:schemeClr val="tx1"/>
+                      </a:solidFill>
+                      <a:prstDash val="solid"/>
+                      <a:round/>
+                      <a:headEnd type="none" w="med" len="med"/>
+                      <a:tailEnd type="none" w="med" len="med"/>
+                    </a:lnB>
+                  </a:tcPr>
+                </a:tc>
+                <a:tc hMerge="1">
+                  <a:txBody>
+                    <a:bodyPr/>
+                    <a:lstStyle/>
+                    <a:p>
+                      <a:pPr algn="ctr"/>
+                      <a:endParaRPr lang="en-US" dirty="0"/>
+                    </a:p>
+                  </a:txBody>
+                  <a:tcPr/>
+                </a:tc>
+                <a:tc>
+                  <a:txBody>
+                    <a:bodyPr/>
+                    <a:lstStyle/>
+                    <a:p>
+                      <a:pPr algn="ctr"/>
+                      <a:endParaRPr lang="en-US" dirty="0"/>
+                    </a:p>
+                  </a:txBody>
+                  <a:tcPr>
+                    <a:lnL w="12700" cap="flat" cmpd="sng" algn="ctr">
+                      <a:solidFill>
+                        <a:schemeClr val="tx1"/>
+                      </a:solidFill>
+                      <a:prstDash val="solid"/>
+                      <a:round/>
+                      <a:headEnd type="none" w="med" len="med"/>
+                      <a:tailEnd type="none" w="med" len="med"/>
+                    </a:lnL>
+                    <a:lnR w="12700" cap="flat" cmpd="sng" algn="ctr">
+                      <a:solidFill>
+                        <a:schemeClr val="tx1"/>
+                      </a:solidFill>
+                      <a:prstDash val="solid"/>
+                      <a:round/>
+                      <a:headEnd type="none" w="med" len="med"/>
+                      <a:tailEnd type="none" w="med" len="med"/>
+                    </a:lnR>
+                    <a:lnT w="12700" cap="flat" cmpd="sng" algn="ctr">
+                      <a:solidFill>
+                        <a:schemeClr val="tx1"/>
+                      </a:solidFill>
+                      <a:prstDash val="solid"/>
+                      <a:round/>
+                      <a:headEnd type="none" w="med" len="med"/>
+                      <a:tailEnd type="none" w="med" len="med"/>
+                    </a:lnT>
+                    <a:lnB w="12700" cap="flat" cmpd="sng" algn="ctr">
+                      <a:solidFill>
+                        <a:schemeClr val="tx1"/>
+                      </a:solidFill>
+                      <a:prstDash val="solid"/>
+                      <a:round/>
+                      <a:headEnd type="none" w="med" len="med"/>
+                      <a:tailEnd type="none" w="med" len="med"/>
+                    </a:lnB>
+                  </a:tcPr>
+                </a:tc>
+                <a:tc>
+                  <a:txBody>
+                    <a:bodyPr/>
+                    <a:lstStyle/>
+                    <a:p>
+                      <a:pPr algn="ctr"/>
+                      <a:endParaRPr lang="en-US" dirty="0"/>
+                    </a:p>
+                  </a:txBody>
+                  <a:tcPr>
+                    <a:lnL w="12700" cap="flat" cmpd="sng" algn="ctr">
+                      <a:solidFill>
+                        <a:schemeClr val="tx1"/>
+                      </a:solidFill>
+                      <a:prstDash val="solid"/>
+                      <a:round/>
+                      <a:headEnd type="none" w="med" len="med"/>
+                      <a:tailEnd type="none" w="med" len="med"/>
+                    </a:lnL>
+                    <a:lnR w="12700" cap="flat" cmpd="sng" algn="ctr">
+                      <a:solidFill>
+                        <a:schemeClr val="tx1"/>
+                      </a:solidFill>
+                      <a:prstDash val="solid"/>
+                      <a:round/>
+                      <a:headEnd type="none" w="med" len="med"/>
+                      <a:tailEnd type="none" w="med" len="med"/>
+                    </a:lnR>
+                    <a:lnT w="12700" cap="flat" cmpd="sng" algn="ctr">
+                      <a:solidFill>
+                        <a:schemeClr val="tx1"/>
+                      </a:solidFill>
+                      <a:prstDash val="solid"/>
+                      <a:round/>
+                      <a:headEnd type="none" w="med" len="med"/>
+                      <a:tailEnd type="none" w="med" len="med"/>
+                    </a:lnT>
+                    <a:lnB w="12700" cap="flat" cmpd="sng" algn="ctr">
+                      <a:solidFill>
+                        <a:schemeClr val="tx1"/>
+                      </a:solidFill>
+                      <a:prstDash val="solid"/>
+                      <a:round/>
+                      <a:headEnd type="none" w="med" len="med"/>
+                      <a:tailEnd type="none" w="med" len="med"/>
+                    </a:lnB>
+                  </a:tcPr>
+                </a:tc>
+              </a:tr>
+              <a:tr h="370840">
+                <a:tc>
+                  <a:txBody>
+                    <a:bodyPr/>
+                    <a:lstStyle/>
+                    <a:p>
+                      <a:r>
+                        <a:rPr lang="en-US" dirty="0" smtClean="0"/>
+                        <a:t>Writing</a:t>
+                      </a:r>
+                      <a:endParaRPr lang="en-US" dirty="0"/>
+                    </a:p>
+                  </a:txBody>
+                  <a:tcPr>
+                    <a:lnL w="12700" cap="flat" cmpd="sng" algn="ctr">
+                      <a:solidFill>
+                        <a:schemeClr val="tx1"/>
+                      </a:solidFill>
+                      <a:prstDash val="solid"/>
+                      <a:round/>
+                      <a:headEnd type="none" w="med" len="med"/>
+                      <a:tailEnd type="none" w="med" len="med"/>
+                    </a:lnL>
+                    <a:lnR w="12700" cap="flat" cmpd="sng" algn="ctr">
+                      <a:solidFill>
+                        <a:schemeClr val="tx1"/>
+                      </a:solidFill>
+                      <a:prstDash val="solid"/>
+                      <a:round/>
+                      <a:headEnd type="none" w="med" len="med"/>
+                      <a:tailEnd type="none" w="med" len="med"/>
+                    </a:lnR>
+                    <a:lnT w="12700" cap="flat" cmpd="sng" algn="ctr">
+                      <a:solidFill>
+                        <a:schemeClr val="tx1"/>
+                      </a:solidFill>
+                      <a:prstDash val="solid"/>
+                      <a:round/>
+                      <a:headEnd type="none" w="med" len="med"/>
+                      <a:tailEnd type="none" w="med" len="med"/>
+                    </a:lnT>
+                    <a:lnB w="12700" cap="flat" cmpd="sng" algn="ctr">
+                      <a:solidFill>
+                        <a:schemeClr val="tx1"/>
+                      </a:solidFill>
+                      <a:prstDash val="solid"/>
+                      <a:round/>
+                      <a:headEnd type="none" w="med" len="med"/>
+                      <a:tailEnd type="none" w="med" len="med"/>
+                    </a:lnB>
+                  </a:tcPr>
+                </a:tc>
+                <a:tc>
+                  <a:txBody>
+                    <a:bodyPr/>
+                    <a:lstStyle/>
+                    <a:p>
+                      <a:pPr algn="ctr"/>
+                      <a:endParaRPr lang="en-US" dirty="0"/>
+                    </a:p>
+                  </a:txBody>
+                  <a:tcPr>
+                    <a:lnL w="12700" cap="flat" cmpd="sng" algn="ctr">
+                      <a:solidFill>
+                        <a:schemeClr val="tx1"/>
+                      </a:solidFill>
+                      <a:prstDash val="solid"/>
+                      <a:round/>
+                      <a:headEnd type="none" w="med" len="med"/>
+                      <a:tailEnd type="none" w="med" len="med"/>
+                    </a:lnL>
+                    <a:lnR w="12700" cap="flat" cmpd="sng" algn="ctr">
+                      <a:solidFill>
+                        <a:schemeClr val="tx1"/>
+                      </a:solidFill>
+                      <a:prstDash val="solid"/>
+                      <a:round/>
+                      <a:headEnd type="none" w="med" len="med"/>
+                      <a:tailEnd type="none" w="med" len="med"/>
+                    </a:lnR>
+                    <a:lnT w="12700" cap="flat" cmpd="sng" algn="ctr">
+                      <a:solidFill>
+                        <a:schemeClr val="tx1"/>
+                      </a:solidFill>
+                      <a:prstDash val="solid"/>
+                      <a:round/>
+                      <a:headEnd type="none" w="med" len="med"/>
+                      <a:tailEnd type="none" w="med" len="med"/>
+                    </a:lnT>
+                    <a:lnB w="12700" cap="flat" cmpd="sng" algn="ctr">
+                      <a:solidFill>
+                        <a:schemeClr val="tx1"/>
+                      </a:solidFill>
+                      <a:prstDash val="solid"/>
+                      <a:round/>
+                      <a:headEnd type="none" w="med" len="med"/>
+                      <a:tailEnd type="none" w="med" len="med"/>
+                    </a:lnB>
+                  </a:tcPr>
+                </a:tc>
+                <a:tc>
+                  <a:txBody>
+                    <a:bodyPr/>
+                    <a:lstStyle/>
+                    <a:p>
+                      <a:pPr algn="ctr"/>
+                      <a:endParaRPr lang="en-US"/>
+                    </a:p>
+                  </a:txBody>
+                  <a:tcPr>
+                    <a:lnL w="12700" cap="flat" cmpd="sng" algn="ctr">
+                      <a:solidFill>
+                        <a:schemeClr val="tx1"/>
+                      </a:solidFill>
+                      <a:prstDash val="solid"/>
+                      <a:round/>
+                      <a:headEnd type="none" w="med" len="med"/>
+                      <a:tailEnd type="none" w="med" len="med"/>
+                    </a:lnL>
+                    <a:lnR w="12700" cap="flat" cmpd="sng" algn="ctr">
+                      <a:solidFill>
+                        <a:schemeClr val="tx1"/>
+                      </a:solidFill>
+                      <a:prstDash val="solid"/>
+                      <a:round/>
+                      <a:headEnd type="none" w="med" len="med"/>
+                      <a:tailEnd type="none" w="med" len="med"/>
+                    </a:lnR>
+                    <a:lnT w="12700" cap="flat" cmpd="sng" algn="ctr">
+                      <a:solidFill>
+                        <a:schemeClr val="tx1"/>
+                      </a:solidFill>
+                      <a:prstDash val="solid"/>
+                      <a:round/>
+                      <a:headEnd type="none" w="med" len="med"/>
+                      <a:tailEnd type="none" w="med" len="med"/>
+                    </a:lnT>
+                    <a:lnB w="12700" cap="flat" cmpd="sng" algn="ctr">
+                      <a:solidFill>
+                        <a:schemeClr val="tx1"/>
+                      </a:solidFill>
+                      <a:prstDash val="solid"/>
+                      <a:round/>
+                      <a:headEnd type="none" w="med" len="med"/>
+                      <a:tailEnd type="none" w="med" len="med"/>
+                    </a:lnB>
+                  </a:tcPr>
+                </a:tc>
+                <a:tc>
+                  <a:txBody>
+                    <a:bodyPr/>
+                    <a:lstStyle/>
+                    <a:p>
+                      <a:pPr algn="ctr"/>
+                      <a:endParaRPr lang="en-US"/>
+                    </a:p>
+                  </a:txBody>
+                  <a:tcPr>
+                    <a:lnL w="12700" cap="flat" cmpd="sng" algn="ctr">
+                      <a:solidFill>
+                        <a:schemeClr val="tx1"/>
+                      </a:solidFill>
+                      <a:prstDash val="solid"/>
+                      <a:round/>
+                      <a:headEnd type="none" w="med" len="med"/>
+                      <a:tailEnd type="none" w="med" len="med"/>
+                    </a:lnL>
+                    <a:lnR w="12700" cap="flat" cmpd="sng" algn="ctr">
+                      <a:solidFill>
+                        <a:schemeClr val="tx1"/>
+                      </a:solidFill>
+                      <a:prstDash val="solid"/>
+                      <a:round/>
+                      <a:headEnd type="none" w="med" len="med"/>
+                      <a:tailEnd type="none" w="med" len="med"/>
+                    </a:lnR>
+                    <a:lnT w="12700" cap="flat" cmpd="sng" algn="ctr">
+                      <a:solidFill>
+                        <a:schemeClr val="tx1"/>
+                      </a:solidFill>
+                      <a:prstDash val="solid"/>
+                      <a:round/>
+                      <a:headEnd type="none" w="med" len="med"/>
+                      <a:tailEnd type="none" w="med" len="med"/>
+                    </a:lnT>
+                    <a:lnB w="12700" cap="flat" cmpd="sng" algn="ctr">
+                      <a:solidFill>
+                        <a:schemeClr val="tx1"/>
+                      </a:solidFill>
+                      <a:prstDash val="solid"/>
+                      <a:round/>
+                      <a:headEnd type="none" w="med" len="med"/>
+                      <a:tailEnd type="none" w="med" len="med"/>
+                    </a:lnB>
+                  </a:tcPr>
+                </a:tc>
+                <a:tc gridSpan="7">
+                  <a:txBody>
+                    <a:bodyPr/>
+                    <a:lstStyle/>
+                    <a:p>
+                      <a:pPr algn="ctr"/>
+                      <a:r>
+                        <a:rPr lang="en-US" dirty="0" smtClean="0"/>
+                        <a:t>Write article</a:t>
+                      </a:r>
+                      <a:endParaRPr lang="en-US" dirty="0"/>
+                    </a:p>
+                  </a:txBody>
+                  <a:tcPr>
+                    <a:lnL w="12700" cap="flat" cmpd="sng" algn="ctr">
+                      <a:solidFill>
+                        <a:schemeClr val="tx1"/>
+                      </a:solidFill>
+                      <a:prstDash val="solid"/>
+                      <a:round/>
+                      <a:headEnd type="none" w="med" len="med"/>
+                      <a:tailEnd type="none" w="med" len="med"/>
+                    </a:lnL>
+                    <a:lnR w="12700" cap="flat" cmpd="sng" algn="ctr">
+                      <a:solidFill>
+                        <a:schemeClr val="tx1"/>
+                      </a:solidFill>
+                      <a:prstDash val="solid"/>
+                      <a:round/>
+                      <a:headEnd type="none" w="med" len="med"/>
+                      <a:tailEnd type="none" w="med" len="med"/>
+                    </a:lnR>
+                    <a:lnT w="12700" cap="flat" cmpd="sng" algn="ctr">
+                      <a:solidFill>
+                        <a:schemeClr val="tx1"/>
+                      </a:solidFill>
+                      <a:prstDash val="solid"/>
+                      <a:round/>
+                      <a:headEnd type="none" w="med" len="med"/>
+                      <a:tailEnd type="none" w="med" len="med"/>
+                    </a:lnT>
+                    <a:lnB w="12700" cap="flat" cmpd="sng" algn="ctr">
+                      <a:solidFill>
+                        <a:schemeClr val="tx1"/>
+                      </a:solidFill>
+                      <a:prstDash val="solid"/>
+                      <a:round/>
+                      <a:headEnd type="none" w="med" len="med"/>
+                      <a:tailEnd type="none" w="med" len="med"/>
+                    </a:lnB>
+                  </a:tcPr>
+                </a:tc>
+                <a:tc hMerge="1">
+                  <a:txBody>
+                    <a:bodyPr/>
+                    <a:lstStyle/>
+                    <a:p>
+                      <a:pPr algn="ctr"/>
+                      <a:endParaRPr lang="en-US" dirty="0"/>
+                    </a:p>
+                  </a:txBody>
+                  <a:tcPr/>
+                </a:tc>
+                <a:tc hMerge="1">
+                  <a:txBody>
+                    <a:bodyPr/>
+                    <a:lstStyle/>
+                    <a:p>
+                      <a:pPr algn="ctr"/>
+                      <a:endParaRPr lang="en-US" dirty="0"/>
+                    </a:p>
+                  </a:txBody>
+                  <a:tcPr/>
+                </a:tc>
+                <a:tc hMerge="1">
+                  <a:txBody>
+                    <a:bodyPr/>
+                    <a:lstStyle/>
+                    <a:p>
+                      <a:pPr algn="ctr"/>
+                      <a:endParaRPr lang="en-US" dirty="0"/>
+                    </a:p>
+                  </a:txBody>
+                  <a:tcPr/>
+                </a:tc>
+                <a:tc hMerge="1">
+                  <a:txBody>
+                    <a:bodyPr/>
+                    <a:lstStyle/>
+                    <a:p>
+                      <a:pPr algn="ctr"/>
+                      <a:endParaRPr lang="en-US" dirty="0"/>
+                    </a:p>
+                  </a:txBody>
+                  <a:tcPr/>
+                </a:tc>
+                <a:tc hMerge="1">
+                  <a:txBody>
+                    <a:bodyPr/>
+                    <a:lstStyle/>
+                    <a:p>
+                      <a:pPr algn="ctr"/>
+                      <a:endParaRPr lang="en-US" dirty="0"/>
+                    </a:p>
+                  </a:txBody>
+                  <a:tcPr/>
+                </a:tc>
+                <a:tc hMerge="1">
+                  <a:txBody>
+                    <a:bodyPr/>
+                    <a:lstStyle/>
+                    <a:p>
+                      <a:pPr algn="ctr"/>
+                      <a:endParaRPr lang="en-US" dirty="0"/>
+                    </a:p>
+                  </a:txBody>
+                  <a:tcPr/>
+                </a:tc>
+              </a:tr>
+            </a:tbl>
+          </a:graphicData>
+        </a:graphic>
+      </p:graphicFrame>
     </p:spTree>
     <p:extLst>
       <p:ext uri="{BB962C8B-B14F-4D97-AF65-F5344CB8AC3E}">
-        <p14:creationId xmlns:p14="http://schemas.microsoft.com/office/powerpoint/2010/main" val="362402730"/>
+        <p14:creationId xmlns:p14="http://schemas.microsoft.com/office/powerpoint/2010/main" xmlns="" val="362402730"/>
       </p:ext>
     </p:extLst>
   </p:cSld>
   <p:clrMapOvr>
     <a:masterClrMapping/>
   </p:clrMapOvr>
-  <p:transition xmlns:p14="http://schemas.microsoft.com/office/powerpoint/2010/main"/>
+  <p:transition/>
 </p:sld>
 </file>
 
@@ -5945,14 +7988,14 @@
     </p:spTree>
     <p:extLst>
       <p:ext uri="{BB962C8B-B14F-4D97-AF65-F5344CB8AC3E}">
-        <p14:creationId xmlns:p14="http://schemas.microsoft.com/office/powerpoint/2010/main" val="3900623210"/>
+        <p14:creationId xmlns:p14="http://schemas.microsoft.com/office/powerpoint/2010/main" xmlns="" val="3900623210"/>
       </p:ext>
     </p:extLst>
   </p:cSld>
   <p:clrMapOvr>
     <a:masterClrMapping/>
   </p:clrMapOvr>
-  <p:transition xmlns:p14="http://schemas.microsoft.com/office/powerpoint/2010/main"/>
+  <p:transition/>
 </p:sld>
 </file>
 
@@ -6044,7 +8087,7 @@
           <a:blip r:embed="rId2">
             <a:extLst>
               <a:ext uri="{28A0092B-C50C-407E-A947-70E740481C1C}">
-                <a14:useLocalDpi xmlns:a14="http://schemas.microsoft.com/office/drawing/2010/main" val="0"/>
+                <a14:useLocalDpi xmlns:a14="http://schemas.microsoft.com/office/drawing/2010/main" xmlns="" val="0"/>
               </a:ext>
             </a:extLst>
           </a:blip>
@@ -6065,18 +8108,18 @@
     </p:spTree>
     <p:extLst>
       <p:ext uri="{BB962C8B-B14F-4D97-AF65-F5344CB8AC3E}">
-        <p14:creationId xmlns:p14="http://schemas.microsoft.com/office/powerpoint/2010/main" val="3860986555"/>
+        <p14:creationId xmlns:p14="http://schemas.microsoft.com/office/powerpoint/2010/main" xmlns="" val="3860986555"/>
       </p:ext>
     </p:extLst>
   </p:cSld>
   <p:clrMapOvr>
     <a:masterClrMapping/>
   </p:clrMapOvr>
-  <p:transition xmlns:p14="http://schemas.microsoft.com/office/powerpoint/2010/main"/>
+  <p:transition/>
   <p:timing>
     <p:tnLst>
       <p:par>
-        <p:cTn xmlns:p14="http://schemas.microsoft.com/office/powerpoint/2010/main" id="1" dur="indefinite" restart="never" nodeType="tmRoot"/>
+        <p:cTn id="1" dur="indefinite" restart="never" nodeType="tmRoot"/>
       </p:par>
     </p:tnLst>
   </p:timing>
@@ -6163,7 +8206,7 @@
           <a:blip r:embed="rId2">
             <a:extLst>
               <a:ext uri="{28A0092B-C50C-407E-A947-70E740481C1C}">
-                <a14:useLocalDpi xmlns:a14="http://schemas.microsoft.com/office/drawing/2010/main" val="0"/>
+                <a14:useLocalDpi xmlns:a14="http://schemas.microsoft.com/office/drawing/2010/main" xmlns="" val="0"/>
               </a:ext>
             </a:extLst>
           </a:blip>
@@ -6192,7 +8235,7 @@
           <a:blip r:embed="rId3">
             <a:extLst>
               <a:ext uri="{28A0092B-C50C-407E-A947-70E740481C1C}">
-                <a14:useLocalDpi xmlns:a14="http://schemas.microsoft.com/office/drawing/2010/main" val="0"/>
+                <a14:useLocalDpi xmlns:a14="http://schemas.microsoft.com/office/drawing/2010/main" xmlns="" val="0"/>
               </a:ext>
             </a:extLst>
           </a:blip>
@@ -6297,18 +8340,18 @@
     </p:spTree>
     <p:extLst>
       <p:ext uri="{BB962C8B-B14F-4D97-AF65-F5344CB8AC3E}">
-        <p14:creationId xmlns:p14="http://schemas.microsoft.com/office/powerpoint/2010/main" val="2546543918"/>
+        <p14:creationId xmlns:p14="http://schemas.microsoft.com/office/powerpoint/2010/main" xmlns="" val="2546543918"/>
       </p:ext>
     </p:extLst>
   </p:cSld>
   <p:clrMapOvr>
     <a:masterClrMapping/>
   </p:clrMapOvr>
-  <p:transition xmlns:p14="http://schemas.microsoft.com/office/powerpoint/2010/main"/>
+  <p:transition/>
   <p:timing>
     <p:tnLst>
       <p:par>
-        <p:cTn xmlns:p14="http://schemas.microsoft.com/office/powerpoint/2010/main" id="1" dur="indefinite" restart="never" nodeType="tmRoot"/>
+        <p:cTn id="1" dur="indefinite" restart="never" nodeType="tmRoot"/>
       </p:par>
     </p:tnLst>
   </p:timing>
@@ -6346,7 +8389,7 @@
           <a:blip r:embed="rId3">
             <a:extLst>
               <a:ext uri="{28A0092B-C50C-407E-A947-70E740481C1C}">
-                <a14:useLocalDpi xmlns:a14="http://schemas.microsoft.com/office/drawing/2010/main" val="0"/>
+                <a14:useLocalDpi xmlns:a14="http://schemas.microsoft.com/office/drawing/2010/main" xmlns="" val="0"/>
               </a:ext>
             </a:extLst>
           </a:blip>
@@ -6391,11 +8434,11 @@
   <p:clrMapOvr>
     <a:masterClrMapping/>
   </p:clrMapOvr>
-  <p:transition xmlns:p14="http://schemas.microsoft.com/office/powerpoint/2010/main"/>
+  <p:transition/>
   <p:timing>
     <p:tnLst>
       <p:par>
-        <p:cTn xmlns:p14="http://schemas.microsoft.com/office/powerpoint/2010/main" id="1" dur="indefinite" restart="never" nodeType="tmRoot"/>
+        <p:cTn id="1" dur="indefinite" restart="never" nodeType="tmRoot"/>
       </p:par>
     </p:tnLst>
   </p:timing>
@@ -6458,7 +8501,7 @@
           <a:blip r:embed="rId2">
             <a:extLst>
               <a:ext uri="{28A0092B-C50C-407E-A947-70E740481C1C}">
-                <a14:useLocalDpi xmlns:a14="http://schemas.microsoft.com/office/drawing/2010/main" val="0"/>
+                <a14:useLocalDpi xmlns:a14="http://schemas.microsoft.com/office/drawing/2010/main" xmlns="" val="0"/>
               </a:ext>
             </a:extLst>
           </a:blip>
@@ -6479,14 +8522,14 @@
     </p:spTree>
     <p:extLst>
       <p:ext uri="{BB962C8B-B14F-4D97-AF65-F5344CB8AC3E}">
-        <p14:creationId xmlns:p14="http://schemas.microsoft.com/office/powerpoint/2010/main" val="254796501"/>
+        <p14:creationId xmlns:p14="http://schemas.microsoft.com/office/powerpoint/2010/main" xmlns="" val="254796501"/>
       </p:ext>
     </p:extLst>
   </p:cSld>
   <p:clrMapOvr>
     <a:masterClrMapping/>
   </p:clrMapOvr>
-  <p:transition xmlns:p14="http://schemas.microsoft.com/office/powerpoint/2010/main"/>
+  <p:transition/>
 </p:sld>
 </file>
 
@@ -6530,25 +8573,6 @@
           </a:p>
         </p:txBody>
       </p:sp>
-      <p:sp>
-        <p:nvSpPr>
-          <p:cNvPr id="5" name="Content Placeholder 4"/>
-          <p:cNvSpPr>
-            <a:spLocks noGrp="1"/>
-          </p:cNvSpPr>
-          <p:nvPr>
-            <p:ph idx="1"/>
-          </p:nvPr>
-        </p:nvSpPr>
-        <p:spPr/>
-        <p:txBody>
-          <a:bodyPr/>
-          <a:lstStyle/>
-          <a:p>
-            <a:endParaRPr lang="en-US" dirty="0"/>
-          </a:p>
-        </p:txBody>
-      </p:sp>
       <p:pic>
         <p:nvPicPr>
           <p:cNvPr id="7" name="Picture 6" descr="undirected-graph.png"/>
@@ -6561,7 +8585,7 @@
           <a:blip r:embed="rId2">
             <a:extLst>
               <a:ext uri="{28A0092B-C50C-407E-A947-70E740481C1C}">
-                <a14:useLocalDpi xmlns:a14="http://schemas.microsoft.com/office/drawing/2010/main" val="0"/>
+                <a14:useLocalDpi xmlns:a14="http://schemas.microsoft.com/office/drawing/2010/main" xmlns="" val="0"/>
               </a:ext>
             </a:extLst>
           </a:blip>
@@ -6591,7 +8615,7 @@
           <a:blip r:embed="rId3">
             <a:extLst>
               <a:ext uri="{28A0092B-C50C-407E-A947-70E740481C1C}">
-                <a14:useLocalDpi xmlns:a14="http://schemas.microsoft.com/office/drawing/2010/main" val="0"/>
+                <a14:useLocalDpi xmlns:a14="http://schemas.microsoft.com/office/drawing/2010/main" xmlns="" val="0"/>
               </a:ext>
             </a:extLst>
           </a:blip>
@@ -6623,11 +8647,9 @@
           <a:prstGeom prst="rightArrow">
             <a:avLst/>
           </a:prstGeom>
-          <a:blipFill dpi="0" rotWithShape="0">
-            <a:blip r:embed="rId4"/>
-            <a:srcRect/>
-            <a:tile tx="0" ty="0" sx="100000" sy="100000" flip="none" algn="tl"/>
-          </a:blipFill>
+          <a:solidFill>
+            <a:schemeClr val="bg1"/>
+          </a:solidFill>
           <a:ln w="12700" cap="flat" cmpd="sng" algn="ctr">
             <a:noFill/>
             <a:prstDash val="solid"/>
@@ -6680,18 +8702,18 @@
     </p:spTree>
     <p:extLst>
       <p:ext uri="{BB962C8B-B14F-4D97-AF65-F5344CB8AC3E}">
-        <p14:creationId xmlns:p14="http://schemas.microsoft.com/office/powerpoint/2010/main" val="2674181576"/>
+        <p14:creationId xmlns:p14="http://schemas.microsoft.com/office/powerpoint/2010/main" xmlns="" val="2674181576"/>
       </p:ext>
     </p:extLst>
   </p:cSld>
   <p:clrMapOvr>
     <a:masterClrMapping/>
   </p:clrMapOvr>
-  <p:transition xmlns:p14="http://schemas.microsoft.com/office/powerpoint/2010/main"/>
+  <p:transition/>
   <p:timing>
     <p:tnLst>
       <p:par>
-        <p:cTn xmlns:p14="http://schemas.microsoft.com/office/powerpoint/2010/main" id="1" dur="indefinite" restart="never" nodeType="tmRoot"/>
+        <p:cTn id="1" dur="indefinite" restart="never" nodeType="tmRoot"/>
       </p:par>
     </p:tnLst>
   </p:timing>
@@ -6775,18 +8797,18 @@
     </p:spTree>
     <p:extLst>
       <p:ext uri="{BB962C8B-B14F-4D97-AF65-F5344CB8AC3E}">
-        <p14:creationId xmlns:p14="http://schemas.microsoft.com/office/powerpoint/2010/main" val="869085038"/>
+        <p14:creationId xmlns:p14="http://schemas.microsoft.com/office/powerpoint/2010/main" xmlns="" val="869085038"/>
       </p:ext>
     </p:extLst>
   </p:cSld>
   <p:clrMapOvr>
     <a:masterClrMapping/>
   </p:clrMapOvr>
-  <p:transition xmlns:p14="http://schemas.microsoft.com/office/powerpoint/2010/main"/>
+  <p:transition/>
   <p:timing>
     <p:tnLst>
       <p:par>
-        <p:cTn xmlns:p14="http://schemas.microsoft.com/office/powerpoint/2010/main" id="1" dur="indefinite" restart="never" nodeType="tmRoot"/>
+        <p:cTn id="1" dur="indefinite" restart="never" nodeType="tmRoot"/>
       </p:par>
     </p:tnLst>
   </p:timing>
@@ -6877,14 +8899,14 @@
     </p:spTree>
     <p:extLst>
       <p:ext uri="{BB962C8B-B14F-4D97-AF65-F5344CB8AC3E}">
-        <p14:creationId xmlns:p14="http://schemas.microsoft.com/office/powerpoint/2010/main" val="3691841903"/>
+        <p14:creationId xmlns:p14="http://schemas.microsoft.com/office/powerpoint/2010/main" xmlns="" val="3691841903"/>
       </p:ext>
     </p:extLst>
   </p:cSld>
   <p:clrMapOvr>
     <a:masterClrMapping/>
   </p:clrMapOvr>
-  <p:transition xmlns:p14="http://schemas.microsoft.com/office/powerpoint/2010/main"/>
+  <p:transition/>
 </p:sld>
 </file>
 
@@ -6960,18 +8982,18 @@
     </p:spTree>
     <p:extLst>
       <p:ext uri="{BB962C8B-B14F-4D97-AF65-F5344CB8AC3E}">
-        <p14:creationId xmlns:p14="http://schemas.microsoft.com/office/powerpoint/2010/main" val="2161218610"/>
+        <p14:creationId xmlns:p14="http://schemas.microsoft.com/office/powerpoint/2010/main" xmlns="" val="2161218610"/>
       </p:ext>
     </p:extLst>
   </p:cSld>
   <p:clrMapOvr>
     <a:masterClrMapping/>
   </p:clrMapOvr>
-  <p:transition xmlns:p14="http://schemas.microsoft.com/office/powerpoint/2010/main"/>
+  <p:transition/>
   <p:timing>
     <p:tnLst>
       <p:par>
-        <p:cTn xmlns:p14="http://schemas.microsoft.com/office/powerpoint/2010/main" id="1" dur="indefinite" restart="never" nodeType="tmRoot"/>
+        <p:cTn id="1" dur="indefinite" restart="never" nodeType="tmRoot"/>
       </p:par>
     </p:tnLst>
   </p:timing>

</xml_diff>

<commit_message>
Processed first feedback by Tom, Tom and Max.
</commit_message>
<xml_diff>
--- a/docs/proposal presentation/Proposal presentation.pptx
+++ b/docs/proposal presentation/Proposal presentation.pptx
@@ -5779,8 +5779,23 @@
           <a:p>
             <a:r>
               <a:rPr lang="en-US" dirty="0" smtClean="0"/>
-              <a:t>114 voxels</a:t>
-            </a:r>
+              <a:t>116 area’s / nodes</a:t>
+            </a:r>
+          </a:p>
+          <a:p>
+            <a:r>
+              <a:rPr lang="en-US" dirty="0" smtClean="0"/>
+              <a:t>1029 </a:t>
+            </a:r>
+            <a:r>
+              <a:rPr lang="en-US" dirty="0" err="1" smtClean="0"/>
+              <a:t>timeseries</a:t>
+            </a:r>
+            <a:r>
+              <a:rPr lang="en-US" dirty="0" smtClean="0"/>
+              <a:t> measurements</a:t>
+            </a:r>
+            <a:endParaRPr lang="en-US" dirty="0" smtClean="0"/>
           </a:p>
           <a:p>
             <a:endParaRPr lang="en-US" dirty="0"/>
@@ -5805,6 +5820,13 @@
     <a:masterClrMapping/>
   </p:clrMapOvr>
   <p:transition xmlns:p14="http://schemas.microsoft.com/office/powerpoint/2010/main"/>
+  <p:timing>
+    <p:tnLst>
+      <p:par>
+        <p:cTn xmlns:p14="http://schemas.microsoft.com/office/powerpoint/2010/main" id="1" dur="indefinite" restart="never" nodeType="tmRoot"/>
+      </p:par>
+    </p:tnLst>
+  </p:timing>
 </p:sld>
 </file>
 
@@ -5893,13 +5915,32 @@
             <a:pPr lvl="1"/>
             <a:r>
               <a:rPr lang="en-US" dirty="0" smtClean="0"/>
-              <a:t>Result is a directed graph</a:t>
-            </a:r>
-          </a:p>
-          <a:p>
+              <a:t>Result is a </a:t>
+            </a:r>
+            <a:r>
+              <a:rPr lang="en-US" u="sng" dirty="0" smtClean="0"/>
+              <a:t>partially</a:t>
+            </a:r>
             <a:r>
               <a:rPr lang="en-US" dirty="0" smtClean="0"/>
-              <a:t>BCCD (implementation available)</a:t>
+              <a:t> directed </a:t>
+            </a:r>
+            <a:r>
+              <a:rPr lang="en-US" dirty="0" smtClean="0"/>
+              <a:t>graph</a:t>
+            </a:r>
+          </a:p>
+          <a:p>
+            <a:endParaRPr lang="en-US" dirty="0" smtClean="0"/>
+          </a:p>
+          <a:p>
+            <a:r>
+              <a:rPr lang="en-US" dirty="0" smtClean="0"/>
+              <a:t>BCCD </a:t>
+            </a:r>
+            <a:r>
+              <a:rPr lang="en-US" dirty="0" smtClean="0"/>
+              <a:t>(implementation available)</a:t>
             </a:r>
           </a:p>
           <a:p>
@@ -6221,7 +6262,7 @@
             <a:prstDash val="solid"/>
             <a:round/>
             <a:headEnd type="none" w="med" len="med"/>
-            <a:tailEnd type="triangle"/>
+            <a:tailEnd type="triangle" w="lg" len="lg"/>
           </a:ln>
           <a:effectLst/>
         </p:spPr>
@@ -6255,7 +6296,7 @@
             <a:prstDash val="solid"/>
             <a:round/>
             <a:headEnd type="none" w="med" len="med"/>
-            <a:tailEnd type="triangle"/>
+            <a:tailEnd type="triangle" w="lg" len="lg"/>
           </a:ln>
           <a:effectLst/>
         </p:spPr>
@@ -6348,7 +6389,7 @@
             <a:prstDash val="solid"/>
             <a:round/>
             <a:headEnd type="none" w="med" len="med"/>
-            <a:tailEnd type="none"/>
+            <a:tailEnd type="triangle" w="lg" len="lg"/>
           </a:ln>
           <a:effectLst/>
         </p:spPr>
@@ -6441,7 +6482,7 @@
             <a:prstDash val="solid"/>
             <a:round/>
             <a:headEnd type="none" w="med" len="med"/>
-            <a:tailEnd type="triangle"/>
+            <a:tailEnd type="triangle" w="lg" len="lg"/>
           </a:ln>
           <a:effectLst/>
         </p:spPr>
@@ -6475,7 +6516,7 @@
             <a:prstDash val="solid"/>
             <a:round/>
             <a:headEnd type="none" w="med" len="med"/>
-            <a:tailEnd type="triangle"/>
+            <a:tailEnd type="triangle" w="lg" len="lg"/>
           </a:ln>
           <a:effectLst/>
         </p:spPr>
@@ -8438,14 +8479,14 @@
           <p:nvPr>
             <p:extLst>
               <p:ext uri="{D42A27DB-BD31-4B8C-83A1-F6EECF244321}">
-                <p14:modId xmlns:p14="http://schemas.microsoft.com/office/powerpoint/2010/main" val="524376206"/>
+                <p14:modId xmlns:p14="http://schemas.microsoft.com/office/powerpoint/2010/main" val="2773434210"/>
               </p:ext>
             </p:extLst>
           </p:nvPr>
         </p:nvGraphicFramePr>
         <p:xfrm>
           <a:off x="957786" y="5470872"/>
-          <a:ext cx="11161240" cy="1866055"/>
+          <a:ext cx="11467897" cy="2879346"/>
         </p:xfrm>
         <a:graphic>
           <a:graphicData uri="http://schemas.openxmlformats.org/drawingml/2006/table">
@@ -8458,10 +8499,10 @@
                 <a:gridCol w="982647"/>
                 <a:gridCol w="982647"/>
                 <a:gridCol w="982647"/>
-                <a:gridCol w="901867"/>
-                <a:gridCol w="1063428"/>
-                <a:gridCol w="1024804"/>
-                <a:gridCol w="1080119"/>
+                <a:gridCol w="1045879"/>
+                <a:gridCol w="919416"/>
+                <a:gridCol w="1169787"/>
+                <a:gridCol w="1241793"/>
                 <a:gridCol w="843017"/>
                 <a:gridCol w="982647"/>
                 <a:gridCol w="982647"/>
@@ -8753,6 +8794,1291 @@
                         <a:rPr lang="en-US" sz="1800" dirty="0" smtClean="0"/>
                         <a:t>PC</a:t>
                       </a:r>
+                    </a:p>
+                  </a:txBody>
+                  <a:tcPr>
+                    <a:lnL w="12700" cap="flat" cmpd="sng" algn="ctr">
+                      <a:solidFill>
+                        <a:schemeClr val="tx1"/>
+                      </a:solidFill>
+                      <a:prstDash val="solid"/>
+                      <a:round/>
+                      <a:headEnd type="none" w="med" len="med"/>
+                      <a:tailEnd type="none" w="med" len="med"/>
+                    </a:lnL>
+                    <a:lnR w="12700" cap="flat" cmpd="sng" algn="ctr">
+                      <a:solidFill>
+                        <a:schemeClr val="tx1"/>
+                      </a:solidFill>
+                      <a:prstDash val="solid"/>
+                      <a:round/>
+                      <a:headEnd type="none" w="med" len="med"/>
+                      <a:tailEnd type="none" w="med" len="med"/>
+                    </a:lnR>
+                    <a:lnT w="12700" cap="flat" cmpd="sng" algn="ctr">
+                      <a:solidFill>
+                        <a:schemeClr val="tx1"/>
+                      </a:solidFill>
+                      <a:prstDash val="solid"/>
+                      <a:round/>
+                      <a:headEnd type="none" w="med" len="med"/>
+                      <a:tailEnd type="none" w="med" len="med"/>
+                    </a:lnT>
+                    <a:lnB w="12700" cap="flat" cmpd="sng" algn="ctr">
+                      <a:solidFill>
+                        <a:schemeClr val="tx1"/>
+                      </a:solidFill>
+                      <a:prstDash val="solid"/>
+                      <a:round/>
+                      <a:headEnd type="none" w="med" len="med"/>
+                      <a:tailEnd type="none" w="med" len="med"/>
+                    </a:lnB>
+                  </a:tcPr>
+                </a:tc>
+                <a:tc gridSpan="3">
+                  <a:txBody>
+                    <a:bodyPr/>
+                    <a:lstStyle/>
+                    <a:p>
+                      <a:pPr algn="ctr"/>
+                      <a:r>
+                        <a:rPr lang="en-US" sz="1800" dirty="0" smtClean="0"/>
+                        <a:t>Implementation</a:t>
+                      </a:r>
+                      <a:endParaRPr lang="en-US" sz="1800" dirty="0"/>
+                    </a:p>
+                  </a:txBody>
+                  <a:tcPr>
+                    <a:lnL w="12700" cap="flat" cmpd="sng" algn="ctr">
+                      <a:solidFill>
+                        <a:schemeClr val="tx1"/>
+                      </a:solidFill>
+                      <a:prstDash val="solid"/>
+                      <a:round/>
+                      <a:headEnd type="none" w="med" len="med"/>
+                      <a:tailEnd type="none" w="med" len="med"/>
+                    </a:lnL>
+                    <a:lnR w="12700" cap="flat" cmpd="sng" algn="ctr">
+                      <a:solidFill>
+                        <a:schemeClr val="tx1"/>
+                      </a:solidFill>
+                      <a:prstDash val="solid"/>
+                      <a:round/>
+                      <a:headEnd type="none" w="med" len="med"/>
+                      <a:tailEnd type="none" w="med" len="med"/>
+                    </a:lnR>
+                    <a:lnT w="12700" cap="flat" cmpd="sng" algn="ctr">
+                      <a:solidFill>
+                        <a:schemeClr val="tx1"/>
+                      </a:solidFill>
+                      <a:prstDash val="solid"/>
+                      <a:round/>
+                      <a:headEnd type="none" w="med" len="med"/>
+                      <a:tailEnd type="none" w="med" len="med"/>
+                    </a:lnT>
+                    <a:lnB w="12700" cap="flat" cmpd="sng" algn="ctr">
+                      <a:solidFill>
+                        <a:schemeClr val="tx1"/>
+                      </a:solidFill>
+                      <a:prstDash val="solid"/>
+                      <a:round/>
+                      <a:headEnd type="none" w="med" len="med"/>
+                      <a:tailEnd type="none" w="med" len="med"/>
+                    </a:lnB>
+                    <a:solidFill>
+                      <a:srgbClr val="7F7F7F"/>
+                    </a:solidFill>
+                  </a:tcPr>
+                </a:tc>
+                <a:tc hMerge="1">
+                  <a:txBody>
+                    <a:bodyPr/>
+                    <a:lstStyle/>
+                    <a:p>
+                      <a:pPr algn="ctr"/>
+                      <a:endParaRPr lang="en-US" sz="1800" dirty="0"/>
+                    </a:p>
+                  </a:txBody>
+                  <a:tcPr>
+                    <a:lnL w="12700" cap="flat" cmpd="sng" algn="ctr">
+                      <a:solidFill>
+                        <a:schemeClr val="tx1"/>
+                      </a:solidFill>
+                      <a:prstDash val="solid"/>
+                      <a:round/>
+                      <a:headEnd type="none" w="med" len="med"/>
+                      <a:tailEnd type="none" w="med" len="med"/>
+                    </a:lnL>
+                    <a:lnR w="12700" cap="flat" cmpd="sng" algn="ctr">
+                      <a:solidFill>
+                        <a:schemeClr val="tx1"/>
+                      </a:solidFill>
+                      <a:prstDash val="solid"/>
+                      <a:round/>
+                      <a:headEnd type="none" w="med" len="med"/>
+                      <a:tailEnd type="none" w="med" len="med"/>
+                    </a:lnR>
+                    <a:lnT w="12700" cap="flat" cmpd="sng" algn="ctr">
+                      <a:solidFill>
+                        <a:schemeClr val="tx1"/>
+                      </a:solidFill>
+                      <a:prstDash val="solid"/>
+                      <a:round/>
+                      <a:headEnd type="none" w="med" len="med"/>
+                      <a:tailEnd type="none" w="med" len="med"/>
+                    </a:lnT>
+                    <a:lnB w="12700" cap="flat" cmpd="sng" algn="ctr">
+                      <a:solidFill>
+                        <a:schemeClr val="tx1"/>
+                      </a:solidFill>
+                      <a:prstDash val="solid"/>
+                      <a:round/>
+                      <a:headEnd type="none" w="med" len="med"/>
+                      <a:tailEnd type="none" w="med" len="med"/>
+                    </a:lnB>
+                    <a:solidFill>
+                      <a:srgbClr val="7F7F7F"/>
+                    </a:solidFill>
+                  </a:tcPr>
+                </a:tc>
+                <a:tc hMerge="1">
+                  <a:txBody>
+                    <a:bodyPr/>
+                    <a:lstStyle/>
+                    <a:p>
+                      <a:pPr algn="ctr"/>
+                      <a:endParaRPr lang="en-US" sz="1800" dirty="0"/>
+                    </a:p>
+                  </a:txBody>
+                  <a:tcPr>
+                    <a:lnL w="12700" cap="flat" cmpd="sng" algn="ctr">
+                      <a:solidFill>
+                        <a:schemeClr val="tx1"/>
+                      </a:solidFill>
+                      <a:prstDash val="solid"/>
+                      <a:round/>
+                      <a:headEnd type="none" w="med" len="med"/>
+                      <a:tailEnd type="none" w="med" len="med"/>
+                    </a:lnL>
+                    <a:lnR w="12700" cap="flat" cmpd="sng" algn="ctr">
+                      <a:solidFill>
+                        <a:schemeClr val="tx1"/>
+                      </a:solidFill>
+                      <a:prstDash val="solid"/>
+                      <a:round/>
+                      <a:headEnd type="none" w="med" len="med"/>
+                      <a:tailEnd type="none" w="med" len="med"/>
+                    </a:lnR>
+                    <a:lnT w="12700" cap="flat" cmpd="sng" algn="ctr">
+                      <a:solidFill>
+                        <a:schemeClr val="tx1"/>
+                      </a:solidFill>
+                      <a:prstDash val="solid"/>
+                      <a:round/>
+                      <a:headEnd type="none" w="med" len="med"/>
+                      <a:tailEnd type="none" w="med" len="med"/>
+                    </a:lnT>
+                    <a:lnB w="12700" cap="flat" cmpd="sng" algn="ctr">
+                      <a:solidFill>
+                        <a:schemeClr val="tx1"/>
+                      </a:solidFill>
+                      <a:prstDash val="solid"/>
+                      <a:round/>
+                      <a:headEnd type="none" w="med" len="med"/>
+                      <a:tailEnd type="none" w="med" len="med"/>
+                    </a:lnB>
+                    <a:solidFill>
+                      <a:srgbClr val="7F7F7F"/>
+                    </a:solidFill>
+                  </a:tcPr>
+                </a:tc>
+                <a:tc gridSpan="2">
+                  <a:txBody>
+                    <a:bodyPr/>
+                    <a:lstStyle/>
+                    <a:p>
+                      <a:pPr algn="ctr"/>
+                      <a:r>
+                        <a:rPr lang="en-US" sz="1800" dirty="0" smtClean="0"/>
+                        <a:t>with</a:t>
+                      </a:r>
+                      <a:r>
+                        <a:rPr lang="en-US" sz="1800" baseline="0" dirty="0" smtClean="0"/>
+                        <a:t> structure</a:t>
+                      </a:r>
+                      <a:endParaRPr lang="en-US" sz="1800" dirty="0"/>
+                    </a:p>
+                  </a:txBody>
+                  <a:tcPr>
+                    <a:lnL w="12700" cap="flat" cmpd="sng" algn="ctr">
+                      <a:solidFill>
+                        <a:schemeClr val="tx1"/>
+                      </a:solidFill>
+                      <a:prstDash val="solid"/>
+                      <a:round/>
+                      <a:headEnd type="none" w="med" len="med"/>
+                      <a:tailEnd type="none" w="med" len="med"/>
+                    </a:lnL>
+                    <a:lnR w="12700" cap="flat" cmpd="sng" algn="ctr">
+                      <a:solidFill>
+                        <a:schemeClr val="tx1"/>
+                      </a:solidFill>
+                      <a:prstDash val="solid"/>
+                      <a:round/>
+                      <a:headEnd type="none" w="med" len="med"/>
+                      <a:tailEnd type="none" w="med" len="med"/>
+                    </a:lnR>
+                    <a:lnT w="12700" cap="flat" cmpd="sng" algn="ctr">
+                      <a:solidFill>
+                        <a:schemeClr val="tx1"/>
+                      </a:solidFill>
+                      <a:prstDash val="solid"/>
+                      <a:round/>
+                      <a:headEnd type="none" w="med" len="med"/>
+                      <a:tailEnd type="none" w="med" len="med"/>
+                    </a:lnT>
+                    <a:lnB w="12700" cap="flat" cmpd="sng" algn="ctr">
+                      <a:solidFill>
+                        <a:schemeClr val="tx1"/>
+                      </a:solidFill>
+                      <a:prstDash val="solid"/>
+                      <a:round/>
+                      <a:headEnd type="none" w="med" len="med"/>
+                      <a:tailEnd type="none" w="med" len="med"/>
+                    </a:lnB>
+                    <a:solidFill>
+                      <a:srgbClr val="7F7F7F"/>
+                    </a:solidFill>
+                  </a:tcPr>
+                </a:tc>
+                <a:tc hMerge="1">
+                  <a:txBody>
+                    <a:bodyPr/>
+                    <a:lstStyle/>
+                    <a:p>
+                      <a:pPr algn="ctr"/>
+                      <a:endParaRPr lang="en-US" sz="1800" dirty="0"/>
+                    </a:p>
+                  </a:txBody>
+                  <a:tcPr>
+                    <a:lnL w="12700" cap="flat" cmpd="sng" algn="ctr">
+                      <a:solidFill>
+                        <a:schemeClr val="tx1"/>
+                      </a:solidFill>
+                      <a:prstDash val="solid"/>
+                      <a:round/>
+                      <a:headEnd type="none" w="med" len="med"/>
+                      <a:tailEnd type="none" w="med" len="med"/>
+                    </a:lnL>
+                    <a:lnR w="12700" cap="flat" cmpd="sng" algn="ctr">
+                      <a:solidFill>
+                        <a:schemeClr val="tx1"/>
+                      </a:solidFill>
+                      <a:prstDash val="solid"/>
+                      <a:round/>
+                      <a:headEnd type="none" w="med" len="med"/>
+                      <a:tailEnd type="none" w="med" len="med"/>
+                    </a:lnR>
+                    <a:lnT w="12700" cap="flat" cmpd="sng" algn="ctr">
+                      <a:solidFill>
+                        <a:schemeClr val="tx1"/>
+                      </a:solidFill>
+                      <a:prstDash val="solid"/>
+                      <a:round/>
+                      <a:headEnd type="none" w="med" len="med"/>
+                      <a:tailEnd type="none" w="med" len="med"/>
+                    </a:lnT>
+                    <a:lnB w="12700" cap="flat" cmpd="sng" algn="ctr">
+                      <a:solidFill>
+                        <a:schemeClr val="tx1"/>
+                      </a:solidFill>
+                      <a:prstDash val="solid"/>
+                      <a:round/>
+                      <a:headEnd type="none" w="med" len="med"/>
+                      <a:tailEnd type="none" w="med" len="med"/>
+                    </a:lnB>
+                    <a:solidFill>
+                      <a:srgbClr val="7F7F7F"/>
+                    </a:solidFill>
+                  </a:tcPr>
+                </a:tc>
+                <a:tc>
+                  <a:txBody>
+                    <a:bodyPr/>
+                    <a:lstStyle/>
+                    <a:p>
+                      <a:pPr algn="ctr"/>
+                      <a:endParaRPr lang="en-US" sz="1800" dirty="0"/>
+                    </a:p>
+                  </a:txBody>
+                  <a:tcPr>
+                    <a:lnL w="12700" cap="flat" cmpd="sng" algn="ctr">
+                      <a:solidFill>
+                        <a:schemeClr val="tx1"/>
+                      </a:solidFill>
+                      <a:prstDash val="solid"/>
+                      <a:round/>
+                      <a:headEnd type="none" w="med" len="med"/>
+                      <a:tailEnd type="none" w="med" len="med"/>
+                    </a:lnL>
+                    <a:lnR w="12700" cap="flat" cmpd="sng" algn="ctr">
+                      <a:solidFill>
+                        <a:schemeClr val="tx1"/>
+                      </a:solidFill>
+                      <a:prstDash val="solid"/>
+                      <a:round/>
+                      <a:headEnd type="none" w="med" len="med"/>
+                      <a:tailEnd type="none" w="med" len="med"/>
+                    </a:lnR>
+                    <a:lnT w="12700" cap="flat" cmpd="sng" algn="ctr">
+                      <a:solidFill>
+                        <a:schemeClr val="tx1"/>
+                      </a:solidFill>
+                      <a:prstDash val="solid"/>
+                      <a:round/>
+                      <a:headEnd type="none" w="med" len="med"/>
+                      <a:tailEnd type="none" w="med" len="med"/>
+                    </a:lnT>
+                    <a:lnB w="12700" cap="flat" cmpd="sng" algn="ctr">
+                      <a:solidFill>
+                        <a:schemeClr val="tx1"/>
+                      </a:solidFill>
+                      <a:prstDash val="solid"/>
+                      <a:round/>
+                      <a:headEnd type="none" w="med" len="med"/>
+                      <a:tailEnd type="none" w="med" len="med"/>
+                    </a:lnB>
+                  </a:tcPr>
+                </a:tc>
+                <a:tc>
+                  <a:txBody>
+                    <a:bodyPr/>
+                    <a:lstStyle/>
+                    <a:p>
+                      <a:pPr algn="ctr"/>
+                      <a:endParaRPr lang="en-US" sz="1800" dirty="0"/>
+                    </a:p>
+                  </a:txBody>
+                  <a:tcPr>
+                    <a:lnL w="12700" cap="flat" cmpd="sng" algn="ctr">
+                      <a:solidFill>
+                        <a:schemeClr val="tx1"/>
+                      </a:solidFill>
+                      <a:prstDash val="solid"/>
+                      <a:round/>
+                      <a:headEnd type="none" w="med" len="med"/>
+                      <a:tailEnd type="none" w="med" len="med"/>
+                    </a:lnL>
+                    <a:lnR w="12700" cap="flat" cmpd="sng" algn="ctr">
+                      <a:solidFill>
+                        <a:schemeClr val="tx1"/>
+                      </a:solidFill>
+                      <a:prstDash val="solid"/>
+                      <a:round/>
+                      <a:headEnd type="none" w="med" len="med"/>
+                      <a:tailEnd type="none" w="med" len="med"/>
+                    </a:lnR>
+                    <a:lnT w="12700" cap="flat" cmpd="sng" algn="ctr">
+                      <a:solidFill>
+                        <a:schemeClr val="tx1"/>
+                      </a:solidFill>
+                      <a:prstDash val="solid"/>
+                      <a:round/>
+                      <a:headEnd type="none" w="med" len="med"/>
+                      <a:tailEnd type="none" w="med" len="med"/>
+                    </a:lnT>
+                    <a:lnB w="12700" cap="flat" cmpd="sng" algn="ctr">
+                      <a:solidFill>
+                        <a:schemeClr val="tx1"/>
+                      </a:solidFill>
+                      <a:prstDash val="solid"/>
+                      <a:round/>
+                      <a:headEnd type="none" w="med" len="med"/>
+                      <a:tailEnd type="none" w="med" len="med"/>
+                    </a:lnB>
+                  </a:tcPr>
+                </a:tc>
+                <a:tc>
+                  <a:txBody>
+                    <a:bodyPr/>
+                    <a:lstStyle/>
+                    <a:p>
+                      <a:pPr algn="ctr"/>
+                      <a:endParaRPr lang="en-US" sz="1800" dirty="0"/>
+                    </a:p>
+                  </a:txBody>
+                  <a:tcPr>
+                    <a:lnL w="12700" cap="flat" cmpd="sng" algn="ctr">
+                      <a:solidFill>
+                        <a:schemeClr val="tx1"/>
+                      </a:solidFill>
+                      <a:prstDash val="solid"/>
+                      <a:round/>
+                      <a:headEnd type="none" w="med" len="med"/>
+                      <a:tailEnd type="none" w="med" len="med"/>
+                    </a:lnL>
+                    <a:lnR w="12700" cap="flat" cmpd="sng" algn="ctr">
+                      <a:solidFill>
+                        <a:schemeClr val="tx1"/>
+                      </a:solidFill>
+                      <a:prstDash val="solid"/>
+                      <a:round/>
+                      <a:headEnd type="none" w="med" len="med"/>
+                      <a:tailEnd type="none" w="med" len="med"/>
+                    </a:lnR>
+                    <a:lnT w="12700" cap="flat" cmpd="sng" algn="ctr">
+                      <a:solidFill>
+                        <a:schemeClr val="tx1"/>
+                      </a:solidFill>
+                      <a:prstDash val="solid"/>
+                      <a:round/>
+                      <a:headEnd type="none" w="med" len="med"/>
+                      <a:tailEnd type="none" w="med" len="med"/>
+                    </a:lnT>
+                    <a:lnB w="12700" cap="flat" cmpd="sng" algn="ctr">
+                      <a:solidFill>
+                        <a:schemeClr val="tx1"/>
+                      </a:solidFill>
+                      <a:prstDash val="solid"/>
+                      <a:round/>
+                      <a:headEnd type="none" w="med" len="med"/>
+                      <a:tailEnd type="none" w="med" len="med"/>
+                    </a:lnB>
+                  </a:tcPr>
+                </a:tc>
+                <a:tc>
+                  <a:txBody>
+                    <a:bodyPr/>
+                    <a:lstStyle/>
+                    <a:p>
+                      <a:pPr algn="ctr"/>
+                      <a:endParaRPr lang="en-US" sz="1800" dirty="0"/>
+                    </a:p>
+                  </a:txBody>
+                  <a:tcPr>
+                    <a:lnL w="12700" cap="flat" cmpd="sng" algn="ctr">
+                      <a:solidFill>
+                        <a:schemeClr val="tx1"/>
+                      </a:solidFill>
+                      <a:prstDash val="solid"/>
+                      <a:round/>
+                      <a:headEnd type="none" w="med" len="med"/>
+                      <a:tailEnd type="none" w="med" len="med"/>
+                    </a:lnL>
+                    <a:lnR w="12700" cap="flat" cmpd="sng" algn="ctr">
+                      <a:solidFill>
+                        <a:schemeClr val="tx1"/>
+                      </a:solidFill>
+                      <a:prstDash val="solid"/>
+                      <a:round/>
+                      <a:headEnd type="none" w="med" len="med"/>
+                      <a:tailEnd type="none" w="med" len="med"/>
+                    </a:lnR>
+                    <a:lnT w="12700" cap="flat" cmpd="sng" algn="ctr">
+                      <a:solidFill>
+                        <a:schemeClr val="tx1"/>
+                      </a:solidFill>
+                      <a:prstDash val="solid"/>
+                      <a:round/>
+                      <a:headEnd type="none" w="med" len="med"/>
+                      <a:tailEnd type="none" w="med" len="med"/>
+                    </a:lnT>
+                    <a:lnB w="12700" cap="flat" cmpd="sng" algn="ctr">
+                      <a:solidFill>
+                        <a:schemeClr val="tx1"/>
+                      </a:solidFill>
+                      <a:prstDash val="solid"/>
+                      <a:round/>
+                      <a:headEnd type="none" w="med" len="med"/>
+                      <a:tailEnd type="none" w="med" len="med"/>
+                    </a:lnB>
+                  </a:tcPr>
+                </a:tc>
+                <a:tc>
+                  <a:txBody>
+                    <a:bodyPr/>
+                    <a:lstStyle/>
+                    <a:p>
+                      <a:pPr algn="ctr"/>
+                      <a:endParaRPr lang="en-US" sz="1800" dirty="0"/>
+                    </a:p>
+                  </a:txBody>
+                  <a:tcPr>
+                    <a:lnL w="12700" cap="flat" cmpd="sng" algn="ctr">
+                      <a:solidFill>
+                        <a:schemeClr val="tx1"/>
+                      </a:solidFill>
+                      <a:prstDash val="solid"/>
+                      <a:round/>
+                      <a:headEnd type="none" w="med" len="med"/>
+                      <a:tailEnd type="none" w="med" len="med"/>
+                    </a:lnL>
+                    <a:lnR w="12700" cap="flat" cmpd="sng" algn="ctr">
+                      <a:solidFill>
+                        <a:schemeClr val="tx1"/>
+                      </a:solidFill>
+                      <a:prstDash val="solid"/>
+                      <a:round/>
+                      <a:headEnd type="none" w="med" len="med"/>
+                      <a:tailEnd type="none" w="med" len="med"/>
+                    </a:lnR>
+                    <a:lnT w="12700" cap="flat" cmpd="sng" algn="ctr">
+                      <a:solidFill>
+                        <a:schemeClr val="tx1"/>
+                      </a:solidFill>
+                      <a:prstDash val="solid"/>
+                      <a:round/>
+                      <a:headEnd type="none" w="med" len="med"/>
+                      <a:tailEnd type="none" w="med" len="med"/>
+                    </a:lnT>
+                    <a:lnB w="12700" cap="flat" cmpd="sng" algn="ctr">
+                      <a:solidFill>
+                        <a:schemeClr val="tx1"/>
+                      </a:solidFill>
+                      <a:prstDash val="solid"/>
+                      <a:round/>
+                      <a:headEnd type="none" w="med" len="med"/>
+                      <a:tailEnd type="none" w="med" len="med"/>
+                    </a:lnB>
+                  </a:tcPr>
+                </a:tc>
+              </a:tr>
+              <a:tr h="373211">
+                <a:tc>
+                  <a:txBody>
+                    <a:bodyPr/>
+                    <a:lstStyle/>
+                    <a:p>
+                      <a:endParaRPr lang="en-US" sz="1800" dirty="0" smtClean="0"/>
+                    </a:p>
+                  </a:txBody>
+                  <a:tcPr>
+                    <a:lnL w="12700" cap="flat" cmpd="sng" algn="ctr">
+                      <a:solidFill>
+                        <a:schemeClr val="tx1"/>
+                      </a:solidFill>
+                      <a:prstDash val="solid"/>
+                      <a:round/>
+                      <a:headEnd type="none" w="med" len="med"/>
+                      <a:tailEnd type="none" w="med" len="med"/>
+                    </a:lnL>
+                    <a:lnR w="12700" cap="flat" cmpd="sng" algn="ctr">
+                      <a:solidFill>
+                        <a:schemeClr val="tx1"/>
+                      </a:solidFill>
+                      <a:prstDash val="solid"/>
+                      <a:round/>
+                      <a:headEnd type="none" w="med" len="med"/>
+                      <a:tailEnd type="none" w="med" len="med"/>
+                    </a:lnR>
+                    <a:lnT w="12700" cap="flat" cmpd="sng" algn="ctr">
+                      <a:solidFill>
+                        <a:schemeClr val="tx1"/>
+                      </a:solidFill>
+                      <a:prstDash val="solid"/>
+                      <a:round/>
+                      <a:headEnd type="none" w="med" len="med"/>
+                      <a:tailEnd type="none" w="med" len="med"/>
+                    </a:lnT>
+                    <a:lnB w="12700" cap="flat" cmpd="sng" algn="ctr">
+                      <a:solidFill>
+                        <a:schemeClr val="tx1"/>
+                      </a:solidFill>
+                      <a:prstDash val="solid"/>
+                      <a:round/>
+                      <a:headEnd type="none" w="med" len="med"/>
+                      <a:tailEnd type="none" w="med" len="med"/>
+                    </a:lnB>
+                  </a:tcPr>
+                </a:tc>
+                <a:tc gridSpan="2">
+                  <a:txBody>
+                    <a:bodyPr/>
+                    <a:lstStyle/>
+                    <a:p>
+                      <a:pPr algn="ctr"/>
+                      <a:endParaRPr lang="en-US" sz="1800" dirty="0"/>
+                    </a:p>
+                  </a:txBody>
+                  <a:tcPr>
+                    <a:lnL w="12700" cap="flat" cmpd="sng" algn="ctr">
+                      <a:solidFill>
+                        <a:schemeClr val="tx1"/>
+                      </a:solidFill>
+                      <a:prstDash val="solid"/>
+                      <a:round/>
+                      <a:headEnd type="none" w="med" len="med"/>
+                      <a:tailEnd type="none" w="med" len="med"/>
+                    </a:lnL>
+                    <a:lnR w="12700" cap="flat" cmpd="sng" algn="ctr">
+                      <a:solidFill>
+                        <a:schemeClr val="tx1"/>
+                      </a:solidFill>
+                      <a:prstDash val="solid"/>
+                      <a:round/>
+                      <a:headEnd type="none" w="med" len="med"/>
+                      <a:tailEnd type="none" w="med" len="med"/>
+                    </a:lnR>
+                    <a:lnT w="12700" cap="flat" cmpd="sng" algn="ctr">
+                      <a:solidFill>
+                        <a:schemeClr val="tx1"/>
+                      </a:solidFill>
+                      <a:prstDash val="solid"/>
+                      <a:round/>
+                      <a:headEnd type="none" w="med" len="med"/>
+                      <a:tailEnd type="none" w="med" len="med"/>
+                    </a:lnT>
+                    <a:lnB w="12700" cap="flat" cmpd="sng" algn="ctr">
+                      <a:solidFill>
+                        <a:schemeClr val="tx1"/>
+                      </a:solidFill>
+                      <a:prstDash val="solid"/>
+                      <a:round/>
+                      <a:headEnd type="none" w="med" len="med"/>
+                      <a:tailEnd type="none" w="med" len="med"/>
+                    </a:lnB>
+                    <a:solidFill>
+                      <a:schemeClr val="accent2">
+                        <a:lumMod val="20000"/>
+                        <a:lumOff val="80000"/>
+                      </a:schemeClr>
+                    </a:solidFill>
+                  </a:tcPr>
+                </a:tc>
+                <a:tc hMerge="1">
+                  <a:txBody>
+                    <a:bodyPr/>
+                    <a:lstStyle/>
+                    <a:p>
+                      <a:endParaRPr lang="en-US"/>
+                    </a:p>
+                  </a:txBody>
+                  <a:tcPr/>
+                </a:tc>
+                <a:tc>
+                  <a:txBody>
+                    <a:bodyPr/>
+                    <a:lstStyle/>
+                    <a:p>
+                      <a:pPr algn="ctr"/>
+                      <a:endParaRPr lang="en-US" sz="1800" dirty="0"/>
+                    </a:p>
+                  </a:txBody>
+                  <a:tcPr>
+                    <a:lnL w="12700" cap="flat" cmpd="sng" algn="ctr">
+                      <a:solidFill>
+                        <a:schemeClr val="tx1"/>
+                      </a:solidFill>
+                      <a:prstDash val="solid"/>
+                      <a:round/>
+                      <a:headEnd type="none" w="med" len="med"/>
+                      <a:tailEnd type="none" w="med" len="med"/>
+                    </a:lnL>
+                    <a:lnR w="12700" cap="flat" cmpd="sng" algn="ctr">
+                      <a:solidFill>
+                        <a:schemeClr val="tx1"/>
+                      </a:solidFill>
+                      <a:prstDash val="solid"/>
+                      <a:round/>
+                      <a:headEnd type="none" w="med" len="med"/>
+                      <a:tailEnd type="none" w="med" len="med"/>
+                    </a:lnR>
+                    <a:lnT w="12700" cap="flat" cmpd="sng" algn="ctr">
+                      <a:solidFill>
+                        <a:schemeClr val="tx1"/>
+                      </a:solidFill>
+                      <a:prstDash val="solid"/>
+                      <a:round/>
+                      <a:headEnd type="none" w="med" len="med"/>
+                      <a:tailEnd type="none" w="med" len="med"/>
+                    </a:lnT>
+                    <a:lnB w="12700" cap="flat" cmpd="sng" algn="ctr">
+                      <a:solidFill>
+                        <a:schemeClr val="tx1"/>
+                      </a:solidFill>
+                      <a:prstDash val="solid"/>
+                      <a:round/>
+                      <a:headEnd type="none" w="med" len="med"/>
+                      <a:tailEnd type="none" w="med" len="med"/>
+                    </a:lnB>
+                    <a:solidFill>
+                      <a:srgbClr val="E0E0E0"/>
+                    </a:solidFill>
+                  </a:tcPr>
+                </a:tc>
+                <a:tc gridSpan="2">
+                  <a:txBody>
+                    <a:bodyPr/>
+                    <a:lstStyle/>
+                    <a:p>
+                      <a:pPr marL="0" marR="0" indent="0" algn="ctr" defTabSz="457129" rtl="0" eaLnBrk="1" fontAlgn="auto" latinLnBrk="0" hangingPunct="1">
+                        <a:lnSpc>
+                          <a:spcPct val="100000"/>
+                        </a:lnSpc>
+                        <a:spcBef>
+                          <a:spcPts val="0"/>
+                        </a:spcBef>
+                        <a:spcAft>
+                          <a:spcPts val="0"/>
+                        </a:spcAft>
+                        <a:buClrTx/>
+                        <a:buSzTx/>
+                        <a:buFontTx/>
+                        <a:buNone/>
+                        <a:tabLst/>
+                        <a:defRPr/>
+                      </a:pPr>
+                      <a:r>
+                        <a:rPr lang="en-US" sz="1800" dirty="0" smtClean="0"/>
+                        <a:t>without</a:t>
+                      </a:r>
+                      <a:r>
+                        <a:rPr lang="en-US" sz="1800" baseline="0" dirty="0" smtClean="0"/>
+                        <a:t> structure</a:t>
+                      </a:r>
+                      <a:endParaRPr lang="en-US" sz="1800" dirty="0" smtClean="0"/>
+                    </a:p>
+                    <a:p>
+                      <a:pPr algn="ctr"/>
+                      <a:endParaRPr lang="en-US" sz="1800" dirty="0"/>
+                    </a:p>
+                  </a:txBody>
+                  <a:tcPr>
+                    <a:lnL w="12700" cap="flat" cmpd="sng" algn="ctr">
+                      <a:solidFill>
+                        <a:schemeClr val="tx1"/>
+                      </a:solidFill>
+                      <a:prstDash val="solid"/>
+                      <a:round/>
+                      <a:headEnd type="none" w="med" len="med"/>
+                      <a:tailEnd type="none" w="med" len="med"/>
+                    </a:lnL>
+                    <a:lnR w="12700" cap="flat" cmpd="sng" algn="ctr">
+                      <a:solidFill>
+                        <a:schemeClr val="tx1"/>
+                      </a:solidFill>
+                      <a:prstDash val="solid"/>
+                      <a:round/>
+                      <a:headEnd type="none" w="med" len="med"/>
+                      <a:tailEnd type="none" w="med" len="med"/>
+                    </a:lnR>
+                    <a:lnT w="12700" cap="flat" cmpd="sng" algn="ctr">
+                      <a:solidFill>
+                        <a:schemeClr val="tx1"/>
+                      </a:solidFill>
+                      <a:prstDash val="solid"/>
+                      <a:round/>
+                      <a:headEnd type="none" w="med" len="med"/>
+                      <a:tailEnd type="none" w="med" len="med"/>
+                    </a:lnT>
+                    <a:lnB w="12700" cap="flat" cmpd="sng" algn="ctr">
+                      <a:solidFill>
+                        <a:schemeClr val="tx1"/>
+                      </a:solidFill>
+                      <a:prstDash val="solid"/>
+                      <a:round/>
+                      <a:headEnd type="none" w="med" len="med"/>
+                      <a:tailEnd type="none" w="med" len="med"/>
+                    </a:lnB>
+                    <a:solidFill>
+                      <a:srgbClr val="7F7F7F"/>
+                    </a:solidFill>
+                  </a:tcPr>
+                </a:tc>
+                <a:tc hMerge="1">
+                  <a:txBody>
+                    <a:bodyPr/>
+                    <a:lstStyle/>
+                    <a:p>
+                      <a:pPr algn="ctr"/>
+                      <a:endParaRPr lang="en-US" sz="1800" dirty="0"/>
+                    </a:p>
+                  </a:txBody>
+                  <a:tcPr>
+                    <a:lnL w="12700" cap="flat" cmpd="sng" algn="ctr">
+                      <a:solidFill>
+                        <a:schemeClr val="tx1"/>
+                      </a:solidFill>
+                      <a:prstDash val="solid"/>
+                      <a:round/>
+                      <a:headEnd type="none" w="med" len="med"/>
+                      <a:tailEnd type="none" w="med" len="med"/>
+                    </a:lnL>
+                    <a:lnR w="12700" cap="flat" cmpd="sng" algn="ctr">
+                      <a:solidFill>
+                        <a:schemeClr val="tx1"/>
+                      </a:solidFill>
+                      <a:prstDash val="solid"/>
+                      <a:round/>
+                      <a:headEnd type="none" w="med" len="med"/>
+                      <a:tailEnd type="none" w="med" len="med"/>
+                    </a:lnR>
+                    <a:lnT w="12700" cap="flat" cmpd="sng" algn="ctr">
+                      <a:solidFill>
+                        <a:schemeClr val="tx1"/>
+                      </a:solidFill>
+                      <a:prstDash val="solid"/>
+                      <a:round/>
+                      <a:headEnd type="none" w="med" len="med"/>
+                      <a:tailEnd type="none" w="med" len="med"/>
+                    </a:lnT>
+                    <a:lnB w="12700" cap="flat" cmpd="sng" algn="ctr">
+                      <a:solidFill>
+                        <a:schemeClr val="tx1"/>
+                      </a:solidFill>
+                      <a:prstDash val="solid"/>
+                      <a:round/>
+                      <a:headEnd type="none" w="med" len="med"/>
+                      <a:tailEnd type="none" w="med" len="med"/>
+                    </a:lnB>
+                    <a:solidFill>
+                      <a:srgbClr val="7F7F7F"/>
+                    </a:solidFill>
+                  </a:tcPr>
+                </a:tc>
+                <a:tc>
+                  <a:txBody>
+                    <a:bodyPr/>
+                    <a:lstStyle/>
+                    <a:p>
+                      <a:pPr algn="ctr"/>
+                      <a:endParaRPr lang="en-US" sz="1800" dirty="0"/>
+                    </a:p>
+                  </a:txBody>
+                  <a:tcPr>
+                    <a:lnL w="12700" cap="flat" cmpd="sng" algn="ctr">
+                      <a:solidFill>
+                        <a:schemeClr val="tx1"/>
+                      </a:solidFill>
+                      <a:prstDash val="solid"/>
+                      <a:round/>
+                      <a:headEnd type="none" w="med" len="med"/>
+                      <a:tailEnd type="none" w="med" len="med"/>
+                    </a:lnL>
+                    <a:lnR w="12700" cap="flat" cmpd="sng" algn="ctr">
+                      <a:solidFill>
+                        <a:schemeClr val="tx1"/>
+                      </a:solidFill>
+                      <a:prstDash val="solid"/>
+                      <a:round/>
+                      <a:headEnd type="none" w="med" len="med"/>
+                      <a:tailEnd type="none" w="med" len="med"/>
+                    </a:lnR>
+                    <a:lnT w="12700" cap="flat" cmpd="sng" algn="ctr">
+                      <a:solidFill>
+                        <a:schemeClr val="tx1"/>
+                      </a:solidFill>
+                      <a:prstDash val="solid"/>
+                      <a:round/>
+                      <a:headEnd type="none" w="med" len="med"/>
+                      <a:tailEnd type="none" w="med" len="med"/>
+                    </a:lnT>
+                    <a:lnB w="12700" cap="flat" cmpd="sng" algn="ctr">
+                      <a:solidFill>
+                        <a:schemeClr val="tx1"/>
+                      </a:solidFill>
+                      <a:prstDash val="solid"/>
+                      <a:round/>
+                      <a:headEnd type="none" w="med" len="med"/>
+                      <a:tailEnd type="none" w="med" len="med"/>
+                    </a:lnB>
+                  </a:tcPr>
+                </a:tc>
+                <a:tc>
+                  <a:txBody>
+                    <a:bodyPr/>
+                    <a:lstStyle/>
+                    <a:p>
+                      <a:pPr algn="ctr"/>
+                      <a:endParaRPr lang="en-US" sz="1800" dirty="0"/>
+                    </a:p>
+                  </a:txBody>
+                  <a:tcPr>
+                    <a:lnL w="12700" cap="flat" cmpd="sng" algn="ctr">
+                      <a:solidFill>
+                        <a:schemeClr val="tx1"/>
+                      </a:solidFill>
+                      <a:prstDash val="solid"/>
+                      <a:round/>
+                      <a:headEnd type="none" w="med" len="med"/>
+                      <a:tailEnd type="none" w="med" len="med"/>
+                    </a:lnL>
+                    <a:lnR w="12700" cap="flat" cmpd="sng" algn="ctr">
+                      <a:solidFill>
+                        <a:schemeClr val="tx1"/>
+                      </a:solidFill>
+                      <a:prstDash val="solid"/>
+                      <a:round/>
+                      <a:headEnd type="none" w="med" len="med"/>
+                      <a:tailEnd type="none" w="med" len="med"/>
+                    </a:lnR>
+                    <a:lnT w="12700" cap="flat" cmpd="sng" algn="ctr">
+                      <a:solidFill>
+                        <a:schemeClr val="tx1"/>
+                      </a:solidFill>
+                      <a:prstDash val="solid"/>
+                      <a:round/>
+                      <a:headEnd type="none" w="med" len="med"/>
+                      <a:tailEnd type="none" w="med" len="med"/>
+                    </a:lnT>
+                    <a:lnB w="12700" cap="flat" cmpd="sng" algn="ctr">
+                      <a:solidFill>
+                        <a:schemeClr val="tx1"/>
+                      </a:solidFill>
+                      <a:prstDash val="solid"/>
+                      <a:round/>
+                      <a:headEnd type="none" w="med" len="med"/>
+                      <a:tailEnd type="none" w="med" len="med"/>
+                    </a:lnB>
+                  </a:tcPr>
+                </a:tc>
+                <a:tc>
+                  <a:txBody>
+                    <a:bodyPr/>
+                    <a:lstStyle/>
+                    <a:p>
+                      <a:pPr algn="ctr"/>
+                      <a:endParaRPr lang="en-US" sz="1800" dirty="0"/>
+                    </a:p>
+                  </a:txBody>
+                  <a:tcPr>
+                    <a:lnL w="12700" cap="flat" cmpd="sng" algn="ctr">
+                      <a:solidFill>
+                        <a:schemeClr val="tx1"/>
+                      </a:solidFill>
+                      <a:prstDash val="solid"/>
+                      <a:round/>
+                      <a:headEnd type="none" w="med" len="med"/>
+                      <a:tailEnd type="none" w="med" len="med"/>
+                    </a:lnL>
+                    <a:lnR w="12700" cap="flat" cmpd="sng" algn="ctr">
+                      <a:solidFill>
+                        <a:schemeClr val="tx1"/>
+                      </a:solidFill>
+                      <a:prstDash val="solid"/>
+                      <a:round/>
+                      <a:headEnd type="none" w="med" len="med"/>
+                      <a:tailEnd type="none" w="med" len="med"/>
+                    </a:lnR>
+                    <a:lnT w="12700" cap="flat" cmpd="sng" algn="ctr">
+                      <a:solidFill>
+                        <a:schemeClr val="tx1"/>
+                      </a:solidFill>
+                      <a:prstDash val="solid"/>
+                      <a:round/>
+                      <a:headEnd type="none" w="med" len="med"/>
+                      <a:tailEnd type="none" w="med" len="med"/>
+                    </a:lnT>
+                    <a:lnB w="12700" cap="flat" cmpd="sng" algn="ctr">
+                      <a:solidFill>
+                        <a:schemeClr val="tx1"/>
+                      </a:solidFill>
+                      <a:prstDash val="solid"/>
+                      <a:round/>
+                      <a:headEnd type="none" w="med" len="med"/>
+                      <a:tailEnd type="none" w="med" len="med"/>
+                    </a:lnB>
+                  </a:tcPr>
+                </a:tc>
+                <a:tc>
+                  <a:txBody>
+                    <a:bodyPr/>
+                    <a:lstStyle/>
+                    <a:p>
+                      <a:pPr algn="ctr"/>
+                      <a:endParaRPr lang="en-US" sz="1800" dirty="0"/>
+                    </a:p>
+                  </a:txBody>
+                  <a:tcPr>
+                    <a:lnL w="12700" cap="flat" cmpd="sng" algn="ctr">
+                      <a:solidFill>
+                        <a:schemeClr val="tx1"/>
+                      </a:solidFill>
+                      <a:prstDash val="solid"/>
+                      <a:round/>
+                      <a:headEnd type="none" w="med" len="med"/>
+                      <a:tailEnd type="none" w="med" len="med"/>
+                    </a:lnL>
+                    <a:lnR w="12700" cap="flat" cmpd="sng" algn="ctr">
+                      <a:solidFill>
+                        <a:schemeClr val="tx1"/>
+                      </a:solidFill>
+                      <a:prstDash val="solid"/>
+                      <a:round/>
+                      <a:headEnd type="none" w="med" len="med"/>
+                      <a:tailEnd type="none" w="med" len="med"/>
+                    </a:lnR>
+                    <a:lnT w="12700" cap="flat" cmpd="sng" algn="ctr">
+                      <a:solidFill>
+                        <a:schemeClr val="tx1"/>
+                      </a:solidFill>
+                      <a:prstDash val="solid"/>
+                      <a:round/>
+                      <a:headEnd type="none" w="med" len="med"/>
+                      <a:tailEnd type="none" w="med" len="med"/>
+                    </a:lnT>
+                    <a:lnB w="12700" cap="flat" cmpd="sng" algn="ctr">
+                      <a:solidFill>
+                        <a:schemeClr val="tx1"/>
+                      </a:solidFill>
+                      <a:prstDash val="solid"/>
+                      <a:round/>
+                      <a:headEnd type="none" w="med" len="med"/>
+                      <a:tailEnd type="none" w="med" len="med"/>
+                    </a:lnB>
+                  </a:tcPr>
+                </a:tc>
+                <a:tc>
+                  <a:txBody>
+                    <a:bodyPr/>
+                    <a:lstStyle/>
+                    <a:p>
+                      <a:pPr algn="ctr"/>
+                      <a:endParaRPr lang="en-US" sz="1800" dirty="0"/>
+                    </a:p>
+                  </a:txBody>
+                  <a:tcPr>
+                    <a:lnL w="12700" cap="flat" cmpd="sng" algn="ctr">
+                      <a:solidFill>
+                        <a:schemeClr val="tx1"/>
+                      </a:solidFill>
+                      <a:prstDash val="solid"/>
+                      <a:round/>
+                      <a:headEnd type="none" w="med" len="med"/>
+                      <a:tailEnd type="none" w="med" len="med"/>
+                    </a:lnL>
+                    <a:lnR w="12700" cap="flat" cmpd="sng" algn="ctr">
+                      <a:solidFill>
+                        <a:schemeClr val="tx1"/>
+                      </a:solidFill>
+                      <a:prstDash val="solid"/>
+                      <a:round/>
+                      <a:headEnd type="none" w="med" len="med"/>
+                      <a:tailEnd type="none" w="med" len="med"/>
+                    </a:lnR>
+                    <a:lnT w="12700" cap="flat" cmpd="sng" algn="ctr">
+                      <a:solidFill>
+                        <a:schemeClr val="tx1"/>
+                      </a:solidFill>
+                      <a:prstDash val="solid"/>
+                      <a:round/>
+                      <a:headEnd type="none" w="med" len="med"/>
+                      <a:tailEnd type="none" w="med" len="med"/>
+                    </a:lnT>
+                    <a:lnB w="12700" cap="flat" cmpd="sng" algn="ctr">
+                      <a:solidFill>
+                        <a:schemeClr val="tx1"/>
+                      </a:solidFill>
+                      <a:prstDash val="solid"/>
+                      <a:round/>
+                      <a:headEnd type="none" w="med" len="med"/>
+                      <a:tailEnd type="none" w="med" len="med"/>
+                    </a:lnB>
+                  </a:tcPr>
+                </a:tc>
+              </a:tr>
+              <a:tr h="373211">
+                <a:tc>
+                  <a:txBody>
+                    <a:bodyPr/>
+                    <a:lstStyle/>
+                    <a:p>
+                      <a:r>
+                        <a:rPr lang="en-US" sz="1800" dirty="0" smtClean="0"/>
+                        <a:t>BCCD</a:t>
+                      </a:r>
+                      <a:endParaRPr lang="en-US" sz="1800" dirty="0"/>
+                    </a:p>
+                  </a:txBody>
+                  <a:tcPr>
+                    <a:lnL w="12700" cap="flat" cmpd="sng" algn="ctr">
+                      <a:solidFill>
+                        <a:schemeClr val="tx1"/>
+                      </a:solidFill>
+                      <a:prstDash val="solid"/>
+                      <a:round/>
+                      <a:headEnd type="none" w="med" len="med"/>
+                      <a:tailEnd type="none" w="med" len="med"/>
+                    </a:lnL>
+                    <a:lnR w="12700" cap="flat" cmpd="sng" algn="ctr">
+                      <a:solidFill>
+                        <a:schemeClr val="tx1"/>
+                      </a:solidFill>
+                      <a:prstDash val="solid"/>
+                      <a:round/>
+                      <a:headEnd type="none" w="med" len="med"/>
+                      <a:tailEnd type="none" w="med" len="med"/>
+                    </a:lnR>
+                    <a:lnT w="12700" cap="flat" cmpd="sng" algn="ctr">
+                      <a:solidFill>
+                        <a:schemeClr val="tx1"/>
+                      </a:solidFill>
+                      <a:prstDash val="solid"/>
+                      <a:round/>
+                      <a:headEnd type="none" w="med" len="med"/>
+                      <a:tailEnd type="none" w="med" len="med"/>
+                    </a:lnT>
+                    <a:lnB w="12700" cap="flat" cmpd="sng" algn="ctr">
+                      <a:solidFill>
+                        <a:schemeClr val="tx1"/>
+                      </a:solidFill>
+                      <a:prstDash val="solid"/>
+                      <a:round/>
+                      <a:headEnd type="none" w="med" len="med"/>
+                      <a:tailEnd type="none" w="med" len="med"/>
+                    </a:lnB>
+                  </a:tcPr>
+                </a:tc>
+                <a:tc>
+                  <a:txBody>
+                    <a:bodyPr/>
+                    <a:lstStyle/>
+                    <a:p>
+                      <a:pPr algn="ctr"/>
+                      <a:endParaRPr lang="en-US" sz="1800" dirty="0"/>
+                    </a:p>
+                  </a:txBody>
+                  <a:tcPr>
+                    <a:lnL w="12700" cap="flat" cmpd="sng" algn="ctr">
+                      <a:solidFill>
+                        <a:schemeClr val="tx1"/>
+                      </a:solidFill>
+                      <a:prstDash val="solid"/>
+                      <a:round/>
+                      <a:headEnd type="none" w="med" len="med"/>
+                      <a:tailEnd type="none" w="med" len="med"/>
+                    </a:lnL>
+                    <a:lnR w="12700" cap="flat" cmpd="sng" algn="ctr">
+                      <a:solidFill>
+                        <a:schemeClr val="tx1"/>
+                      </a:solidFill>
+                      <a:prstDash val="solid"/>
+                      <a:round/>
+                      <a:headEnd type="none" w="med" len="med"/>
+                      <a:tailEnd type="none" w="med" len="med"/>
+                    </a:lnR>
+                    <a:lnT w="12700" cap="flat" cmpd="sng" algn="ctr">
+                      <a:solidFill>
+                        <a:schemeClr val="tx1"/>
+                      </a:solidFill>
+                      <a:prstDash val="solid"/>
+                      <a:round/>
+                      <a:headEnd type="none" w="med" len="med"/>
+                      <a:tailEnd type="none" w="med" len="med"/>
+                    </a:lnT>
+                    <a:lnB w="12700" cap="flat" cmpd="sng" algn="ctr">
+                      <a:solidFill>
+                        <a:schemeClr val="tx1"/>
+                      </a:solidFill>
+                      <a:prstDash val="solid"/>
+                      <a:round/>
+                      <a:headEnd type="none" w="med" len="med"/>
+                      <a:tailEnd type="none" w="med" len="med"/>
+                    </a:lnB>
+                  </a:tcPr>
+                </a:tc>
+                <a:tc>
+                  <a:txBody>
+                    <a:bodyPr/>
+                    <a:lstStyle/>
+                    <a:p>
+                      <a:pPr algn="ctr"/>
+                      <a:endParaRPr lang="en-US" sz="1800" dirty="0"/>
+                    </a:p>
+                  </a:txBody>
+                  <a:tcPr>
+                    <a:lnL w="12700" cap="flat" cmpd="sng" algn="ctr">
+                      <a:solidFill>
+                        <a:schemeClr val="tx1"/>
+                      </a:solidFill>
+                      <a:prstDash val="solid"/>
+                      <a:round/>
+                      <a:headEnd type="none" w="med" len="med"/>
+                      <a:tailEnd type="none" w="med" len="med"/>
+                    </a:lnL>
+                    <a:lnR w="12700" cap="flat" cmpd="sng" algn="ctr">
+                      <a:solidFill>
+                        <a:schemeClr val="tx1"/>
+                      </a:solidFill>
+                      <a:prstDash val="solid"/>
+                      <a:round/>
+                      <a:headEnd type="none" w="med" len="med"/>
+                      <a:tailEnd type="none" w="med" len="med"/>
+                    </a:lnR>
+                    <a:lnT w="12700" cap="flat" cmpd="sng" algn="ctr">
+                      <a:solidFill>
+                        <a:schemeClr val="tx1"/>
+                      </a:solidFill>
+                      <a:prstDash val="solid"/>
+                      <a:round/>
+                      <a:headEnd type="none" w="med" len="med"/>
+                      <a:tailEnd type="none" w="med" len="med"/>
+                    </a:lnT>
+                    <a:lnB w="12700" cap="flat" cmpd="sng" algn="ctr">
+                      <a:solidFill>
+                        <a:schemeClr val="tx1"/>
+                      </a:solidFill>
+                      <a:prstDash val="solid"/>
+                      <a:round/>
+                      <a:headEnd type="none" w="med" len="med"/>
+                      <a:tailEnd type="none" w="med" len="med"/>
+                    </a:lnB>
+                  </a:tcPr>
+                </a:tc>
+                <a:tc>
+                  <a:txBody>
+                    <a:bodyPr/>
+                    <a:lstStyle/>
+                    <a:p>
+                      <a:pPr algn="ctr"/>
+                      <a:endParaRPr lang="en-US" sz="1800" dirty="0"/>
+                    </a:p>
+                  </a:txBody>
+                  <a:tcPr>
+                    <a:lnL w="12700" cap="flat" cmpd="sng" algn="ctr">
+                      <a:solidFill>
+                        <a:schemeClr val="tx1"/>
+                      </a:solidFill>
+                      <a:prstDash val="solid"/>
+                      <a:round/>
+                      <a:headEnd type="none" w="med" len="med"/>
+                      <a:tailEnd type="none" w="med" len="med"/>
+                    </a:lnL>
+                    <a:lnR w="12700" cap="flat" cmpd="sng" algn="ctr">
+                      <a:solidFill>
+                        <a:schemeClr val="tx1"/>
+                      </a:solidFill>
+                      <a:prstDash val="solid"/>
+                      <a:round/>
+                      <a:headEnd type="none" w="med" len="med"/>
+                      <a:tailEnd type="none" w="med" len="med"/>
+                    </a:lnR>
+                    <a:lnT w="12700" cap="flat" cmpd="sng" algn="ctr">
+                      <a:solidFill>
+                        <a:schemeClr val="tx1"/>
+                      </a:solidFill>
+                      <a:prstDash val="solid"/>
+                      <a:round/>
+                      <a:headEnd type="none" w="med" len="med"/>
+                      <a:tailEnd type="none" w="med" len="med"/>
+                    </a:lnT>
+                    <a:lnB w="12700" cap="flat" cmpd="sng" algn="ctr">
+                      <a:solidFill>
+                        <a:schemeClr val="tx1"/>
+                      </a:solidFill>
+                      <a:prstDash val="solid"/>
+                      <a:round/>
+                      <a:headEnd type="none" w="med" len="med"/>
+                      <a:tailEnd type="none" w="med" len="med"/>
+                    </a:lnB>
+                  </a:tcPr>
+                </a:tc>
+                <a:tc>
+                  <a:txBody>
+                    <a:bodyPr/>
+                    <a:lstStyle/>
+                    <a:p>
+                      <a:pPr algn="ctr"/>
                       <a:endParaRPr lang="en-US" sz="1800" dirty="0"/>
                     </a:p>
                   </a:txBody>
@@ -8803,7 +10129,7 @@
                       <a:pPr algn="ctr"/>
                       <a:r>
                         <a:rPr lang="en-US" sz="1800" dirty="0" smtClean="0"/>
-                        <a:t>implement</a:t>
+                        <a:t>Setup</a:t>
                       </a:r>
                       <a:endParaRPr lang="en-US" sz="1800" dirty="0"/>
                     </a:p>
@@ -8868,11 +10194,7 @@
                       <a:pPr algn="ctr"/>
                       <a:r>
                         <a:rPr lang="en-US" sz="1800" dirty="0" smtClean="0"/>
-                        <a:t>with</a:t>
-                      </a:r>
-                      <a:r>
-                        <a:rPr lang="en-US" sz="1800" baseline="0" dirty="0" smtClean="0"/>
-                        <a:t> structure</a:t>
+                        <a:t>with structure</a:t>
                       </a:r>
                       <a:endParaRPr lang="en-US" sz="1800" dirty="0"/>
                     </a:p>
@@ -8920,71 +10242,6 @@
                   </a:tcPr>
                 </a:tc>
                 <a:tc hMerge="1">
-                  <a:txBody>
-                    <a:bodyPr/>
-                    <a:lstStyle/>
-                    <a:p>
-                      <a:endParaRPr lang="en-US" dirty="0"/>
-                    </a:p>
-                  </a:txBody>
-                  <a:tcPr/>
-                </a:tc>
-                <a:tc>
-                  <a:txBody>
-                    <a:bodyPr/>
-                    <a:lstStyle/>
-                    <a:p>
-                      <a:pPr algn="ctr"/>
-                      <a:r>
-                        <a:rPr lang="en-US" sz="1800" dirty="0" smtClean="0"/>
-                        <a:t>without</a:t>
-                      </a:r>
-                      <a:endParaRPr lang="en-US" sz="1800" dirty="0"/>
-                    </a:p>
-                  </a:txBody>
-                  <a:tcPr>
-                    <a:lnL w="12700" cap="flat" cmpd="sng" algn="ctr">
-                      <a:solidFill>
-                        <a:schemeClr val="tx1"/>
-                      </a:solidFill>
-                      <a:prstDash val="solid"/>
-                      <a:round/>
-                      <a:headEnd type="none" w="med" len="med"/>
-                      <a:tailEnd type="none" w="med" len="med"/>
-                    </a:lnL>
-                    <a:lnR w="12700" cap="flat" cmpd="sng" algn="ctr">
-                      <a:solidFill>
-                        <a:schemeClr val="tx1"/>
-                      </a:solidFill>
-                      <a:prstDash val="solid"/>
-                      <a:round/>
-                      <a:headEnd type="none" w="med" len="med"/>
-                      <a:tailEnd type="none" w="med" len="med"/>
-                    </a:lnR>
-                    <a:lnT w="12700" cap="flat" cmpd="sng" algn="ctr">
-                      <a:solidFill>
-                        <a:schemeClr val="tx1"/>
-                      </a:solidFill>
-                      <a:prstDash val="solid"/>
-                      <a:round/>
-                      <a:headEnd type="none" w="med" len="med"/>
-                      <a:tailEnd type="none" w="med" len="med"/>
-                    </a:lnT>
-                    <a:lnB w="12700" cap="flat" cmpd="sng" algn="ctr">
-                      <a:solidFill>
-                        <a:schemeClr val="tx1"/>
-                      </a:solidFill>
-                      <a:prstDash val="solid"/>
-                      <a:round/>
-                      <a:headEnd type="none" w="med" len="med"/>
-                      <a:tailEnd type="none" w="med" len="med"/>
-                    </a:lnB>
-                    <a:solidFill>
-                      <a:srgbClr val="7F7F7F"/>
-                    </a:solidFill>
-                  </a:tcPr>
-                </a:tc>
-                <a:tc>
                   <a:txBody>
                     <a:bodyPr/>
                     <a:lstStyle/>
@@ -9128,12 +10385,13 @@
                     </a:lnB>
                   </a:tcPr>
                 </a:tc>
+              </a:tr>
+              <a:tr h="373211">
                 <a:tc>
                   <a:txBody>
                     <a:bodyPr/>
                     <a:lstStyle/>
                     <a:p>
-                      <a:pPr algn="ctr"/>
                       <a:endParaRPr lang="en-US" sz="1800" dirty="0"/>
                     </a:p>
                   </a:txBody>
@@ -9224,17 +10482,12 @@
                     </a:lnB>
                   </a:tcPr>
                 </a:tc>
-              </a:tr>
-              <a:tr h="373211">
                 <a:tc>
                   <a:txBody>
                     <a:bodyPr/>
                     <a:lstStyle/>
                     <a:p>
-                      <a:r>
-                        <a:rPr lang="en-US" sz="1800" dirty="0" smtClean="0"/>
-                        <a:t>BCCD</a:t>
-                      </a:r>
+                      <a:pPr algn="ctr"/>
                       <a:endParaRPr lang="en-US" sz="1800" dirty="0"/>
                     </a:p>
                   </a:txBody>
@@ -9419,6 +10672,9 @@
                       <a:headEnd type="none" w="med" len="med"/>
                       <a:tailEnd type="none" w="med" len="med"/>
                     </a:lnB>
+                    <a:solidFill>
+                      <a:srgbClr val="E0E0E0"/>
+                    </a:solidFill>
                   </a:tcPr>
                 </a:tc>
                 <a:tc>
@@ -9426,8 +10682,7 @@
                     <a:bodyPr/>
                     <a:lstStyle/>
                     <a:p>
-                      <a:pPr algn="ctr"/>
-                      <a:endParaRPr lang="en-US" sz="1800" dirty="0"/>
+                      <a:endParaRPr lang="en-US" dirty="0"/>
                     </a:p>
                   </a:txBody>
                   <a:tcPr>
@@ -9467,6 +10722,9 @@
                       <a:headEnd type="none" w="med" len="med"/>
                       <a:tailEnd type="none" w="med" len="med"/>
                     </a:lnB>
+                    <a:solidFill>
+                      <a:srgbClr val="E0E0E0"/>
+                    </a:solidFill>
                   </a:tcPr>
                 </a:tc>
                 <a:tc gridSpan="2">
@@ -9477,11 +10735,7 @@
                       <a:pPr algn="ctr"/>
                       <a:r>
                         <a:rPr lang="en-US" sz="1800" dirty="0" smtClean="0"/>
-                        <a:t>with</a:t>
-                      </a:r>
-                      <a:r>
-                        <a:rPr lang="en-US" sz="1800" baseline="0" dirty="0" smtClean="0"/>
-                        <a:t> structure</a:t>
+                        <a:t>without structure</a:t>
                       </a:r>
                       <a:endParaRPr lang="en-US" sz="1800" dirty="0"/>
                     </a:p>
@@ -9529,71 +10783,6 @@
                   </a:tcPr>
                 </a:tc>
                 <a:tc hMerge="1">
-                  <a:txBody>
-                    <a:bodyPr/>
-                    <a:lstStyle/>
-                    <a:p>
-                      <a:endParaRPr lang="en-US" dirty="0"/>
-                    </a:p>
-                  </a:txBody>
-                  <a:tcPr/>
-                </a:tc>
-                <a:tc>
-                  <a:txBody>
-                    <a:bodyPr/>
-                    <a:lstStyle/>
-                    <a:p>
-                      <a:pPr algn="ctr"/>
-                      <a:r>
-                        <a:rPr lang="en-US" sz="1800" dirty="0" smtClean="0"/>
-                        <a:t>without</a:t>
-                      </a:r>
-                      <a:endParaRPr lang="en-US" sz="1800" dirty="0"/>
-                    </a:p>
-                  </a:txBody>
-                  <a:tcPr>
-                    <a:lnL w="12700" cap="flat" cmpd="sng" algn="ctr">
-                      <a:solidFill>
-                        <a:schemeClr val="tx1"/>
-                      </a:solidFill>
-                      <a:prstDash val="solid"/>
-                      <a:round/>
-                      <a:headEnd type="none" w="med" len="med"/>
-                      <a:tailEnd type="none" w="med" len="med"/>
-                    </a:lnL>
-                    <a:lnR w="12700" cap="flat" cmpd="sng" algn="ctr">
-                      <a:solidFill>
-                        <a:schemeClr val="tx1"/>
-                      </a:solidFill>
-                      <a:prstDash val="solid"/>
-                      <a:round/>
-                      <a:headEnd type="none" w="med" len="med"/>
-                      <a:tailEnd type="none" w="med" len="med"/>
-                    </a:lnR>
-                    <a:lnT w="12700" cap="flat" cmpd="sng" algn="ctr">
-                      <a:solidFill>
-                        <a:schemeClr val="tx1"/>
-                      </a:solidFill>
-                      <a:prstDash val="solid"/>
-                      <a:round/>
-                      <a:headEnd type="none" w="med" len="med"/>
-                      <a:tailEnd type="none" w="med" len="med"/>
-                    </a:lnT>
-                    <a:lnB w="12700" cap="flat" cmpd="sng" algn="ctr">
-                      <a:solidFill>
-                        <a:schemeClr val="tx1"/>
-                      </a:solidFill>
-                      <a:prstDash val="solid"/>
-                      <a:round/>
-                      <a:headEnd type="none" w="med" len="med"/>
-                      <a:tailEnd type="none" w="med" len="med"/>
-                    </a:lnB>
-                    <a:solidFill>
-                      <a:srgbClr val="7F7F7F"/>
-                    </a:solidFill>
-                  </a:tcPr>
-                </a:tc>
-                <a:tc>
                   <a:txBody>
                     <a:bodyPr/>
                     <a:lstStyle/>
@@ -10587,6 +11776,13 @@
     <a:masterClrMapping/>
   </p:clrMapOvr>
   <p:transition xmlns:p14="http://schemas.microsoft.com/office/powerpoint/2010/main"/>
+  <p:timing>
+    <p:tnLst>
+      <p:par>
+        <p:cTn xmlns:p14="http://schemas.microsoft.com/office/powerpoint/2010/main" id="1" dur="indefinite" restart="never" nodeType="tmRoot"/>
+      </p:par>
+    </p:tnLst>
+  </p:timing>
 </p:sld>
 </file>
 
@@ -10661,6 +11857,13 @@
     <a:masterClrMapping/>
   </p:clrMapOvr>
   <p:transition xmlns:p14="http://schemas.microsoft.com/office/powerpoint/2010/main"/>
+  <p:timing>
+    <p:tnLst>
+      <p:par>
+        <p:cTn xmlns:p14="http://schemas.microsoft.com/office/powerpoint/2010/main" id="1" dur="indefinite" restart="never" nodeType="tmRoot"/>
+      </p:par>
+    </p:tnLst>
+  </p:timing>
 </p:sld>
 </file>
 
@@ -10735,8 +11938,9 @@
           <a:p>
             <a:r>
               <a:rPr lang="en-US" dirty="0" smtClean="0"/>
-              <a:t>As late as 1848</a:t>
-            </a:r>
+              <a:t>Still prominent in 1848</a:t>
+            </a:r>
+            <a:endParaRPr lang="en-US" dirty="0" smtClean="0"/>
           </a:p>
         </p:txBody>
       </p:sp>
@@ -11195,6 +12399,13 @@
     <a:masterClrMapping/>
   </p:clrMapOvr>
   <p:transition xmlns:p14="http://schemas.microsoft.com/office/powerpoint/2010/main"/>
+  <p:timing>
+    <p:tnLst>
+      <p:par>
+        <p:cTn xmlns:p14="http://schemas.microsoft.com/office/powerpoint/2010/main" id="1" dur="indefinite" restart="never" nodeType="tmRoot"/>
+      </p:par>
+    </p:tnLst>
+  </p:timing>
 </p:sld>
 </file>
 
@@ -11422,16 +12633,8 @@
               <a:buNone/>
             </a:pPr>
             <a:r>
-              <a:rPr lang="en-US" sz="3600" dirty="0"/>
-              <a:t>Is causal discovery a </a:t>
-            </a:r>
-            <a:r>
-              <a:rPr lang="en-US" sz="3600" i="1" dirty="0"/>
-              <a:t>good </a:t>
-            </a:r>
-            <a:r>
-              <a:rPr lang="en-US" sz="3600" dirty="0"/>
-              <a:t>means of finding Effective Connectivity?</a:t>
+              <a:rPr lang="en-US" sz="3600" dirty="0" smtClean="0"/>
+              <a:t>Can Causal Discovery help finding Effective Connectivity?</a:t>
             </a:r>
             <a:endParaRPr lang="en-US" sz="3600" dirty="0"/>
           </a:p>
@@ -11550,6 +12753,13 @@
     <a:masterClrMapping/>
   </p:clrMapOvr>
   <p:transition xmlns:p14="http://schemas.microsoft.com/office/powerpoint/2010/main"/>
+  <p:timing>
+    <p:tnLst>
+      <p:par>
+        <p:cTn xmlns:p14="http://schemas.microsoft.com/office/powerpoint/2010/main" id="1" dur="indefinite" restart="never" nodeType="tmRoot"/>
+      </p:par>
+    </p:tnLst>
+  </p:timing>
 </p:sld>
 </file>
 
@@ -12106,6 +13316,13 @@
     <a:masterClrMapping/>
   </p:clrMapOvr>
   <p:transition xmlns:p14="http://schemas.microsoft.com/office/powerpoint/2010/main"/>
+  <p:timing>
+    <p:tnLst>
+      <p:par>
+        <p:cTn xmlns:p14="http://schemas.microsoft.com/office/powerpoint/2010/main" id="1" dur="indefinite" restart="never" nodeType="tmRoot"/>
+      </p:par>
+    </p:tnLst>
+  </p:timing>
 </p:sld>
 </file>
 

</xml_diff>

<commit_message>
voorbeelden van gerichten grafen verbeterd, presentatie klaar
</commit_message>
<xml_diff>
--- a/docs/proposal presentation/Proposal presentation.pptx
+++ b/docs/proposal presentation/Proposal presentation.pptx
@@ -24,7 +24,7 @@
     <p:sldId id="352" r:id="rId12"/>
     <p:sldId id="358" r:id="rId13"/>
     <p:sldId id="359" r:id="rId14"/>
-    <p:sldId id="360" r:id="rId15"/>
+    <p:sldId id="361" r:id="rId15"/>
     <p:sldId id="353" r:id="rId16"/>
     <p:sldId id="355" r:id="rId17"/>
   </p:sldIdLst>
@@ -276,7 +276,7 @@
               <a:pPr>
                 <a:defRPr/>
               </a:pPr>
-              <a:t>10/1/13</a:t>
+              <a:t>1-10-2013</a:t>
             </a:fld>
             <a:endParaRPr lang="nl-NL"/>
           </a:p>
@@ -496,7 +496,7 @@
               <a:pPr>
                 <a:defRPr/>
               </a:pPr>
-              <a:t>10/1/13</a:t>
+              <a:t>1-10-2013</a:t>
             </a:fld>
             <a:endParaRPr lang="nl-NL"/>
           </a:p>
@@ -1204,7 +1204,7 @@
   <p:clrMapOvr>
     <a:masterClrMapping/>
   </p:clrMapOvr>
-  <p:transition xmlns:p14="http://schemas.microsoft.com/office/powerpoint/2010/main"/>
+  <p:transition/>
 </p:sldLayout>
 </file>
 
@@ -1435,7 +1435,7 @@
   <p:clrMapOvr>
     <a:masterClrMapping/>
   </p:clrMapOvr>
-  <p:transition xmlns:p14="http://schemas.microsoft.com/office/powerpoint/2010/main"/>
+  <p:transition/>
 </p:sldLayout>
 </file>
 
@@ -1656,7 +1656,7 @@
   <p:clrMapOvr>
     <a:masterClrMapping/>
   </p:clrMapOvr>
-  <p:transition xmlns:p14="http://schemas.microsoft.com/office/powerpoint/2010/main"/>
+  <p:transition/>
 </p:sldLayout>
 </file>
 
@@ -1796,7 +1796,7 @@
   <p:clrMapOvr>
     <a:masterClrMapping/>
   </p:clrMapOvr>
-  <p:transition xmlns:p14="http://schemas.microsoft.com/office/powerpoint/2010/main"/>
+  <p:transition/>
 </p:sldLayout>
 </file>
 
@@ -2155,7 +2155,7 @@
   <p:clrMapOvr>
     <a:masterClrMapping/>
   </p:clrMapOvr>
-  <p:transition xmlns:p14="http://schemas.microsoft.com/office/powerpoint/2010/main"/>
+  <p:transition/>
 </p:sldLayout>
 </file>
 
@@ -2389,7 +2389,7 @@
   <p:clrMapOvr>
     <a:masterClrMapping/>
   </p:clrMapOvr>
-  <p:transition xmlns:p14="http://schemas.microsoft.com/office/powerpoint/2010/main"/>
+  <p:transition/>
 </p:sldLayout>
 </file>
 
@@ -2541,7 +2541,7 @@
   <p:clrMapOvr>
     <a:masterClrMapping/>
   </p:clrMapOvr>
-  <p:transition xmlns:p14="http://schemas.microsoft.com/office/powerpoint/2010/main"/>
+  <p:transition/>
 </p:sldLayout>
 </file>
 
@@ -2944,7 +2944,7 @@
   <p:clrMapOvr>
     <a:masterClrMapping/>
   </p:clrMapOvr>
-  <p:transition xmlns:p14="http://schemas.microsoft.com/office/powerpoint/2010/main"/>
+  <p:transition/>
 </p:sldLayout>
 </file>
 
@@ -3336,7 +3336,7 @@
   <p:clrMapOvr>
     <a:masterClrMapping/>
   </p:clrMapOvr>
-  <p:transition xmlns:p14="http://schemas.microsoft.com/office/powerpoint/2010/main"/>
+  <p:transition/>
 </p:sldLayout>
 </file>
 
@@ -3472,7 +3472,7 @@
   <p:clrMapOvr>
     <a:masterClrMapping/>
   </p:clrMapOvr>
-  <p:transition xmlns:p14="http://schemas.microsoft.com/office/powerpoint/2010/main"/>
+  <p:transition/>
 </p:sldLayout>
 </file>
 
@@ -3607,7 +3607,7 @@
   <p:clrMapOvr>
     <a:masterClrMapping/>
   </p:clrMapOvr>
-  <p:transition xmlns:p14="http://schemas.microsoft.com/office/powerpoint/2010/main"/>
+  <p:transition/>
 </p:sldLayout>
 </file>
 
@@ -3748,7 +3748,7 @@
   <p:clrMapOvr>
     <a:masterClrMapping/>
   </p:clrMapOvr>
-  <p:transition xmlns:p14="http://schemas.microsoft.com/office/powerpoint/2010/main"/>
+  <p:transition/>
 </p:sldLayout>
 </file>
 
@@ -3888,7 +3888,7 @@
   <p:clrMapOvr>
     <a:masterClrMapping/>
   </p:clrMapOvr>
-  <p:transition xmlns:p14="http://schemas.microsoft.com/office/powerpoint/2010/main"/>
+  <p:transition/>
 </p:sldLayout>
 </file>
 
@@ -4120,7 +4120,7 @@
   <p:clrMapOvr>
     <a:masterClrMapping/>
   </p:clrMapOvr>
-  <p:transition xmlns:p14="http://schemas.microsoft.com/office/powerpoint/2010/main"/>
+  <p:transition/>
 </p:sldLayout>
 </file>
 
@@ -4364,11 +4364,11 @@
     <p:sldLayoutId id="2147483664" r:id="rId3"/>
     <p:sldLayoutId id="2147483665" r:id="rId4"/>
   </p:sldLayoutIdLst>
-  <p:transition xmlns:p14="http://schemas.microsoft.com/office/powerpoint/2010/main"/>
+  <p:transition/>
   <p:timing>
     <p:tnLst>
       <p:par>
-        <p:cTn xmlns:p14="http://schemas.microsoft.com/office/powerpoint/2010/main" id="1" dur="indefinite" restart="never" nodeType="tmRoot"/>
+        <p:cTn id="1" dur="indefinite" restart="never" nodeType="tmRoot"/>
       </p:par>
     </p:tnLst>
   </p:timing>
@@ -5033,11 +5033,11 @@
     <p:sldLayoutId id="2147483674" r:id="rId9"/>
     <p:sldLayoutId id="2147483675" r:id="rId10"/>
   </p:sldLayoutIdLst>
-  <p:transition xmlns:p14="http://schemas.microsoft.com/office/powerpoint/2010/main"/>
+  <p:transition/>
   <p:timing>
     <p:tnLst>
       <p:par>
-        <p:cTn xmlns:p14="http://schemas.microsoft.com/office/powerpoint/2010/main" id="1" dur="indefinite" restart="never" nodeType="tmRoot"/>
+        <p:cTn id="1" dur="indefinite" restart="never" nodeType="tmRoot"/>
       </p:par>
     </p:tnLst>
   </p:timing>
@@ -5688,11 +5688,11 @@
   <p:clrMapOvr>
     <a:masterClrMapping/>
   </p:clrMapOvr>
-  <p:transition xmlns:p14="http://schemas.microsoft.com/office/powerpoint/2010/main"/>
+  <p:transition/>
   <p:timing>
     <p:tnLst>
       <p:par>
-        <p:cTn xmlns:p14="http://schemas.microsoft.com/office/powerpoint/2010/main" id="1" dur="indefinite" restart="never" nodeType="tmRoot"/>
+        <p:cTn id="1" dur="indefinite" restart="never" nodeType="tmRoot"/>
       </p:par>
     </p:tnLst>
   </p:timing>
@@ -5779,7 +5779,11 @@
           <a:p>
             <a:r>
               <a:rPr lang="en-US" dirty="0" smtClean="0"/>
-              <a:t>116 area’s / nodes</a:t>
+              <a:t>Divided over 116 </a:t>
+            </a:r>
+            <a:r>
+              <a:rPr lang="en-US" dirty="0" smtClean="0"/>
+              <a:t>area’s / nodes</a:t>
             </a:r>
           </a:p>
           <a:p>
@@ -5793,7 +5797,11 @@
             </a:r>
             <a:r>
               <a:rPr lang="en-US" dirty="0" smtClean="0"/>
-              <a:t> measurements</a:t>
+              <a:t> </a:t>
+            </a:r>
+            <a:r>
+              <a:rPr lang="en-US" dirty="0" smtClean="0"/>
+              <a:t>measurements, each 2 seconds</a:t>
             </a:r>
             <a:endParaRPr lang="en-US" dirty="0" smtClean="0"/>
           </a:p>
@@ -5819,11 +5827,11 @@
   <p:clrMapOvr>
     <a:masterClrMapping/>
   </p:clrMapOvr>
-  <p:transition xmlns:p14="http://schemas.microsoft.com/office/powerpoint/2010/main"/>
+  <p:transition/>
   <p:timing>
     <p:tnLst>
       <p:par>
-        <p:cTn xmlns:p14="http://schemas.microsoft.com/office/powerpoint/2010/main" id="1" dur="indefinite" restart="never" nodeType="tmRoot"/>
+        <p:cTn id="1" dur="indefinite" restart="never" nodeType="tmRoot"/>
       </p:par>
     </p:tnLst>
   </p:timing>
@@ -5923,24 +5931,16 @@
             </a:r>
             <a:r>
               <a:rPr lang="en-US" dirty="0" smtClean="0"/>
-              <a:t> directed </a:t>
-            </a:r>
+              <a:t> directed graph</a:t>
+            </a:r>
+          </a:p>
+          <a:p>
+            <a:endParaRPr lang="en-US" dirty="0" smtClean="0"/>
+          </a:p>
+          <a:p>
             <a:r>
               <a:rPr lang="en-US" dirty="0" smtClean="0"/>
-              <a:t>graph</a:t>
-            </a:r>
-          </a:p>
-          <a:p>
-            <a:endParaRPr lang="en-US" dirty="0" smtClean="0"/>
-          </a:p>
-          <a:p>
-            <a:r>
-              <a:rPr lang="en-US" dirty="0" smtClean="0"/>
-              <a:t>BCCD </a:t>
-            </a:r>
-            <a:r>
-              <a:rPr lang="en-US" dirty="0" smtClean="0"/>
-              <a:t>(implementation available)</a:t>
+              <a:t>BCCD (implementation available)</a:t>
             </a:r>
           </a:p>
           <a:p>
@@ -5955,13 +5955,8 @@
             <a:pPr lvl="1"/>
             <a:r>
               <a:rPr lang="en-US" dirty="0" smtClean="0"/>
-              <a:t>Produces a distribution of directed </a:t>
-            </a:r>
-            <a:r>
-              <a:rPr lang="en-US" dirty="0" smtClean="0"/>
-              <a:t>graphs</a:t>
-            </a:r>
-            <a:endParaRPr lang="en-US" dirty="0" smtClean="0"/>
+              <a:t>Produces a distribution of directed graphs</a:t>
+            </a:r>
           </a:p>
           <a:p>
             <a:pPr lvl="1"/>
@@ -5982,11 +5977,11 @@
   <p:clrMapOvr>
     <a:masterClrMapping/>
   </p:clrMapOvr>
-  <p:transition xmlns:p14="http://schemas.microsoft.com/office/powerpoint/2010/main"/>
+  <p:transition/>
   <p:timing>
     <p:tnLst>
       <p:par>
-        <p:cTn xmlns:p14="http://schemas.microsoft.com/office/powerpoint/2010/main" id="1" dur="indefinite" restart="never" nodeType="tmRoot"/>
+        <p:cTn id="1" dur="indefinite" restart="never" nodeType="tmRoot"/>
       </p:par>
     </p:tnLst>
   </p:timing>
@@ -6043,14 +6038,29 @@
             <p:ph idx="1"/>
           </p:nvPr>
         </p:nvSpPr>
-        <p:spPr/>
+        <p:spPr>
+          <a:xfrm>
+            <a:off x="900113" y="2070100"/>
+            <a:ext cx="7567274" cy="574452"/>
+          </a:xfrm>
+        </p:spPr>
         <p:txBody>
           <a:bodyPr/>
           <a:lstStyle/>
           <a:p>
             <a:r>
               <a:rPr lang="en-US" dirty="0" smtClean="0"/>
-              <a:t>Step one: inferring the structure.</a:t>
+              <a:t>Step one: inferring the </a:t>
+            </a:r>
+            <a:r>
+              <a:rPr lang="en-US" dirty="0" smtClean="0"/>
+              <a:t>structure</a:t>
+            </a:r>
+          </a:p>
+          <a:p>
+            <a:r>
+              <a:rPr lang="en-US" dirty="0" smtClean="0"/>
+              <a:t>Can be skipped if a structure is already known</a:t>
             </a:r>
             <a:endParaRPr lang="en-US" dirty="0"/>
           </a:p>
@@ -6064,66 +6074,7 @@
         </p:nvSpPr>
         <p:spPr bwMode="auto">
           <a:xfrm>
-            <a:off x="1683093" y="3340944"/>
-            <a:ext cx="819291" cy="819291"/>
-          </a:xfrm>
-          <a:prstGeom prst="ellipse">
-            <a:avLst/>
-          </a:prstGeom>
-          <a:noFill/>
-          <a:ln w="12700" cap="flat" cmpd="sng" algn="ctr">
-            <a:solidFill>
-              <a:schemeClr val="bg1"/>
-            </a:solidFill>
-            <a:prstDash val="dash"/>
-            <a:round/>
-            <a:headEnd type="none" w="med" len="med"/>
-            <a:tailEnd type="none" w="med" len="med"/>
-          </a:ln>
-          <a:effectLst/>
-        </p:spPr>
-        <p:txBody>
-          <a:bodyPr vert="horz" wrap="square" lIns="130046" tIns="78028" rIns="130046" bIns="65023" numCol="1" rtlCol="0" anchor="t" anchorCtr="0" compatLnSpc="1">
-            <a:prstTxWarp prst="textNoShape">
-              <a:avLst/>
-            </a:prstTxWarp>
-          </a:bodyPr>
-          <a:lstStyle/>
-          <a:p>
-            <a:pPr algn="ctr" defTabSz="1300460"/>
-            <a:r>
-              <a:rPr lang="en-US" sz="2800" i="1" dirty="0">
-                <a:solidFill>
-                  <a:schemeClr val="bg1"/>
-                </a:solidFill>
-                <a:latin typeface="Times New Roman" pitchFamily="18" charset="0"/>
-                <a:ea typeface="ヒラギノ明朝 ProN W3" charset="-128"/>
-                <a:cs typeface="Times New Roman" pitchFamily="18" charset="0"/>
-                <a:sym typeface="American Typewriter" charset="0"/>
-              </a:rPr>
-              <a:t>A</a:t>
-            </a:r>
-            <a:endParaRPr lang="en-US" sz="2800" i="1" dirty="0">
-              <a:solidFill>
-                <a:schemeClr val="bg1"/>
-              </a:solidFill>
-              <a:latin typeface="Times New Roman" pitchFamily="18" charset="0"/>
-              <a:ea typeface="ヒラギノ明朝 ProN W3" charset="-128"/>
-              <a:cs typeface="Times New Roman" pitchFamily="18" charset="0"/>
-              <a:sym typeface="American Typewriter" charset="0"/>
-            </a:endParaRPr>
-          </a:p>
-        </p:txBody>
-      </p:sp>
-      <p:sp>
-        <p:nvSpPr>
-          <p:cNvPr id="5" name="Oval 4"/>
-          <p:cNvSpPr/>
-          <p:nvPr/>
-        </p:nvSpPr>
-        <p:spPr bwMode="auto">
-          <a:xfrm>
-            <a:off x="1033694" y="4961640"/>
+            <a:off x="1564628" y="3457705"/>
             <a:ext cx="819291" cy="819291"/>
           </a:xfrm>
           <a:prstGeom prst="ellipse">
@@ -6160,29 +6111,20 @@
                 <a:cs typeface="Times New Roman" pitchFamily="18" charset="0"/>
                 <a:sym typeface="American Typewriter" charset="0"/>
               </a:rPr>
-              <a:t>B</a:t>
-            </a:r>
-            <a:endParaRPr lang="en-US" sz="2800" i="1" dirty="0">
-              <a:solidFill>
-                <a:schemeClr val="bg1"/>
-              </a:solidFill>
-              <a:latin typeface="Times New Roman" pitchFamily="18" charset="0"/>
-              <a:ea typeface="ヒラギノ明朝 ProN W3" charset="-128"/>
-              <a:cs typeface="Times New Roman" pitchFamily="18" charset="0"/>
-              <a:sym typeface="American Typewriter" charset="0"/>
-            </a:endParaRPr>
+              <a:t>A</a:t>
+            </a:r>
           </a:p>
         </p:txBody>
       </p:sp>
       <p:sp>
         <p:nvSpPr>
-          <p:cNvPr id="6" name="Oval 5"/>
+          <p:cNvPr id="5" name="Oval 4"/>
           <p:cNvSpPr/>
           <p:nvPr/>
         </p:nvSpPr>
         <p:spPr bwMode="auto">
           <a:xfrm>
-            <a:off x="2382401" y="4961640"/>
+            <a:off x="2383919" y="4877524"/>
             <a:ext cx="819291" cy="819291"/>
           </a:xfrm>
           <a:prstGeom prst="ellipse">
@@ -6210,7 +6152,7 @@
           <a:p>
             <a:pPr algn="ctr" defTabSz="1300460"/>
             <a:r>
-              <a:rPr lang="en-US" sz="2800" i="1" dirty="0">
+              <a:rPr lang="en-US" sz="2800" i="1" dirty="0" smtClean="0">
                 <a:solidFill>
                   <a:schemeClr val="bg1"/>
                 </a:solidFill>
@@ -6233,19 +6175,78 @@
           </a:p>
         </p:txBody>
       </p:sp>
+      <p:sp>
+        <p:nvSpPr>
+          <p:cNvPr id="6" name="Oval 5"/>
+          <p:cNvSpPr/>
+          <p:nvPr/>
+        </p:nvSpPr>
+        <p:spPr bwMode="auto">
+          <a:xfrm>
+            <a:off x="3203210" y="3457704"/>
+            <a:ext cx="819291" cy="819291"/>
+          </a:xfrm>
+          <a:prstGeom prst="ellipse">
+            <a:avLst/>
+          </a:prstGeom>
+          <a:noFill/>
+          <a:ln w="12700" cap="flat" cmpd="sng" algn="ctr">
+            <a:solidFill>
+              <a:schemeClr val="bg1"/>
+            </a:solidFill>
+            <a:prstDash val="solid"/>
+            <a:round/>
+            <a:headEnd type="none" w="med" len="med"/>
+            <a:tailEnd type="none" w="med" len="med"/>
+          </a:ln>
+          <a:effectLst/>
+        </p:spPr>
+        <p:txBody>
+          <a:bodyPr vert="horz" wrap="square" lIns="130046" tIns="78028" rIns="130046" bIns="65023" numCol="1" rtlCol="0" anchor="t" anchorCtr="0" compatLnSpc="1">
+            <a:prstTxWarp prst="textNoShape">
+              <a:avLst/>
+            </a:prstTxWarp>
+          </a:bodyPr>
+          <a:lstStyle/>
+          <a:p>
+            <a:pPr algn="ctr" defTabSz="1300460"/>
+            <a:r>
+              <a:rPr lang="en-US" sz="2800" i="1" dirty="0" smtClean="0">
+                <a:solidFill>
+                  <a:schemeClr val="bg1"/>
+                </a:solidFill>
+                <a:latin typeface="Times New Roman" pitchFamily="18" charset="0"/>
+                <a:ea typeface="ヒラギノ明朝 ProN W3" charset="-128"/>
+                <a:cs typeface="Times New Roman" pitchFamily="18" charset="0"/>
+                <a:sym typeface="American Typewriter" charset="0"/>
+              </a:rPr>
+              <a:t>B</a:t>
+            </a:r>
+            <a:endParaRPr lang="en-US" sz="2800" i="1" dirty="0">
+              <a:solidFill>
+                <a:schemeClr val="bg1"/>
+              </a:solidFill>
+              <a:latin typeface="Times New Roman" pitchFamily="18" charset="0"/>
+              <a:ea typeface="ヒラギノ明朝 ProN W3" charset="-128"/>
+              <a:cs typeface="Times New Roman" pitchFamily="18" charset="0"/>
+              <a:sym typeface="American Typewriter" charset="0"/>
+            </a:endParaRPr>
+          </a:p>
+        </p:txBody>
+      </p:sp>
       <p:cxnSp>
         <p:nvCxnSpPr>
           <p:cNvPr id="7" name="Straight Arrow Connector 6"/>
           <p:cNvCxnSpPr>
-            <a:stCxn id="4" idx="3"/>
-            <a:endCxn id="5" idx="0"/>
+            <a:stCxn id="4" idx="5"/>
+            <a:endCxn id="5" idx="1"/>
           </p:cNvCxnSpPr>
           <p:nvPr/>
         </p:nvCxnSpPr>
         <p:spPr bwMode="auto">
-          <a:xfrm flipH="1">
-            <a:off x="1443339" y="4040252"/>
-            <a:ext cx="359737" cy="921388"/>
+          <a:xfrm>
+            <a:off x="2263937" y="4157014"/>
+            <a:ext cx="239964" cy="840492"/>
           </a:xfrm>
           <a:prstGeom prst="straightConnector1">
             <a:avLst/>
@@ -6271,15 +6272,15 @@
         <p:nvCxnSpPr>
           <p:cNvPr id="8" name="Straight Arrow Connector 7"/>
           <p:cNvCxnSpPr>
-            <a:stCxn id="4" idx="5"/>
-            <a:endCxn id="6" idx="0"/>
+            <a:stCxn id="6" idx="3"/>
+            <a:endCxn id="5" idx="7"/>
           </p:cNvCxnSpPr>
           <p:nvPr/>
         </p:nvCxnSpPr>
         <p:spPr bwMode="auto">
-          <a:xfrm>
-            <a:off x="2382401" y="4040252"/>
-            <a:ext cx="409646" cy="921388"/>
+          <a:xfrm flipH="1">
+            <a:off x="3083228" y="4157013"/>
+            <a:ext cx="239964" cy="840493"/>
           </a:xfrm>
           <a:prstGeom prst="straightConnector1">
             <a:avLst/>
@@ -6309,7 +6310,7 @@
         </p:nvSpPr>
         <p:spPr bwMode="auto">
           <a:xfrm>
-            <a:off x="3662979" y="4961640"/>
+            <a:off x="2383918" y="6476060"/>
             <a:ext cx="819291" cy="819291"/>
           </a:xfrm>
           <a:prstGeom prst="ellipse">
@@ -6337,7 +6338,7 @@
           <a:p>
             <a:pPr algn="ctr" defTabSz="1300460"/>
             <a:r>
-              <a:rPr lang="en-US" sz="2800" i="1" dirty="0">
+              <a:rPr lang="en-US" sz="2800" i="1" dirty="0" smtClean="0">
                 <a:solidFill>
                   <a:schemeClr val="bg1"/>
                 </a:solidFill>
@@ -6346,7 +6347,7 @@
                 <a:cs typeface="Times New Roman" pitchFamily="18" charset="0"/>
                 <a:sym typeface="American Typewriter" charset="0"/>
               </a:rPr>
-              <a:t>E</a:t>
+              <a:t>D</a:t>
             </a:r>
             <a:endParaRPr lang="en-US" sz="2800" i="1" dirty="0">
               <a:solidFill>
@@ -6364,15 +6365,15 @@
         <p:nvCxnSpPr>
           <p:cNvPr id="19" name="Straight Arrow Connector 18"/>
           <p:cNvCxnSpPr>
-            <a:stCxn id="6" idx="6"/>
-            <a:endCxn id="18" idx="2"/>
+            <a:stCxn id="5" idx="4"/>
+            <a:endCxn id="18" idx="0"/>
           </p:cNvCxnSpPr>
           <p:nvPr/>
         </p:nvCxnSpPr>
         <p:spPr bwMode="auto">
-          <a:xfrm>
-            <a:off x="3201693" y="5371285"/>
-            <a:ext cx="461286" cy="0"/>
+          <a:xfrm flipH="1">
+            <a:off x="2793564" y="5696815"/>
+            <a:ext cx="1" cy="779245"/>
           </a:xfrm>
           <a:prstGeom prst="straightConnector1">
             <a:avLst/>
@@ -6402,7 +6403,7 @@
         </p:nvSpPr>
         <p:spPr bwMode="auto">
           <a:xfrm>
-            <a:off x="4362287" y="3430507"/>
+            <a:off x="4022501" y="4849062"/>
             <a:ext cx="819291" cy="819291"/>
           </a:xfrm>
           <a:prstGeom prst="ellipse">
@@ -6441,15 +6442,6 @@
               </a:rPr>
               <a:t>D</a:t>
             </a:r>
-            <a:endParaRPr lang="en-US" sz="2800" i="1" dirty="0">
-              <a:solidFill>
-                <a:schemeClr val="bg1"/>
-              </a:solidFill>
-              <a:latin typeface="Times New Roman" pitchFamily="18" charset="0"/>
-              <a:ea typeface="ヒラギノ明朝 ProN W3" charset="-128"/>
-              <a:cs typeface="Times New Roman" pitchFamily="18" charset="0"/>
-              <a:sym typeface="American Typewriter" charset="0"/>
-            </a:endParaRPr>
           </a:p>
         </p:txBody>
       </p:sp>
@@ -6457,49 +6449,15 @@
         <p:nvCxnSpPr>
           <p:cNvPr id="24" name="Straight Arrow Connector 23"/>
           <p:cNvCxnSpPr>
-            <a:stCxn id="23" idx="3"/>
-            <a:endCxn id="18" idx="0"/>
-          </p:cNvCxnSpPr>
-          <p:nvPr/>
-        </p:nvCxnSpPr>
-        <p:spPr bwMode="auto">
-          <a:xfrm flipH="1">
-            <a:off x="4072624" y="4129816"/>
-            <a:ext cx="409646" cy="831825"/>
-          </a:xfrm>
-          <a:prstGeom prst="straightConnector1">
-            <a:avLst/>
-          </a:prstGeom>
-          <a:blipFill dpi="0" rotWithShape="0">
-            <a:blip r:embed="rId2"/>
-            <a:srcRect/>
-            <a:tile tx="0" ty="0" sx="100000" sy="100000" flip="none" algn="tl"/>
-          </a:blipFill>
-          <a:ln w="12700" cap="flat" cmpd="sng" algn="ctr">
-            <a:solidFill>
-              <a:schemeClr val="bg1"/>
-            </a:solidFill>
-            <a:prstDash val="solid"/>
-            <a:round/>
-            <a:headEnd type="none" w="med" len="med"/>
-            <a:tailEnd type="triangle" w="lg" len="lg"/>
-          </a:ln>
-          <a:effectLst/>
-        </p:spPr>
-      </p:cxnSp>
-      <p:cxnSp>
-        <p:nvCxnSpPr>
-          <p:cNvPr id="38" name="Straight Arrow Connector 37"/>
-          <p:cNvCxnSpPr>
-            <a:stCxn id="23" idx="5"/>
-            <a:endCxn id="43" idx="0"/>
+            <a:stCxn id="6" idx="5"/>
+            <a:endCxn id="23" idx="1"/>
           </p:cNvCxnSpPr>
           <p:nvPr/>
         </p:nvCxnSpPr>
         <p:spPr bwMode="auto">
           <a:xfrm>
-            <a:off x="5061595" y="4129816"/>
-            <a:ext cx="409646" cy="831825"/>
+            <a:off x="3902519" y="4157013"/>
+            <a:ext cx="239964" cy="812031"/>
           </a:xfrm>
           <a:prstGeom prst="straightConnector1">
             <a:avLst/>
@@ -6523,503 +6481,13 @@
       </p:cxnSp>
       <p:sp>
         <p:nvSpPr>
-          <p:cNvPr id="43" name="Oval 42"/>
-          <p:cNvSpPr/>
-          <p:nvPr/>
-        </p:nvSpPr>
-        <p:spPr bwMode="auto">
-          <a:xfrm>
-            <a:off x="5061595" y="4961640"/>
-            <a:ext cx="819291" cy="819291"/>
-          </a:xfrm>
-          <a:prstGeom prst="ellipse">
-            <a:avLst/>
-          </a:prstGeom>
-          <a:noFill/>
-          <a:ln w="12700" cap="flat" cmpd="sng" algn="ctr">
-            <a:solidFill>
-              <a:schemeClr val="bg1"/>
-            </a:solidFill>
-            <a:prstDash val="solid"/>
-            <a:round/>
-            <a:headEnd type="none" w="med" len="med"/>
-            <a:tailEnd type="none" w="med" len="med"/>
-          </a:ln>
-          <a:effectLst/>
-        </p:spPr>
-        <p:txBody>
-          <a:bodyPr vert="horz" wrap="square" lIns="130046" tIns="78028" rIns="130046" bIns="65023" numCol="1" rtlCol="0" anchor="t" anchorCtr="0" compatLnSpc="1">
-            <a:prstTxWarp prst="textNoShape">
-              <a:avLst/>
-            </a:prstTxWarp>
-          </a:bodyPr>
-          <a:lstStyle/>
-          <a:p>
-            <a:pPr algn="ctr" defTabSz="1300460"/>
-            <a:r>
-              <a:rPr lang="en-US" sz="2800" i="1" dirty="0">
-                <a:solidFill>
-                  <a:schemeClr val="bg1"/>
-                </a:solidFill>
-                <a:latin typeface="Times New Roman" pitchFamily="18" charset="0"/>
-                <a:ea typeface="ヒラギノ明朝 ProN W3" charset="-128"/>
-                <a:cs typeface="Times New Roman" pitchFamily="18" charset="0"/>
-                <a:sym typeface="American Typewriter" charset="0"/>
-              </a:rPr>
-              <a:t>F</a:t>
-            </a:r>
-            <a:endParaRPr lang="en-US" sz="2800" i="1" dirty="0">
-              <a:solidFill>
-                <a:schemeClr val="bg1"/>
-              </a:solidFill>
-              <a:latin typeface="Times New Roman" pitchFamily="18" charset="0"/>
-              <a:ea typeface="ヒラギノ明朝 ProN W3" charset="-128"/>
-              <a:cs typeface="Times New Roman" pitchFamily="18" charset="0"/>
-              <a:sym typeface="American Typewriter" charset="0"/>
-            </a:endParaRPr>
-          </a:p>
-        </p:txBody>
-      </p:sp>
-      <p:sp>
-        <p:nvSpPr>
-          <p:cNvPr id="69" name="Oval 68"/>
-          <p:cNvSpPr/>
-          <p:nvPr/>
-        </p:nvSpPr>
-        <p:spPr bwMode="auto">
-          <a:xfrm>
-            <a:off x="6672292" y="4961640"/>
-            <a:ext cx="819291" cy="819291"/>
-          </a:xfrm>
-          <a:prstGeom prst="ellipse">
-            <a:avLst/>
-          </a:prstGeom>
-          <a:noFill/>
-          <a:ln w="12700" cap="flat" cmpd="sng" algn="ctr">
-            <a:solidFill>
-              <a:schemeClr val="bg1"/>
-            </a:solidFill>
-            <a:prstDash val="solid"/>
-            <a:round/>
-            <a:headEnd type="none" w="med" len="med"/>
-            <a:tailEnd type="none" w="med" len="med"/>
-          </a:ln>
-          <a:effectLst/>
-        </p:spPr>
-        <p:txBody>
-          <a:bodyPr vert="horz" wrap="square" lIns="130046" tIns="78028" rIns="130046" bIns="65023" numCol="1" rtlCol="0" anchor="t" anchorCtr="0" compatLnSpc="1">
-            <a:prstTxWarp prst="textNoShape">
-              <a:avLst/>
-            </a:prstTxWarp>
-          </a:bodyPr>
-          <a:lstStyle/>
-          <a:p>
-            <a:pPr algn="ctr" defTabSz="1300460"/>
-            <a:r>
-              <a:rPr lang="en-US" sz="2800" i="1" dirty="0">
-                <a:solidFill>
-                  <a:schemeClr val="bg1"/>
-                </a:solidFill>
-                <a:latin typeface="Times New Roman" pitchFamily="18" charset="0"/>
-                <a:ea typeface="ヒラギノ明朝 ProN W3" charset="-128"/>
-                <a:cs typeface="Times New Roman" pitchFamily="18" charset="0"/>
-                <a:sym typeface="American Typewriter" charset="0"/>
-              </a:rPr>
-              <a:t>B</a:t>
-            </a:r>
-            <a:endParaRPr lang="en-US" sz="2800" i="1" dirty="0">
-              <a:solidFill>
-                <a:schemeClr val="bg1"/>
-              </a:solidFill>
-              <a:latin typeface="Times New Roman" pitchFamily="18" charset="0"/>
-              <a:ea typeface="ヒラギノ明朝 ProN W3" charset="-128"/>
-              <a:cs typeface="Times New Roman" pitchFamily="18" charset="0"/>
-              <a:sym typeface="American Typewriter" charset="0"/>
-            </a:endParaRPr>
-          </a:p>
-        </p:txBody>
-      </p:sp>
-      <p:sp>
-        <p:nvSpPr>
-          <p:cNvPr id="70" name="Oval 69"/>
-          <p:cNvSpPr/>
-          <p:nvPr/>
-        </p:nvSpPr>
-        <p:spPr bwMode="auto">
-          <a:xfrm>
-            <a:off x="8020999" y="4961640"/>
-            <a:ext cx="819291" cy="819291"/>
-          </a:xfrm>
-          <a:prstGeom prst="ellipse">
-            <a:avLst/>
-          </a:prstGeom>
-          <a:noFill/>
-          <a:ln w="12700" cap="flat" cmpd="sng" algn="ctr">
-            <a:solidFill>
-              <a:schemeClr val="bg1"/>
-            </a:solidFill>
-            <a:prstDash val="solid"/>
-            <a:round/>
-            <a:headEnd type="none" w="med" len="med"/>
-            <a:tailEnd type="none" w="med" len="med"/>
-          </a:ln>
-          <a:effectLst/>
-        </p:spPr>
-        <p:txBody>
-          <a:bodyPr vert="horz" wrap="square" lIns="130046" tIns="78028" rIns="130046" bIns="65023" numCol="1" rtlCol="0" anchor="t" anchorCtr="0" compatLnSpc="1">
-            <a:prstTxWarp prst="textNoShape">
-              <a:avLst/>
-            </a:prstTxWarp>
-          </a:bodyPr>
-          <a:lstStyle/>
-          <a:p>
-            <a:pPr algn="ctr" defTabSz="1300460"/>
-            <a:r>
-              <a:rPr lang="en-US" sz="2800" i="1" dirty="0">
-                <a:solidFill>
-                  <a:schemeClr val="bg1"/>
-                </a:solidFill>
-                <a:latin typeface="Times New Roman" pitchFamily="18" charset="0"/>
-                <a:ea typeface="ヒラギノ明朝 ProN W3" charset="-128"/>
-                <a:cs typeface="Times New Roman" pitchFamily="18" charset="0"/>
-                <a:sym typeface="American Typewriter" charset="0"/>
-              </a:rPr>
-              <a:t>C</a:t>
-            </a:r>
-            <a:endParaRPr lang="en-US" sz="2800" i="1" dirty="0">
-              <a:solidFill>
-                <a:schemeClr val="bg1"/>
-              </a:solidFill>
-              <a:latin typeface="Times New Roman" pitchFamily="18" charset="0"/>
-              <a:ea typeface="ヒラギノ明朝 ProN W3" charset="-128"/>
-              <a:cs typeface="Times New Roman" pitchFamily="18" charset="0"/>
-              <a:sym typeface="American Typewriter" charset="0"/>
-            </a:endParaRPr>
-          </a:p>
-        </p:txBody>
-      </p:sp>
-      <p:cxnSp>
-        <p:nvCxnSpPr>
-          <p:cNvPr id="71" name="Straight Arrow Connector 70"/>
-          <p:cNvCxnSpPr>
-            <a:stCxn id="70" idx="2"/>
-            <a:endCxn id="69" idx="6"/>
-          </p:cNvCxnSpPr>
-          <p:nvPr/>
-        </p:nvCxnSpPr>
-        <p:spPr bwMode="auto">
-          <a:xfrm flipH="1">
-            <a:off x="7491582" y="5371285"/>
-            <a:ext cx="529417" cy="0"/>
-          </a:xfrm>
-          <a:prstGeom prst="straightConnector1">
-            <a:avLst/>
-          </a:prstGeom>
-          <a:blipFill dpi="0" rotWithShape="0">
-            <a:blip r:embed="rId2"/>
-            <a:srcRect/>
-            <a:tile tx="0" ty="0" sx="100000" sy="100000" flip="none" algn="tl"/>
-          </a:blipFill>
-          <a:ln w="12700" cap="flat" cmpd="sng" algn="ctr">
-            <a:solidFill>
-              <a:schemeClr val="bg1"/>
-            </a:solidFill>
-            <a:prstDash val="solid"/>
-            <a:round/>
-            <a:headEnd type="none" w="med" len="med"/>
-            <a:tailEnd type="none"/>
-          </a:ln>
-          <a:effectLst/>
-        </p:spPr>
-      </p:cxnSp>
-      <p:sp>
-        <p:nvSpPr>
-          <p:cNvPr id="73" name="Oval 72"/>
-          <p:cNvSpPr/>
-          <p:nvPr/>
-        </p:nvSpPr>
-        <p:spPr bwMode="auto">
-          <a:xfrm>
-            <a:off x="9301577" y="4961640"/>
-            <a:ext cx="819291" cy="819291"/>
-          </a:xfrm>
-          <a:prstGeom prst="ellipse">
-            <a:avLst/>
-          </a:prstGeom>
-          <a:noFill/>
-          <a:ln w="12700" cap="flat" cmpd="sng" algn="ctr">
-            <a:solidFill>
-              <a:schemeClr val="bg1"/>
-            </a:solidFill>
-            <a:prstDash val="solid"/>
-            <a:round/>
-            <a:headEnd type="none" w="med" len="med"/>
-            <a:tailEnd type="none" w="med" len="med"/>
-          </a:ln>
-          <a:effectLst/>
-        </p:spPr>
-        <p:txBody>
-          <a:bodyPr vert="horz" wrap="square" lIns="130046" tIns="78028" rIns="130046" bIns="65023" numCol="1" rtlCol="0" anchor="t" anchorCtr="0" compatLnSpc="1">
-            <a:prstTxWarp prst="textNoShape">
-              <a:avLst/>
-            </a:prstTxWarp>
-          </a:bodyPr>
-          <a:lstStyle/>
-          <a:p>
-            <a:pPr algn="ctr" defTabSz="1300460"/>
-            <a:r>
-              <a:rPr lang="en-US" sz="2800" i="1" dirty="0">
-                <a:solidFill>
-                  <a:schemeClr val="bg1"/>
-                </a:solidFill>
-                <a:latin typeface="Times New Roman" pitchFamily="18" charset="0"/>
-                <a:ea typeface="ヒラギノ明朝 ProN W3" charset="-128"/>
-                <a:cs typeface="Times New Roman" pitchFamily="18" charset="0"/>
-                <a:sym typeface="American Typewriter" charset="0"/>
-              </a:rPr>
-              <a:t>E</a:t>
-            </a:r>
-            <a:endParaRPr lang="en-US" sz="2800" i="1" dirty="0">
-              <a:solidFill>
-                <a:schemeClr val="bg1"/>
-              </a:solidFill>
-              <a:latin typeface="Times New Roman" pitchFamily="18" charset="0"/>
-              <a:ea typeface="ヒラギノ明朝 ProN W3" charset="-128"/>
-              <a:cs typeface="Times New Roman" pitchFamily="18" charset="0"/>
-              <a:sym typeface="American Typewriter" charset="0"/>
-            </a:endParaRPr>
-          </a:p>
-        </p:txBody>
-      </p:sp>
-      <p:cxnSp>
-        <p:nvCxnSpPr>
-          <p:cNvPr id="74" name="Straight Arrow Connector 73"/>
-          <p:cNvCxnSpPr>
-            <a:stCxn id="70" idx="6"/>
-            <a:endCxn id="73" idx="2"/>
-          </p:cNvCxnSpPr>
-          <p:nvPr/>
-        </p:nvCxnSpPr>
-        <p:spPr bwMode="auto">
-          <a:xfrm>
-            <a:off x="8840290" y="5371285"/>
-            <a:ext cx="461286" cy="0"/>
-          </a:xfrm>
-          <a:prstGeom prst="straightConnector1">
-            <a:avLst/>
-          </a:prstGeom>
-          <a:blipFill dpi="0" rotWithShape="0">
-            <a:blip r:embed="rId2"/>
-            <a:srcRect/>
-            <a:tile tx="0" ty="0" sx="100000" sy="100000" flip="none" algn="tl"/>
-          </a:blipFill>
-          <a:ln w="12700" cap="flat" cmpd="sng" algn="ctr">
-            <a:solidFill>
-              <a:schemeClr val="bg1"/>
-            </a:solidFill>
-            <a:prstDash val="solid"/>
-            <a:round/>
-            <a:headEnd type="none" w="med" len="med"/>
-            <a:tailEnd type="none"/>
-          </a:ln>
-          <a:effectLst/>
-        </p:spPr>
-      </p:cxnSp>
-      <p:sp>
-        <p:nvSpPr>
-          <p:cNvPr id="75" name="Oval 74"/>
-          <p:cNvSpPr/>
-          <p:nvPr/>
-        </p:nvSpPr>
-        <p:spPr bwMode="auto">
-          <a:xfrm>
-            <a:off x="10000885" y="3430507"/>
-            <a:ext cx="819291" cy="819291"/>
-          </a:xfrm>
-          <a:prstGeom prst="ellipse">
-            <a:avLst/>
-          </a:prstGeom>
-          <a:noFill/>
-          <a:ln w="12700" cap="flat" cmpd="sng" algn="ctr">
-            <a:solidFill>
-              <a:schemeClr val="bg1"/>
-            </a:solidFill>
-            <a:prstDash val="solid"/>
-            <a:round/>
-            <a:headEnd type="none" w="med" len="med"/>
-            <a:tailEnd type="none" w="med" len="med"/>
-          </a:ln>
-          <a:effectLst/>
-        </p:spPr>
-        <p:txBody>
-          <a:bodyPr vert="horz" wrap="square" lIns="130046" tIns="78028" rIns="130046" bIns="65023" numCol="1" rtlCol="0" anchor="t" anchorCtr="0" compatLnSpc="1">
-            <a:prstTxWarp prst="textNoShape">
-              <a:avLst/>
-            </a:prstTxWarp>
-          </a:bodyPr>
-          <a:lstStyle/>
-          <a:p>
-            <a:pPr algn="ctr" defTabSz="1300460"/>
-            <a:r>
-              <a:rPr lang="en-US" sz="2800" i="1" dirty="0">
-                <a:solidFill>
-                  <a:schemeClr val="bg1"/>
-                </a:solidFill>
-                <a:latin typeface="Times New Roman" pitchFamily="18" charset="0"/>
-                <a:ea typeface="ヒラギノ明朝 ProN W3" charset="-128"/>
-                <a:cs typeface="Times New Roman" pitchFamily="18" charset="0"/>
-                <a:sym typeface="American Typewriter" charset="0"/>
-              </a:rPr>
-              <a:t>D</a:t>
-            </a:r>
-            <a:endParaRPr lang="en-US" sz="2800" i="1" dirty="0">
-              <a:solidFill>
-                <a:schemeClr val="bg1"/>
-              </a:solidFill>
-              <a:latin typeface="Times New Roman" pitchFamily="18" charset="0"/>
-              <a:ea typeface="ヒラギノ明朝 ProN W3" charset="-128"/>
-              <a:cs typeface="Times New Roman" pitchFamily="18" charset="0"/>
-              <a:sym typeface="American Typewriter" charset="0"/>
-            </a:endParaRPr>
-          </a:p>
-        </p:txBody>
-      </p:sp>
-      <p:cxnSp>
-        <p:nvCxnSpPr>
-          <p:cNvPr id="76" name="Straight Arrow Connector 75"/>
-          <p:cNvCxnSpPr>
-            <a:stCxn id="75" idx="3"/>
-            <a:endCxn id="73" idx="0"/>
-          </p:cNvCxnSpPr>
-          <p:nvPr/>
-        </p:nvCxnSpPr>
-        <p:spPr bwMode="auto">
-          <a:xfrm flipH="1">
-            <a:off x="9711222" y="4129816"/>
-            <a:ext cx="409646" cy="831825"/>
-          </a:xfrm>
-          <a:prstGeom prst="straightConnector1">
-            <a:avLst/>
-          </a:prstGeom>
-          <a:blipFill dpi="0" rotWithShape="0">
-            <a:blip r:embed="rId2"/>
-            <a:srcRect/>
-            <a:tile tx="0" ty="0" sx="100000" sy="100000" flip="none" algn="tl"/>
-          </a:blipFill>
-          <a:ln w="12700" cap="flat" cmpd="sng" algn="ctr">
-            <a:solidFill>
-              <a:schemeClr val="bg1"/>
-            </a:solidFill>
-            <a:prstDash val="solid"/>
-            <a:round/>
-            <a:headEnd type="none" w="med" len="med"/>
-            <a:tailEnd type="none"/>
-          </a:ln>
-          <a:effectLst/>
-        </p:spPr>
-      </p:cxnSp>
-      <p:cxnSp>
-        <p:nvCxnSpPr>
-          <p:cNvPr id="77" name="Straight Arrow Connector 76"/>
-          <p:cNvCxnSpPr>
-            <a:stCxn id="75" idx="5"/>
-            <a:endCxn id="78" idx="0"/>
-          </p:cNvCxnSpPr>
-          <p:nvPr/>
-        </p:nvCxnSpPr>
-        <p:spPr bwMode="auto">
-          <a:xfrm>
-            <a:off x="10700192" y="4129816"/>
-            <a:ext cx="409646" cy="831825"/>
-          </a:xfrm>
-          <a:prstGeom prst="straightConnector1">
-            <a:avLst/>
-          </a:prstGeom>
-          <a:blipFill dpi="0" rotWithShape="0">
-            <a:blip r:embed="rId2"/>
-            <a:srcRect/>
-            <a:tile tx="0" ty="0" sx="100000" sy="100000" flip="none" algn="tl"/>
-          </a:blipFill>
-          <a:ln w="12700" cap="flat" cmpd="sng" algn="ctr">
-            <a:solidFill>
-              <a:schemeClr val="bg1"/>
-            </a:solidFill>
-            <a:prstDash val="solid"/>
-            <a:round/>
-            <a:headEnd type="none" w="med" len="med"/>
-            <a:tailEnd type="none"/>
-          </a:ln>
-          <a:effectLst/>
-        </p:spPr>
-      </p:cxnSp>
-      <p:sp>
-        <p:nvSpPr>
-          <p:cNvPr id="78" name="Oval 77"/>
-          <p:cNvSpPr/>
-          <p:nvPr/>
-        </p:nvSpPr>
-        <p:spPr bwMode="auto">
-          <a:xfrm>
-            <a:off x="10700193" y="4961640"/>
-            <a:ext cx="819291" cy="819291"/>
-          </a:xfrm>
-          <a:prstGeom prst="ellipse">
-            <a:avLst/>
-          </a:prstGeom>
-          <a:noFill/>
-          <a:ln w="12700" cap="flat" cmpd="sng" algn="ctr">
-            <a:solidFill>
-              <a:schemeClr val="bg1"/>
-            </a:solidFill>
-            <a:prstDash val="solid"/>
-            <a:round/>
-            <a:headEnd type="none" w="med" len="med"/>
-            <a:tailEnd type="none" w="med" len="med"/>
-          </a:ln>
-          <a:effectLst/>
-        </p:spPr>
-        <p:txBody>
-          <a:bodyPr vert="horz" wrap="square" lIns="130046" tIns="78028" rIns="130046" bIns="65023" numCol="1" rtlCol="0" anchor="t" anchorCtr="0" compatLnSpc="1">
-            <a:prstTxWarp prst="textNoShape">
-              <a:avLst/>
-            </a:prstTxWarp>
-          </a:bodyPr>
-          <a:lstStyle/>
-          <a:p>
-            <a:pPr algn="ctr" defTabSz="1300460"/>
-            <a:r>
-              <a:rPr lang="en-US" sz="2800" i="1" dirty="0">
-                <a:solidFill>
-                  <a:schemeClr val="bg1"/>
-                </a:solidFill>
-                <a:latin typeface="Times New Roman" pitchFamily="18" charset="0"/>
-                <a:ea typeface="ヒラギノ明朝 ProN W3" charset="-128"/>
-                <a:cs typeface="Times New Roman" pitchFamily="18" charset="0"/>
-                <a:sym typeface="American Typewriter" charset="0"/>
-              </a:rPr>
-              <a:t>F</a:t>
-            </a:r>
-            <a:endParaRPr lang="en-US" sz="2800" i="1" dirty="0">
-              <a:solidFill>
-                <a:schemeClr val="bg1"/>
-              </a:solidFill>
-              <a:latin typeface="Times New Roman" pitchFamily="18" charset="0"/>
-              <a:ea typeface="ヒラギノ明朝 ProN W3" charset="-128"/>
-              <a:cs typeface="Times New Roman" pitchFamily="18" charset="0"/>
-              <a:sym typeface="American Typewriter" charset="0"/>
-            </a:endParaRPr>
-          </a:p>
-        </p:txBody>
-      </p:sp>
-      <p:sp>
-        <p:nvSpPr>
           <p:cNvPr id="81" name="Right Arrow 80"/>
           <p:cNvSpPr/>
           <p:nvPr/>
         </p:nvSpPr>
         <p:spPr bwMode="auto">
           <a:xfrm>
-            <a:off x="6009782" y="4295352"/>
+            <a:off x="6009782" y="4849062"/>
             <a:ext cx="492619" cy="500750"/>
           </a:xfrm>
           <a:prstGeom prst="rightArrow">
@@ -7188,6 +6656,515 @@
           </a:p>
         </p:txBody>
       </p:sp>
+      <p:sp>
+        <p:nvSpPr>
+          <p:cNvPr id="62" name="Oval 61"/>
+          <p:cNvSpPr/>
+          <p:nvPr/>
+        </p:nvSpPr>
+        <p:spPr bwMode="auto">
+          <a:xfrm>
+            <a:off x="7528114" y="3453700"/>
+            <a:ext cx="819291" cy="819291"/>
+          </a:xfrm>
+          <a:prstGeom prst="ellipse">
+            <a:avLst/>
+          </a:prstGeom>
+          <a:noFill/>
+          <a:ln w="12700" cap="flat" cmpd="sng" algn="ctr">
+            <a:solidFill>
+              <a:schemeClr val="bg1"/>
+            </a:solidFill>
+            <a:prstDash val="solid"/>
+            <a:round/>
+            <a:headEnd type="none" w="med" len="med"/>
+            <a:tailEnd type="none" w="med" len="med"/>
+          </a:ln>
+          <a:effectLst/>
+        </p:spPr>
+        <p:txBody>
+          <a:bodyPr vert="horz" wrap="square" lIns="130046" tIns="78028" rIns="130046" bIns="65023" numCol="1" rtlCol="0" anchor="t" anchorCtr="0" compatLnSpc="1">
+            <a:prstTxWarp prst="textNoShape">
+              <a:avLst/>
+            </a:prstTxWarp>
+          </a:bodyPr>
+          <a:lstStyle/>
+          <a:p>
+            <a:pPr algn="ctr" defTabSz="1300460"/>
+            <a:r>
+              <a:rPr lang="en-US" sz="2800" i="1" dirty="0">
+                <a:solidFill>
+                  <a:schemeClr val="bg1"/>
+                </a:solidFill>
+                <a:latin typeface="Times New Roman" pitchFamily="18" charset="0"/>
+                <a:ea typeface="ヒラギノ明朝 ProN W3" charset="-128"/>
+                <a:cs typeface="Times New Roman" pitchFamily="18" charset="0"/>
+                <a:sym typeface="American Typewriter" charset="0"/>
+              </a:rPr>
+              <a:t>A</a:t>
+            </a:r>
+          </a:p>
+        </p:txBody>
+      </p:sp>
+      <p:sp>
+        <p:nvSpPr>
+          <p:cNvPr id="63" name="Oval 62"/>
+          <p:cNvSpPr/>
+          <p:nvPr/>
+        </p:nvSpPr>
+        <p:spPr bwMode="auto">
+          <a:xfrm>
+            <a:off x="8347405" y="4877524"/>
+            <a:ext cx="819291" cy="819291"/>
+          </a:xfrm>
+          <a:prstGeom prst="ellipse">
+            <a:avLst/>
+          </a:prstGeom>
+          <a:noFill/>
+          <a:ln w="12700" cap="flat" cmpd="sng" algn="ctr">
+            <a:solidFill>
+              <a:schemeClr val="bg1"/>
+            </a:solidFill>
+            <a:prstDash val="solid"/>
+            <a:round/>
+            <a:headEnd type="none" w="med" len="med"/>
+            <a:tailEnd type="none" w="med" len="med"/>
+          </a:ln>
+          <a:effectLst/>
+        </p:spPr>
+        <p:txBody>
+          <a:bodyPr vert="horz" wrap="square" lIns="130046" tIns="78028" rIns="130046" bIns="65023" numCol="1" rtlCol="0" anchor="t" anchorCtr="0" compatLnSpc="1">
+            <a:prstTxWarp prst="textNoShape">
+              <a:avLst/>
+            </a:prstTxWarp>
+          </a:bodyPr>
+          <a:lstStyle/>
+          <a:p>
+            <a:pPr algn="ctr" defTabSz="1300460"/>
+            <a:r>
+              <a:rPr lang="en-US" sz="2800" i="1" dirty="0" smtClean="0">
+                <a:solidFill>
+                  <a:schemeClr val="bg1"/>
+                </a:solidFill>
+                <a:latin typeface="Times New Roman" pitchFamily="18" charset="0"/>
+                <a:ea typeface="ヒラギノ明朝 ProN W3" charset="-128"/>
+                <a:cs typeface="Times New Roman" pitchFamily="18" charset="0"/>
+                <a:sym typeface="American Typewriter" charset="0"/>
+              </a:rPr>
+              <a:t>C</a:t>
+            </a:r>
+            <a:endParaRPr lang="en-US" sz="2800" i="1" dirty="0">
+              <a:solidFill>
+                <a:schemeClr val="bg1"/>
+              </a:solidFill>
+              <a:latin typeface="Times New Roman" pitchFamily="18" charset="0"/>
+              <a:ea typeface="ヒラギノ明朝 ProN W3" charset="-128"/>
+              <a:cs typeface="Times New Roman" pitchFamily="18" charset="0"/>
+              <a:sym typeface="American Typewriter" charset="0"/>
+            </a:endParaRPr>
+          </a:p>
+        </p:txBody>
+      </p:sp>
+      <p:sp>
+        <p:nvSpPr>
+          <p:cNvPr id="64" name="Oval 63"/>
+          <p:cNvSpPr/>
+          <p:nvPr/>
+        </p:nvSpPr>
+        <p:spPr bwMode="auto">
+          <a:xfrm>
+            <a:off x="9166696" y="3453699"/>
+            <a:ext cx="819291" cy="819291"/>
+          </a:xfrm>
+          <a:prstGeom prst="ellipse">
+            <a:avLst/>
+          </a:prstGeom>
+          <a:noFill/>
+          <a:ln w="12700" cap="flat" cmpd="sng" algn="ctr">
+            <a:solidFill>
+              <a:schemeClr val="bg1"/>
+            </a:solidFill>
+            <a:prstDash val="solid"/>
+            <a:round/>
+            <a:headEnd type="none" w="med" len="med"/>
+            <a:tailEnd type="none" w="med" len="med"/>
+          </a:ln>
+          <a:effectLst/>
+        </p:spPr>
+        <p:txBody>
+          <a:bodyPr vert="horz" wrap="square" lIns="130046" tIns="78028" rIns="130046" bIns="65023" numCol="1" rtlCol="0" anchor="t" anchorCtr="0" compatLnSpc="1">
+            <a:prstTxWarp prst="textNoShape">
+              <a:avLst/>
+            </a:prstTxWarp>
+          </a:bodyPr>
+          <a:lstStyle/>
+          <a:p>
+            <a:pPr algn="ctr" defTabSz="1300460"/>
+            <a:r>
+              <a:rPr lang="en-US" sz="2800" i="1" dirty="0" smtClean="0">
+                <a:solidFill>
+                  <a:schemeClr val="bg1"/>
+                </a:solidFill>
+                <a:latin typeface="Times New Roman" pitchFamily="18" charset="0"/>
+                <a:ea typeface="ヒラギノ明朝 ProN W3" charset="-128"/>
+                <a:cs typeface="Times New Roman" pitchFamily="18" charset="0"/>
+                <a:sym typeface="American Typewriter" charset="0"/>
+              </a:rPr>
+              <a:t>B</a:t>
+            </a:r>
+            <a:endParaRPr lang="en-US" sz="2800" i="1" dirty="0">
+              <a:solidFill>
+                <a:schemeClr val="bg1"/>
+              </a:solidFill>
+              <a:latin typeface="Times New Roman" pitchFamily="18" charset="0"/>
+              <a:ea typeface="ヒラギノ明朝 ProN W3" charset="-128"/>
+              <a:cs typeface="Times New Roman" pitchFamily="18" charset="0"/>
+              <a:sym typeface="American Typewriter" charset="0"/>
+            </a:endParaRPr>
+          </a:p>
+        </p:txBody>
+      </p:sp>
+      <p:cxnSp>
+        <p:nvCxnSpPr>
+          <p:cNvPr id="65" name="Straight Arrow Connector 64"/>
+          <p:cNvCxnSpPr>
+            <a:stCxn id="62" idx="5"/>
+            <a:endCxn id="63" idx="1"/>
+          </p:cNvCxnSpPr>
+          <p:nvPr/>
+        </p:nvCxnSpPr>
+        <p:spPr bwMode="auto">
+          <a:xfrm>
+            <a:off x="8227423" y="4153009"/>
+            <a:ext cx="239964" cy="844497"/>
+          </a:xfrm>
+          <a:prstGeom prst="straightConnector1">
+            <a:avLst/>
+          </a:prstGeom>
+          <a:blipFill dpi="0" rotWithShape="0">
+            <a:blip r:embed="rId2"/>
+            <a:srcRect/>
+            <a:tile tx="0" ty="0" sx="100000" sy="100000" flip="none" algn="tl"/>
+          </a:blipFill>
+          <a:ln w="12700" cap="flat" cmpd="sng" algn="ctr">
+            <a:solidFill>
+              <a:schemeClr val="bg1"/>
+            </a:solidFill>
+            <a:prstDash val="solid"/>
+            <a:round/>
+            <a:headEnd type="none" w="med" len="med"/>
+            <a:tailEnd type="none" w="lg" len="lg"/>
+          </a:ln>
+          <a:effectLst/>
+        </p:spPr>
+      </p:cxnSp>
+      <p:cxnSp>
+        <p:nvCxnSpPr>
+          <p:cNvPr id="66" name="Straight Arrow Connector 65"/>
+          <p:cNvCxnSpPr>
+            <a:stCxn id="64" idx="3"/>
+            <a:endCxn id="63" idx="7"/>
+          </p:cNvCxnSpPr>
+          <p:nvPr/>
+        </p:nvCxnSpPr>
+        <p:spPr bwMode="auto">
+          <a:xfrm flipH="1">
+            <a:off x="9046714" y="4153008"/>
+            <a:ext cx="239964" cy="844498"/>
+          </a:xfrm>
+          <a:prstGeom prst="straightConnector1">
+            <a:avLst/>
+          </a:prstGeom>
+          <a:blipFill dpi="0" rotWithShape="0">
+            <a:blip r:embed="rId2"/>
+            <a:srcRect/>
+            <a:tile tx="0" ty="0" sx="100000" sy="100000" flip="none" algn="tl"/>
+          </a:blipFill>
+          <a:ln w="12700" cap="flat" cmpd="sng" algn="ctr">
+            <a:solidFill>
+              <a:schemeClr val="bg1"/>
+            </a:solidFill>
+            <a:prstDash val="solid"/>
+            <a:round/>
+            <a:headEnd type="none" w="med" len="med"/>
+            <a:tailEnd type="none" w="lg" len="lg"/>
+          </a:ln>
+          <a:effectLst/>
+        </p:spPr>
+      </p:cxnSp>
+      <p:sp>
+        <p:nvSpPr>
+          <p:cNvPr id="67" name="Oval 66"/>
+          <p:cNvSpPr/>
+          <p:nvPr/>
+        </p:nvSpPr>
+        <p:spPr bwMode="auto">
+          <a:xfrm>
+            <a:off x="8347404" y="6476060"/>
+            <a:ext cx="819291" cy="819291"/>
+          </a:xfrm>
+          <a:prstGeom prst="ellipse">
+            <a:avLst/>
+          </a:prstGeom>
+          <a:noFill/>
+          <a:ln w="12700" cap="flat" cmpd="sng" algn="ctr">
+            <a:solidFill>
+              <a:schemeClr val="bg1"/>
+            </a:solidFill>
+            <a:prstDash val="solid"/>
+            <a:round/>
+            <a:headEnd type="none" w="med" len="med"/>
+            <a:tailEnd type="none" w="med" len="med"/>
+          </a:ln>
+          <a:effectLst/>
+        </p:spPr>
+        <p:txBody>
+          <a:bodyPr vert="horz" wrap="square" lIns="130046" tIns="78028" rIns="130046" bIns="65023" numCol="1" rtlCol="0" anchor="t" anchorCtr="0" compatLnSpc="1">
+            <a:prstTxWarp prst="textNoShape">
+              <a:avLst/>
+            </a:prstTxWarp>
+          </a:bodyPr>
+          <a:lstStyle/>
+          <a:p>
+            <a:pPr algn="ctr" defTabSz="1300460"/>
+            <a:r>
+              <a:rPr lang="en-US" sz="2800" i="1" dirty="0" smtClean="0">
+                <a:solidFill>
+                  <a:schemeClr val="bg1"/>
+                </a:solidFill>
+                <a:latin typeface="Times New Roman" pitchFamily="18" charset="0"/>
+                <a:ea typeface="ヒラギノ明朝 ProN W3" charset="-128"/>
+                <a:cs typeface="Times New Roman" pitchFamily="18" charset="0"/>
+                <a:sym typeface="American Typewriter" charset="0"/>
+              </a:rPr>
+              <a:t>D</a:t>
+            </a:r>
+            <a:endParaRPr lang="en-US" sz="2800" i="1" dirty="0">
+              <a:solidFill>
+                <a:schemeClr val="bg1"/>
+              </a:solidFill>
+              <a:latin typeface="Times New Roman" pitchFamily="18" charset="0"/>
+              <a:ea typeface="ヒラギノ明朝 ProN W3" charset="-128"/>
+              <a:cs typeface="Times New Roman" pitchFamily="18" charset="0"/>
+              <a:sym typeface="American Typewriter" charset="0"/>
+            </a:endParaRPr>
+          </a:p>
+        </p:txBody>
+      </p:sp>
+      <p:cxnSp>
+        <p:nvCxnSpPr>
+          <p:cNvPr id="68" name="Straight Arrow Connector 67"/>
+          <p:cNvCxnSpPr>
+            <a:stCxn id="63" idx="4"/>
+            <a:endCxn id="67" idx="0"/>
+          </p:cNvCxnSpPr>
+          <p:nvPr/>
+        </p:nvCxnSpPr>
+        <p:spPr bwMode="auto">
+          <a:xfrm flipH="1">
+            <a:off x="8757050" y="5696815"/>
+            <a:ext cx="1" cy="779245"/>
+          </a:xfrm>
+          <a:prstGeom prst="straightConnector1">
+            <a:avLst/>
+          </a:prstGeom>
+          <a:blipFill dpi="0" rotWithShape="0">
+            <a:blip r:embed="rId2"/>
+            <a:srcRect/>
+            <a:tile tx="0" ty="0" sx="100000" sy="100000" flip="none" algn="tl"/>
+          </a:blipFill>
+          <a:ln w="12700" cap="flat" cmpd="sng" algn="ctr">
+            <a:solidFill>
+              <a:schemeClr val="bg1"/>
+            </a:solidFill>
+            <a:prstDash val="solid"/>
+            <a:round/>
+            <a:headEnd type="none" w="med" len="med"/>
+            <a:tailEnd type="none" w="lg" len="lg"/>
+          </a:ln>
+          <a:effectLst/>
+        </p:spPr>
+      </p:cxnSp>
+      <p:sp>
+        <p:nvSpPr>
+          <p:cNvPr id="72" name="Oval 71"/>
+          <p:cNvSpPr/>
+          <p:nvPr/>
+        </p:nvSpPr>
+        <p:spPr bwMode="auto">
+          <a:xfrm>
+            <a:off x="9985987" y="4849062"/>
+            <a:ext cx="819291" cy="819291"/>
+          </a:xfrm>
+          <a:prstGeom prst="ellipse">
+            <a:avLst/>
+          </a:prstGeom>
+          <a:noFill/>
+          <a:ln w="12700" cap="flat" cmpd="sng" algn="ctr">
+            <a:solidFill>
+              <a:schemeClr val="bg1"/>
+            </a:solidFill>
+            <a:prstDash val="solid"/>
+            <a:round/>
+            <a:headEnd type="none" w="med" len="med"/>
+            <a:tailEnd type="none" w="med" len="med"/>
+          </a:ln>
+          <a:effectLst/>
+        </p:spPr>
+        <p:txBody>
+          <a:bodyPr vert="horz" wrap="square" lIns="130046" tIns="78028" rIns="130046" bIns="65023" numCol="1" rtlCol="0" anchor="t" anchorCtr="0" compatLnSpc="1">
+            <a:prstTxWarp prst="textNoShape">
+              <a:avLst/>
+            </a:prstTxWarp>
+          </a:bodyPr>
+          <a:lstStyle/>
+          <a:p>
+            <a:pPr algn="ctr" defTabSz="1300460"/>
+            <a:r>
+              <a:rPr lang="en-US" sz="2800" i="1" dirty="0">
+                <a:solidFill>
+                  <a:schemeClr val="bg1"/>
+                </a:solidFill>
+                <a:latin typeface="Times New Roman" pitchFamily="18" charset="0"/>
+                <a:ea typeface="ヒラギノ明朝 ProN W3" charset="-128"/>
+                <a:cs typeface="Times New Roman" pitchFamily="18" charset="0"/>
+                <a:sym typeface="American Typewriter" charset="0"/>
+              </a:rPr>
+              <a:t>D</a:t>
+            </a:r>
+          </a:p>
+        </p:txBody>
+      </p:sp>
+      <p:cxnSp>
+        <p:nvCxnSpPr>
+          <p:cNvPr id="79" name="Straight Arrow Connector 78"/>
+          <p:cNvCxnSpPr>
+            <a:stCxn id="64" idx="5"/>
+            <a:endCxn id="72" idx="1"/>
+          </p:cNvCxnSpPr>
+          <p:nvPr/>
+        </p:nvCxnSpPr>
+        <p:spPr bwMode="auto">
+          <a:xfrm>
+            <a:off x="9866005" y="4153008"/>
+            <a:ext cx="239964" cy="816036"/>
+          </a:xfrm>
+          <a:prstGeom prst="straightConnector1">
+            <a:avLst/>
+          </a:prstGeom>
+          <a:blipFill dpi="0" rotWithShape="0">
+            <a:blip r:embed="rId2"/>
+            <a:srcRect/>
+            <a:tile tx="0" ty="0" sx="100000" sy="100000" flip="none" algn="tl"/>
+          </a:blipFill>
+          <a:ln w="12700" cap="flat" cmpd="sng" algn="ctr">
+            <a:solidFill>
+              <a:schemeClr val="bg1"/>
+            </a:solidFill>
+            <a:prstDash val="solid"/>
+            <a:round/>
+            <a:headEnd type="none" w="med" len="med"/>
+            <a:tailEnd type="none" w="lg" len="lg"/>
+          </a:ln>
+          <a:effectLst/>
+        </p:spPr>
+      </p:cxnSp>
+      <p:sp>
+        <p:nvSpPr>
+          <p:cNvPr id="52" name="TextBox 51"/>
+          <p:cNvSpPr txBox="1"/>
+          <p:nvPr/>
+        </p:nvSpPr>
+        <p:spPr>
+          <a:xfrm>
+            <a:off x="1792327" y="7524889"/>
+            <a:ext cx="2002471" cy="492443"/>
+          </a:xfrm>
+          <a:prstGeom prst="rect">
+            <a:avLst/>
+          </a:prstGeom>
+          <a:noFill/>
+        </p:spPr>
+        <p:txBody>
+          <a:bodyPr wrap="none" rtlCol="0">
+            <a:spAutoFit/>
+          </a:bodyPr>
+          <a:lstStyle/>
+          <a:p>
+            <a:r>
+              <a:rPr lang="en-US" sz="2600" dirty="0" smtClean="0">
+                <a:solidFill>
+                  <a:srgbClr val="141313"/>
+                </a:solidFill>
+                <a:latin typeface="+mn-lt"/>
+                <a:ea typeface="ＭＳ Ｐゴシック" charset="-128"/>
+                <a:cs typeface="Arial"/>
+              </a:rPr>
+              <a:t>real </a:t>
+            </a:r>
+            <a:r>
+              <a:rPr lang="en-US" sz="2600" dirty="0">
+                <a:solidFill>
+                  <a:srgbClr val="141313"/>
+                </a:solidFill>
+                <a:latin typeface="+mn-lt"/>
+                <a:ea typeface="ＭＳ Ｐゴシック" charset="-128"/>
+                <a:cs typeface="Arial"/>
+                <a:sym typeface="Kievit-Book"/>
+              </a:rPr>
+              <a:t>network</a:t>
+            </a:r>
+          </a:p>
+        </p:txBody>
+      </p:sp>
+      <p:sp>
+        <p:nvSpPr>
+          <p:cNvPr id="80" name="TextBox 79"/>
+          <p:cNvSpPr txBox="1"/>
+          <p:nvPr/>
+        </p:nvSpPr>
+        <p:spPr>
+          <a:xfrm>
+            <a:off x="7468076" y="7505977"/>
+            <a:ext cx="2577950" cy="492443"/>
+          </a:xfrm>
+          <a:prstGeom prst="rect">
+            <a:avLst/>
+          </a:prstGeom>
+          <a:noFill/>
+        </p:spPr>
+        <p:txBody>
+          <a:bodyPr wrap="none" rtlCol="0">
+            <a:spAutoFit/>
+          </a:bodyPr>
+          <a:lstStyle/>
+          <a:p>
+            <a:r>
+              <a:rPr lang="en-US" sz="2600" dirty="0" smtClean="0">
+                <a:solidFill>
+                  <a:srgbClr val="141313"/>
+                </a:solidFill>
+                <a:latin typeface="+mn-lt"/>
+                <a:ea typeface="ＭＳ Ｐゴシック" charset="-128"/>
+                <a:cs typeface="Arial"/>
+              </a:rPr>
+              <a:t>inferred </a:t>
+            </a:r>
+            <a:r>
+              <a:rPr lang="en-US" sz="2600" dirty="0">
+                <a:solidFill>
+                  <a:srgbClr val="141313"/>
+                </a:solidFill>
+                <a:latin typeface="+mn-lt"/>
+                <a:ea typeface="ＭＳ Ｐゴシック" charset="-128"/>
+                <a:cs typeface="Arial"/>
+                <a:sym typeface="Kievit-Book"/>
+              </a:rPr>
+              <a:t>network</a:t>
+            </a:r>
+          </a:p>
+        </p:txBody>
+      </p:sp>
     </p:spTree>
     <p:extLst>
       <p:ext uri="{BB962C8B-B14F-4D97-AF65-F5344CB8AC3E}">
@@ -7198,11 +7175,11 @@
   <p:clrMapOvr>
     <a:masterClrMapping/>
   </p:clrMapOvr>
-  <p:transition xmlns:p14="http://schemas.microsoft.com/office/powerpoint/2010/main"/>
+  <p:transition/>
   <p:timing>
     <p:tnLst>
       <p:par>
-        <p:cTn xmlns:p14="http://schemas.microsoft.com/office/powerpoint/2010/main" id="1" dur="indefinite" restart="never" nodeType="tmRoot"/>
+        <p:cTn id="1" dur="indefinite" restart="never" nodeType="tmRoot"/>
       </p:par>
     </p:tnLst>
   </p:timing>
@@ -7261,8 +7238,8 @@
         </p:nvSpPr>
         <p:spPr>
           <a:xfrm>
-            <a:off x="900114" y="2070101"/>
-            <a:ext cx="5109668" cy="656061"/>
+            <a:off x="900113" y="2070100"/>
+            <a:ext cx="5355978" cy="574452"/>
           </a:xfrm>
         </p:spPr>
         <p:txBody>
@@ -7271,7 +7248,11 @@
           <a:p>
             <a:r>
               <a:rPr lang="en-US" dirty="0" smtClean="0"/>
-              <a:t>Step two: inferring the direction.</a:t>
+              <a:t>Step </a:t>
+            </a:r>
+            <a:r>
+              <a:rPr lang="en-US" dirty="0" smtClean="0"/>
+              <a:t>two: inferring the direction</a:t>
             </a:r>
             <a:endParaRPr lang="en-US" dirty="0"/>
           </a:p>
@@ -7285,66 +7266,7 @@
         </p:nvSpPr>
         <p:spPr bwMode="auto">
           <a:xfrm>
-            <a:off x="1683093" y="3340944"/>
-            <a:ext cx="819291" cy="819291"/>
-          </a:xfrm>
-          <a:prstGeom prst="ellipse">
-            <a:avLst/>
-          </a:prstGeom>
-          <a:noFill/>
-          <a:ln w="12700" cap="flat" cmpd="sng" algn="ctr">
-            <a:solidFill>
-              <a:schemeClr val="bg1"/>
-            </a:solidFill>
-            <a:prstDash val="dash"/>
-            <a:round/>
-            <a:headEnd type="none" w="med" len="med"/>
-            <a:tailEnd type="none" w="med" len="med"/>
-          </a:ln>
-          <a:effectLst/>
-        </p:spPr>
-        <p:txBody>
-          <a:bodyPr vert="horz" wrap="square" lIns="130046" tIns="78028" rIns="130046" bIns="65023" numCol="1" rtlCol="0" anchor="t" anchorCtr="0" compatLnSpc="1">
-            <a:prstTxWarp prst="textNoShape">
-              <a:avLst/>
-            </a:prstTxWarp>
-          </a:bodyPr>
-          <a:lstStyle/>
-          <a:p>
-            <a:pPr algn="ctr" defTabSz="1300460"/>
-            <a:r>
-              <a:rPr lang="en-US" sz="2800" i="1" dirty="0">
-                <a:solidFill>
-                  <a:schemeClr val="bg1"/>
-                </a:solidFill>
-                <a:latin typeface="Times New Roman" pitchFamily="18" charset="0"/>
-                <a:ea typeface="ヒラギノ明朝 ProN W3" charset="-128"/>
-                <a:cs typeface="Times New Roman" pitchFamily="18" charset="0"/>
-                <a:sym typeface="American Typewriter" charset="0"/>
-              </a:rPr>
-              <a:t>A</a:t>
-            </a:r>
-            <a:endParaRPr lang="en-US" sz="2800" i="1" dirty="0">
-              <a:solidFill>
-                <a:schemeClr val="bg1"/>
-              </a:solidFill>
-              <a:latin typeface="Times New Roman" pitchFamily="18" charset="0"/>
-              <a:ea typeface="ヒラギノ明朝 ProN W3" charset="-128"/>
-              <a:cs typeface="Times New Roman" pitchFamily="18" charset="0"/>
-              <a:sym typeface="American Typewriter" charset="0"/>
-            </a:endParaRPr>
-          </a:p>
-        </p:txBody>
-      </p:sp>
-      <p:sp>
-        <p:nvSpPr>
-          <p:cNvPr id="5" name="Oval 4"/>
-          <p:cNvSpPr/>
-          <p:nvPr/>
-        </p:nvSpPr>
-        <p:spPr bwMode="auto">
-          <a:xfrm>
-            <a:off x="1033694" y="4961640"/>
+            <a:off x="1564628" y="3432336"/>
             <a:ext cx="819291" cy="819291"/>
           </a:xfrm>
           <a:prstGeom prst="ellipse">
@@ -7381,29 +7303,20 @@
                 <a:cs typeface="Times New Roman" pitchFamily="18" charset="0"/>
                 <a:sym typeface="American Typewriter" charset="0"/>
               </a:rPr>
-              <a:t>B</a:t>
-            </a:r>
-            <a:endParaRPr lang="en-US" sz="2800" i="1" dirty="0">
-              <a:solidFill>
-                <a:schemeClr val="bg1"/>
-              </a:solidFill>
-              <a:latin typeface="Times New Roman" pitchFamily="18" charset="0"/>
-              <a:ea typeface="ヒラギノ明朝 ProN W3" charset="-128"/>
-              <a:cs typeface="Times New Roman" pitchFamily="18" charset="0"/>
-              <a:sym typeface="American Typewriter" charset="0"/>
-            </a:endParaRPr>
+              <a:t>A</a:t>
+            </a:r>
           </a:p>
         </p:txBody>
       </p:sp>
       <p:sp>
         <p:nvSpPr>
-          <p:cNvPr id="6" name="Oval 5"/>
+          <p:cNvPr id="5" name="Oval 4"/>
           <p:cNvSpPr/>
           <p:nvPr/>
         </p:nvSpPr>
         <p:spPr bwMode="auto">
           <a:xfrm>
-            <a:off x="2382401" y="4961640"/>
+            <a:off x="2383919" y="4877524"/>
             <a:ext cx="819291" cy="819291"/>
           </a:xfrm>
           <a:prstGeom prst="ellipse">
@@ -7431,7 +7344,7 @@
           <a:p>
             <a:pPr algn="ctr" defTabSz="1300460"/>
             <a:r>
-              <a:rPr lang="en-US" sz="2800" i="1" dirty="0">
+              <a:rPr lang="en-US" sz="2800" i="1" dirty="0" smtClean="0">
                 <a:solidFill>
                   <a:schemeClr val="bg1"/>
                 </a:solidFill>
@@ -7454,19 +7367,78 @@
           </a:p>
         </p:txBody>
       </p:sp>
+      <p:sp>
+        <p:nvSpPr>
+          <p:cNvPr id="6" name="Oval 5"/>
+          <p:cNvSpPr/>
+          <p:nvPr/>
+        </p:nvSpPr>
+        <p:spPr bwMode="auto">
+          <a:xfrm>
+            <a:off x="3203210" y="3432335"/>
+            <a:ext cx="819291" cy="819291"/>
+          </a:xfrm>
+          <a:prstGeom prst="ellipse">
+            <a:avLst/>
+          </a:prstGeom>
+          <a:noFill/>
+          <a:ln w="12700" cap="flat" cmpd="sng" algn="ctr">
+            <a:solidFill>
+              <a:schemeClr val="bg1"/>
+            </a:solidFill>
+            <a:prstDash val="solid"/>
+            <a:round/>
+            <a:headEnd type="none" w="med" len="med"/>
+            <a:tailEnd type="none" w="med" len="med"/>
+          </a:ln>
+          <a:effectLst/>
+        </p:spPr>
+        <p:txBody>
+          <a:bodyPr vert="horz" wrap="square" lIns="130046" tIns="78028" rIns="130046" bIns="65023" numCol="1" rtlCol="0" anchor="t" anchorCtr="0" compatLnSpc="1">
+            <a:prstTxWarp prst="textNoShape">
+              <a:avLst/>
+            </a:prstTxWarp>
+          </a:bodyPr>
+          <a:lstStyle/>
+          <a:p>
+            <a:pPr algn="ctr" defTabSz="1300460"/>
+            <a:r>
+              <a:rPr lang="en-US" sz="2800" i="1" dirty="0" smtClean="0">
+                <a:solidFill>
+                  <a:schemeClr val="bg1"/>
+                </a:solidFill>
+                <a:latin typeface="Times New Roman" pitchFamily="18" charset="0"/>
+                <a:ea typeface="ヒラギノ明朝 ProN W3" charset="-128"/>
+                <a:cs typeface="Times New Roman" pitchFamily="18" charset="0"/>
+                <a:sym typeface="American Typewriter" charset="0"/>
+              </a:rPr>
+              <a:t>B</a:t>
+            </a:r>
+            <a:endParaRPr lang="en-US" sz="2800" i="1" dirty="0">
+              <a:solidFill>
+                <a:schemeClr val="bg1"/>
+              </a:solidFill>
+              <a:latin typeface="Times New Roman" pitchFamily="18" charset="0"/>
+              <a:ea typeface="ヒラギノ明朝 ProN W3" charset="-128"/>
+              <a:cs typeface="Times New Roman" pitchFamily="18" charset="0"/>
+              <a:sym typeface="American Typewriter" charset="0"/>
+            </a:endParaRPr>
+          </a:p>
+        </p:txBody>
+      </p:sp>
       <p:cxnSp>
         <p:nvCxnSpPr>
           <p:cNvPr id="7" name="Straight Arrow Connector 6"/>
           <p:cNvCxnSpPr>
-            <a:stCxn id="4" idx="3"/>
-            <a:endCxn id="5" idx="0"/>
+            <a:stCxn id="4" idx="5"/>
+            <a:endCxn id="5" idx="1"/>
           </p:cNvCxnSpPr>
           <p:nvPr/>
         </p:nvCxnSpPr>
         <p:spPr bwMode="auto">
-          <a:xfrm flipH="1">
-            <a:off x="1443339" y="4040252"/>
-            <a:ext cx="359737" cy="921388"/>
+          <a:xfrm>
+            <a:off x="2263937" y="4131645"/>
+            <a:ext cx="239964" cy="865861"/>
           </a:xfrm>
           <a:prstGeom prst="straightConnector1">
             <a:avLst/>
@@ -7492,15 +7464,15 @@
         <p:nvCxnSpPr>
           <p:cNvPr id="8" name="Straight Arrow Connector 7"/>
           <p:cNvCxnSpPr>
-            <a:stCxn id="4" idx="5"/>
-            <a:endCxn id="6" idx="0"/>
+            <a:stCxn id="6" idx="3"/>
+            <a:endCxn id="5" idx="7"/>
           </p:cNvCxnSpPr>
           <p:nvPr/>
         </p:nvCxnSpPr>
         <p:spPr bwMode="auto">
-          <a:xfrm>
-            <a:off x="2382401" y="4040252"/>
-            <a:ext cx="409646" cy="921388"/>
+          <a:xfrm flipH="1">
+            <a:off x="3083228" y="4131644"/>
+            <a:ext cx="239964" cy="865862"/>
           </a:xfrm>
           <a:prstGeom prst="straightConnector1">
             <a:avLst/>
@@ -7530,7 +7502,7 @@
         </p:nvSpPr>
         <p:spPr bwMode="auto">
           <a:xfrm>
-            <a:off x="3662979" y="4961640"/>
+            <a:off x="2383918" y="6476060"/>
             <a:ext cx="819291" cy="819291"/>
           </a:xfrm>
           <a:prstGeom prst="ellipse">
@@ -7558,7 +7530,7 @@
           <a:p>
             <a:pPr algn="ctr" defTabSz="1300460"/>
             <a:r>
-              <a:rPr lang="en-US" sz="2800" i="1" dirty="0">
+              <a:rPr lang="en-US" sz="2800" i="1" dirty="0" smtClean="0">
                 <a:solidFill>
                   <a:schemeClr val="bg1"/>
                 </a:solidFill>
@@ -7567,7 +7539,7 @@
                 <a:cs typeface="Times New Roman" pitchFamily="18" charset="0"/>
                 <a:sym typeface="American Typewriter" charset="0"/>
               </a:rPr>
-              <a:t>E</a:t>
+              <a:t>D</a:t>
             </a:r>
             <a:endParaRPr lang="en-US" sz="2800" i="1" dirty="0">
               <a:solidFill>
@@ -7585,15 +7557,15 @@
         <p:nvCxnSpPr>
           <p:cNvPr id="19" name="Straight Arrow Connector 18"/>
           <p:cNvCxnSpPr>
-            <a:stCxn id="6" idx="6"/>
-            <a:endCxn id="18" idx="2"/>
+            <a:stCxn id="5" idx="4"/>
+            <a:endCxn id="18" idx="0"/>
           </p:cNvCxnSpPr>
           <p:nvPr/>
         </p:nvCxnSpPr>
         <p:spPr bwMode="auto">
-          <a:xfrm>
-            <a:off x="3201693" y="5371285"/>
-            <a:ext cx="461286" cy="0"/>
+          <a:xfrm flipH="1">
+            <a:off x="2793564" y="5696815"/>
+            <a:ext cx="1" cy="779245"/>
           </a:xfrm>
           <a:prstGeom prst="straightConnector1">
             <a:avLst/>
@@ -7610,7 +7582,7 @@
             <a:prstDash val="solid"/>
             <a:round/>
             <a:headEnd type="none" w="med" len="med"/>
-            <a:tailEnd type="none"/>
+            <a:tailEnd type="triangle" w="lg" len="lg"/>
           </a:ln>
           <a:effectLst/>
         </p:spPr>
@@ -7623,7 +7595,7 @@
         </p:nvSpPr>
         <p:spPr bwMode="auto">
           <a:xfrm>
-            <a:off x="4362287" y="3430507"/>
+            <a:off x="4022501" y="4849062"/>
             <a:ext cx="819291" cy="819291"/>
           </a:xfrm>
           <a:prstGeom prst="ellipse">
@@ -7662,15 +7634,6 @@
               </a:rPr>
               <a:t>D</a:t>
             </a:r>
-            <a:endParaRPr lang="en-US" sz="2800" i="1" dirty="0">
-              <a:solidFill>
-                <a:schemeClr val="bg1"/>
-              </a:solidFill>
-              <a:latin typeface="Times New Roman" pitchFamily="18" charset="0"/>
-              <a:ea typeface="ヒラギノ明朝 ProN W3" charset="-128"/>
-              <a:cs typeface="Times New Roman" pitchFamily="18" charset="0"/>
-              <a:sym typeface="American Typewriter" charset="0"/>
-            </a:endParaRPr>
           </a:p>
         </p:txBody>
       </p:sp>
@@ -7678,49 +7641,15 @@
         <p:nvCxnSpPr>
           <p:cNvPr id="24" name="Straight Arrow Connector 23"/>
           <p:cNvCxnSpPr>
-            <a:stCxn id="23" idx="3"/>
-            <a:endCxn id="18" idx="0"/>
-          </p:cNvCxnSpPr>
-          <p:nvPr/>
-        </p:nvCxnSpPr>
-        <p:spPr bwMode="auto">
-          <a:xfrm flipH="1">
-            <a:off x="4072624" y="4129816"/>
-            <a:ext cx="409646" cy="831825"/>
-          </a:xfrm>
-          <a:prstGeom prst="straightConnector1">
-            <a:avLst/>
-          </a:prstGeom>
-          <a:blipFill dpi="0" rotWithShape="0">
-            <a:blip r:embed="rId2"/>
-            <a:srcRect/>
-            <a:tile tx="0" ty="0" sx="100000" sy="100000" flip="none" algn="tl"/>
-          </a:blipFill>
-          <a:ln w="12700" cap="flat" cmpd="sng" algn="ctr">
-            <a:solidFill>
-              <a:schemeClr val="bg1"/>
-            </a:solidFill>
-            <a:prstDash val="solid"/>
-            <a:round/>
-            <a:headEnd type="none" w="med" len="med"/>
-            <a:tailEnd type="triangle" w="lg" len="lg"/>
-          </a:ln>
-          <a:effectLst/>
-        </p:spPr>
-      </p:cxnSp>
-      <p:cxnSp>
-        <p:nvCxnSpPr>
-          <p:cNvPr id="38" name="Straight Arrow Connector 37"/>
-          <p:cNvCxnSpPr>
-            <a:stCxn id="23" idx="5"/>
-            <a:endCxn id="43" idx="0"/>
+            <a:stCxn id="6" idx="5"/>
+            <a:endCxn id="23" idx="1"/>
           </p:cNvCxnSpPr>
           <p:nvPr/>
         </p:nvCxnSpPr>
         <p:spPr bwMode="auto">
           <a:xfrm>
-            <a:off x="5061595" y="4129816"/>
-            <a:ext cx="409646" cy="831825"/>
+            <a:off x="3902519" y="4131644"/>
+            <a:ext cx="239964" cy="837400"/>
           </a:xfrm>
           <a:prstGeom prst="straightConnector1">
             <a:avLst/>
@@ -7744,503 +7673,13 @@
       </p:cxnSp>
       <p:sp>
         <p:nvSpPr>
-          <p:cNvPr id="43" name="Oval 42"/>
-          <p:cNvSpPr/>
-          <p:nvPr/>
-        </p:nvSpPr>
-        <p:spPr bwMode="auto">
-          <a:xfrm>
-            <a:off x="5061595" y="4961640"/>
-            <a:ext cx="819291" cy="819291"/>
-          </a:xfrm>
-          <a:prstGeom prst="ellipse">
-            <a:avLst/>
-          </a:prstGeom>
-          <a:noFill/>
-          <a:ln w="12700" cap="flat" cmpd="sng" algn="ctr">
-            <a:solidFill>
-              <a:schemeClr val="bg1"/>
-            </a:solidFill>
-            <a:prstDash val="solid"/>
-            <a:round/>
-            <a:headEnd type="none" w="med" len="med"/>
-            <a:tailEnd type="none" w="med" len="med"/>
-          </a:ln>
-          <a:effectLst/>
-        </p:spPr>
-        <p:txBody>
-          <a:bodyPr vert="horz" wrap="square" lIns="130046" tIns="78028" rIns="130046" bIns="65023" numCol="1" rtlCol="0" anchor="t" anchorCtr="0" compatLnSpc="1">
-            <a:prstTxWarp prst="textNoShape">
-              <a:avLst/>
-            </a:prstTxWarp>
-          </a:bodyPr>
-          <a:lstStyle/>
-          <a:p>
-            <a:pPr algn="ctr" defTabSz="1300460"/>
-            <a:r>
-              <a:rPr lang="en-US" sz="2800" i="1" dirty="0">
-                <a:solidFill>
-                  <a:schemeClr val="bg1"/>
-                </a:solidFill>
-                <a:latin typeface="Times New Roman" pitchFamily="18" charset="0"/>
-                <a:ea typeface="ヒラギノ明朝 ProN W3" charset="-128"/>
-                <a:cs typeface="Times New Roman" pitchFamily="18" charset="0"/>
-                <a:sym typeface="American Typewriter" charset="0"/>
-              </a:rPr>
-              <a:t>F</a:t>
-            </a:r>
-            <a:endParaRPr lang="en-US" sz="2800" i="1" dirty="0">
-              <a:solidFill>
-                <a:schemeClr val="bg1"/>
-              </a:solidFill>
-              <a:latin typeface="Times New Roman" pitchFamily="18" charset="0"/>
-              <a:ea typeface="ヒラギノ明朝 ProN W3" charset="-128"/>
-              <a:cs typeface="Times New Roman" pitchFamily="18" charset="0"/>
-              <a:sym typeface="American Typewriter" charset="0"/>
-            </a:endParaRPr>
-          </a:p>
-        </p:txBody>
-      </p:sp>
-      <p:sp>
-        <p:nvSpPr>
-          <p:cNvPr id="69" name="Oval 68"/>
-          <p:cNvSpPr/>
-          <p:nvPr/>
-        </p:nvSpPr>
-        <p:spPr bwMode="auto">
-          <a:xfrm>
-            <a:off x="6672292" y="4961640"/>
-            <a:ext cx="819291" cy="819291"/>
-          </a:xfrm>
-          <a:prstGeom prst="ellipse">
-            <a:avLst/>
-          </a:prstGeom>
-          <a:noFill/>
-          <a:ln w="12700" cap="flat" cmpd="sng" algn="ctr">
-            <a:solidFill>
-              <a:schemeClr val="bg1"/>
-            </a:solidFill>
-            <a:prstDash val="solid"/>
-            <a:round/>
-            <a:headEnd type="none" w="med" len="med"/>
-            <a:tailEnd type="none" w="med" len="med"/>
-          </a:ln>
-          <a:effectLst/>
-        </p:spPr>
-        <p:txBody>
-          <a:bodyPr vert="horz" wrap="square" lIns="130046" tIns="78028" rIns="130046" bIns="65023" numCol="1" rtlCol="0" anchor="t" anchorCtr="0" compatLnSpc="1">
-            <a:prstTxWarp prst="textNoShape">
-              <a:avLst/>
-            </a:prstTxWarp>
-          </a:bodyPr>
-          <a:lstStyle/>
-          <a:p>
-            <a:pPr algn="ctr" defTabSz="1300460"/>
-            <a:r>
-              <a:rPr lang="en-US" sz="2800" i="1" dirty="0">
-                <a:solidFill>
-                  <a:schemeClr val="bg1"/>
-                </a:solidFill>
-                <a:latin typeface="Times New Roman" pitchFamily="18" charset="0"/>
-                <a:ea typeface="ヒラギノ明朝 ProN W3" charset="-128"/>
-                <a:cs typeface="Times New Roman" pitchFamily="18" charset="0"/>
-                <a:sym typeface="American Typewriter" charset="0"/>
-              </a:rPr>
-              <a:t>B</a:t>
-            </a:r>
-            <a:endParaRPr lang="en-US" sz="2800" i="1" dirty="0">
-              <a:solidFill>
-                <a:schemeClr val="bg1"/>
-              </a:solidFill>
-              <a:latin typeface="Times New Roman" pitchFamily="18" charset="0"/>
-              <a:ea typeface="ヒラギノ明朝 ProN W3" charset="-128"/>
-              <a:cs typeface="Times New Roman" pitchFamily="18" charset="0"/>
-              <a:sym typeface="American Typewriter" charset="0"/>
-            </a:endParaRPr>
-          </a:p>
-        </p:txBody>
-      </p:sp>
-      <p:sp>
-        <p:nvSpPr>
-          <p:cNvPr id="70" name="Oval 69"/>
-          <p:cNvSpPr/>
-          <p:nvPr/>
-        </p:nvSpPr>
-        <p:spPr bwMode="auto">
-          <a:xfrm>
-            <a:off x="8020999" y="4961640"/>
-            <a:ext cx="819291" cy="819291"/>
-          </a:xfrm>
-          <a:prstGeom prst="ellipse">
-            <a:avLst/>
-          </a:prstGeom>
-          <a:noFill/>
-          <a:ln w="12700" cap="flat" cmpd="sng" algn="ctr">
-            <a:solidFill>
-              <a:schemeClr val="bg1"/>
-            </a:solidFill>
-            <a:prstDash val="solid"/>
-            <a:round/>
-            <a:headEnd type="none" w="med" len="med"/>
-            <a:tailEnd type="none" w="med" len="med"/>
-          </a:ln>
-          <a:effectLst/>
-        </p:spPr>
-        <p:txBody>
-          <a:bodyPr vert="horz" wrap="square" lIns="130046" tIns="78028" rIns="130046" bIns="65023" numCol="1" rtlCol="0" anchor="t" anchorCtr="0" compatLnSpc="1">
-            <a:prstTxWarp prst="textNoShape">
-              <a:avLst/>
-            </a:prstTxWarp>
-          </a:bodyPr>
-          <a:lstStyle/>
-          <a:p>
-            <a:pPr algn="ctr" defTabSz="1300460"/>
-            <a:r>
-              <a:rPr lang="en-US" sz="2800" i="1" dirty="0">
-                <a:solidFill>
-                  <a:schemeClr val="bg1"/>
-                </a:solidFill>
-                <a:latin typeface="Times New Roman" pitchFamily="18" charset="0"/>
-                <a:ea typeface="ヒラギノ明朝 ProN W3" charset="-128"/>
-                <a:cs typeface="Times New Roman" pitchFamily="18" charset="0"/>
-                <a:sym typeface="American Typewriter" charset="0"/>
-              </a:rPr>
-              <a:t>C</a:t>
-            </a:r>
-            <a:endParaRPr lang="en-US" sz="2800" i="1" dirty="0">
-              <a:solidFill>
-                <a:schemeClr val="bg1"/>
-              </a:solidFill>
-              <a:latin typeface="Times New Roman" pitchFamily="18" charset="0"/>
-              <a:ea typeface="ヒラギノ明朝 ProN W3" charset="-128"/>
-              <a:cs typeface="Times New Roman" pitchFamily="18" charset="0"/>
-              <a:sym typeface="American Typewriter" charset="0"/>
-            </a:endParaRPr>
-          </a:p>
-        </p:txBody>
-      </p:sp>
-      <p:cxnSp>
-        <p:nvCxnSpPr>
-          <p:cNvPr id="71" name="Straight Arrow Connector 70"/>
-          <p:cNvCxnSpPr>
-            <a:stCxn id="70" idx="2"/>
-            <a:endCxn id="69" idx="6"/>
-          </p:cNvCxnSpPr>
-          <p:nvPr/>
-        </p:nvCxnSpPr>
-        <p:spPr bwMode="auto">
-          <a:xfrm flipH="1">
-            <a:off x="7491582" y="5371285"/>
-            <a:ext cx="529417" cy="0"/>
-          </a:xfrm>
-          <a:prstGeom prst="straightConnector1">
-            <a:avLst/>
-          </a:prstGeom>
-          <a:blipFill dpi="0" rotWithShape="0">
-            <a:blip r:embed="rId2"/>
-            <a:srcRect/>
-            <a:tile tx="0" ty="0" sx="100000" sy="100000" flip="none" algn="tl"/>
-          </a:blipFill>
-          <a:ln w="12700" cap="flat" cmpd="sng" algn="ctr">
-            <a:solidFill>
-              <a:schemeClr val="bg1"/>
-            </a:solidFill>
-            <a:prstDash val="solid"/>
-            <a:round/>
-            <a:headEnd type="triangle" w="lg" len="lg"/>
-            <a:tailEnd type="triangle" w="lg" len="lg"/>
-          </a:ln>
-          <a:effectLst/>
-        </p:spPr>
-      </p:cxnSp>
-      <p:sp>
-        <p:nvSpPr>
-          <p:cNvPr id="73" name="Oval 72"/>
-          <p:cNvSpPr/>
-          <p:nvPr/>
-        </p:nvSpPr>
-        <p:spPr bwMode="auto">
-          <a:xfrm>
-            <a:off x="9301577" y="4961640"/>
-            <a:ext cx="819291" cy="819291"/>
-          </a:xfrm>
-          <a:prstGeom prst="ellipse">
-            <a:avLst/>
-          </a:prstGeom>
-          <a:noFill/>
-          <a:ln w="12700" cap="flat" cmpd="sng" algn="ctr">
-            <a:solidFill>
-              <a:schemeClr val="bg1"/>
-            </a:solidFill>
-            <a:prstDash val="solid"/>
-            <a:round/>
-            <a:headEnd type="none" w="med" len="med"/>
-            <a:tailEnd type="none" w="med" len="med"/>
-          </a:ln>
-          <a:effectLst/>
-        </p:spPr>
-        <p:txBody>
-          <a:bodyPr vert="horz" wrap="square" lIns="130046" tIns="78028" rIns="130046" bIns="65023" numCol="1" rtlCol="0" anchor="t" anchorCtr="0" compatLnSpc="1">
-            <a:prstTxWarp prst="textNoShape">
-              <a:avLst/>
-            </a:prstTxWarp>
-          </a:bodyPr>
-          <a:lstStyle/>
-          <a:p>
-            <a:pPr algn="ctr" defTabSz="1300460"/>
-            <a:r>
-              <a:rPr lang="en-US" sz="2800" i="1" dirty="0">
-                <a:solidFill>
-                  <a:schemeClr val="bg1"/>
-                </a:solidFill>
-                <a:latin typeface="Times New Roman" pitchFamily="18" charset="0"/>
-                <a:ea typeface="ヒラギノ明朝 ProN W3" charset="-128"/>
-                <a:cs typeface="Times New Roman" pitchFamily="18" charset="0"/>
-                <a:sym typeface="American Typewriter" charset="0"/>
-              </a:rPr>
-              <a:t>E</a:t>
-            </a:r>
-            <a:endParaRPr lang="en-US" sz="2800" i="1" dirty="0">
-              <a:solidFill>
-                <a:schemeClr val="bg1"/>
-              </a:solidFill>
-              <a:latin typeface="Times New Roman" pitchFamily="18" charset="0"/>
-              <a:ea typeface="ヒラギノ明朝 ProN W3" charset="-128"/>
-              <a:cs typeface="Times New Roman" pitchFamily="18" charset="0"/>
-              <a:sym typeface="American Typewriter" charset="0"/>
-            </a:endParaRPr>
-          </a:p>
-        </p:txBody>
-      </p:sp>
-      <p:cxnSp>
-        <p:nvCxnSpPr>
-          <p:cNvPr id="74" name="Straight Arrow Connector 73"/>
-          <p:cNvCxnSpPr>
-            <a:stCxn id="70" idx="6"/>
-            <a:endCxn id="73" idx="2"/>
-          </p:cNvCxnSpPr>
-          <p:nvPr/>
-        </p:nvCxnSpPr>
-        <p:spPr bwMode="auto">
-          <a:xfrm>
-            <a:off x="8840290" y="5371285"/>
-            <a:ext cx="461286" cy="0"/>
-          </a:xfrm>
-          <a:prstGeom prst="straightConnector1">
-            <a:avLst/>
-          </a:prstGeom>
-          <a:blipFill dpi="0" rotWithShape="0">
-            <a:blip r:embed="rId2"/>
-            <a:srcRect/>
-            <a:tile tx="0" ty="0" sx="100000" sy="100000" flip="none" algn="tl"/>
-          </a:blipFill>
-          <a:ln w="12700" cap="flat" cmpd="sng" algn="ctr">
-            <a:solidFill>
-              <a:schemeClr val="bg1"/>
-            </a:solidFill>
-            <a:prstDash val="solid"/>
-            <a:round/>
-            <a:headEnd type="none" w="med" len="med"/>
-            <a:tailEnd type="none"/>
-          </a:ln>
-          <a:effectLst/>
-        </p:spPr>
-      </p:cxnSp>
-      <p:sp>
-        <p:nvSpPr>
-          <p:cNvPr id="75" name="Oval 74"/>
-          <p:cNvSpPr/>
-          <p:nvPr/>
-        </p:nvSpPr>
-        <p:spPr bwMode="auto">
-          <a:xfrm>
-            <a:off x="10000885" y="3430507"/>
-            <a:ext cx="819291" cy="819291"/>
-          </a:xfrm>
-          <a:prstGeom prst="ellipse">
-            <a:avLst/>
-          </a:prstGeom>
-          <a:noFill/>
-          <a:ln w="12700" cap="flat" cmpd="sng" algn="ctr">
-            <a:solidFill>
-              <a:schemeClr val="bg1"/>
-            </a:solidFill>
-            <a:prstDash val="solid"/>
-            <a:round/>
-            <a:headEnd type="none" w="med" len="med"/>
-            <a:tailEnd type="none" w="med" len="med"/>
-          </a:ln>
-          <a:effectLst/>
-        </p:spPr>
-        <p:txBody>
-          <a:bodyPr vert="horz" wrap="square" lIns="130046" tIns="78028" rIns="130046" bIns="65023" numCol="1" rtlCol="0" anchor="t" anchorCtr="0" compatLnSpc="1">
-            <a:prstTxWarp prst="textNoShape">
-              <a:avLst/>
-            </a:prstTxWarp>
-          </a:bodyPr>
-          <a:lstStyle/>
-          <a:p>
-            <a:pPr algn="ctr" defTabSz="1300460"/>
-            <a:r>
-              <a:rPr lang="en-US" sz="2800" i="1" dirty="0">
-                <a:solidFill>
-                  <a:schemeClr val="bg1"/>
-                </a:solidFill>
-                <a:latin typeface="Times New Roman" pitchFamily="18" charset="0"/>
-                <a:ea typeface="ヒラギノ明朝 ProN W3" charset="-128"/>
-                <a:cs typeface="Times New Roman" pitchFamily="18" charset="0"/>
-                <a:sym typeface="American Typewriter" charset="0"/>
-              </a:rPr>
-              <a:t>D</a:t>
-            </a:r>
-            <a:endParaRPr lang="en-US" sz="2800" i="1" dirty="0">
-              <a:solidFill>
-                <a:schemeClr val="bg1"/>
-              </a:solidFill>
-              <a:latin typeface="Times New Roman" pitchFamily="18" charset="0"/>
-              <a:ea typeface="ヒラギノ明朝 ProN W3" charset="-128"/>
-              <a:cs typeface="Times New Roman" pitchFamily="18" charset="0"/>
-              <a:sym typeface="American Typewriter" charset="0"/>
-            </a:endParaRPr>
-          </a:p>
-        </p:txBody>
-      </p:sp>
-      <p:cxnSp>
-        <p:nvCxnSpPr>
-          <p:cNvPr id="76" name="Straight Arrow Connector 75"/>
-          <p:cNvCxnSpPr>
-            <a:stCxn id="75" idx="3"/>
-            <a:endCxn id="73" idx="0"/>
-          </p:cNvCxnSpPr>
-          <p:nvPr/>
-        </p:nvCxnSpPr>
-        <p:spPr bwMode="auto">
-          <a:xfrm flipH="1">
-            <a:off x="9711222" y="4129816"/>
-            <a:ext cx="409646" cy="831825"/>
-          </a:xfrm>
-          <a:prstGeom prst="straightConnector1">
-            <a:avLst/>
-          </a:prstGeom>
-          <a:blipFill dpi="0" rotWithShape="0">
-            <a:blip r:embed="rId2"/>
-            <a:srcRect/>
-            <a:tile tx="0" ty="0" sx="100000" sy="100000" flip="none" algn="tl"/>
-          </a:blipFill>
-          <a:ln w="12700" cap="flat" cmpd="sng" algn="ctr">
-            <a:solidFill>
-              <a:schemeClr val="bg1"/>
-            </a:solidFill>
-            <a:prstDash val="solid"/>
-            <a:round/>
-            <a:headEnd type="none" w="med" len="med"/>
-            <a:tailEnd type="triangle" w="lg" len="lg"/>
-          </a:ln>
-          <a:effectLst/>
-        </p:spPr>
-      </p:cxnSp>
-      <p:cxnSp>
-        <p:nvCxnSpPr>
-          <p:cNvPr id="77" name="Straight Arrow Connector 76"/>
-          <p:cNvCxnSpPr>
-            <a:stCxn id="75" idx="5"/>
-            <a:endCxn id="78" idx="0"/>
-          </p:cNvCxnSpPr>
-          <p:nvPr/>
-        </p:nvCxnSpPr>
-        <p:spPr bwMode="auto">
-          <a:xfrm>
-            <a:off x="10700192" y="4129816"/>
-            <a:ext cx="409646" cy="831825"/>
-          </a:xfrm>
-          <a:prstGeom prst="straightConnector1">
-            <a:avLst/>
-          </a:prstGeom>
-          <a:blipFill dpi="0" rotWithShape="0">
-            <a:blip r:embed="rId2"/>
-            <a:srcRect/>
-            <a:tile tx="0" ty="0" sx="100000" sy="100000" flip="none" algn="tl"/>
-          </a:blipFill>
-          <a:ln w="12700" cap="flat" cmpd="sng" algn="ctr">
-            <a:solidFill>
-              <a:schemeClr val="bg1"/>
-            </a:solidFill>
-            <a:prstDash val="solid"/>
-            <a:round/>
-            <a:headEnd type="none" w="med" len="med"/>
-            <a:tailEnd type="triangle" w="lg" len="lg"/>
-          </a:ln>
-          <a:effectLst/>
-        </p:spPr>
-      </p:cxnSp>
-      <p:sp>
-        <p:nvSpPr>
-          <p:cNvPr id="78" name="Oval 77"/>
-          <p:cNvSpPr/>
-          <p:nvPr/>
-        </p:nvSpPr>
-        <p:spPr bwMode="auto">
-          <a:xfrm>
-            <a:off x="10700193" y="4961640"/>
-            <a:ext cx="819291" cy="819291"/>
-          </a:xfrm>
-          <a:prstGeom prst="ellipse">
-            <a:avLst/>
-          </a:prstGeom>
-          <a:noFill/>
-          <a:ln w="12700" cap="flat" cmpd="sng" algn="ctr">
-            <a:solidFill>
-              <a:schemeClr val="bg1"/>
-            </a:solidFill>
-            <a:prstDash val="solid"/>
-            <a:round/>
-            <a:headEnd type="none" w="med" len="med"/>
-            <a:tailEnd type="none" w="med" len="med"/>
-          </a:ln>
-          <a:effectLst/>
-        </p:spPr>
-        <p:txBody>
-          <a:bodyPr vert="horz" wrap="square" lIns="130046" tIns="78028" rIns="130046" bIns="65023" numCol="1" rtlCol="0" anchor="t" anchorCtr="0" compatLnSpc="1">
-            <a:prstTxWarp prst="textNoShape">
-              <a:avLst/>
-            </a:prstTxWarp>
-          </a:bodyPr>
-          <a:lstStyle/>
-          <a:p>
-            <a:pPr algn="ctr" defTabSz="1300460"/>
-            <a:r>
-              <a:rPr lang="en-US" sz="2800" i="1" dirty="0">
-                <a:solidFill>
-                  <a:schemeClr val="bg1"/>
-                </a:solidFill>
-                <a:latin typeface="Times New Roman" pitchFamily="18" charset="0"/>
-                <a:ea typeface="ヒラギノ明朝 ProN W3" charset="-128"/>
-                <a:cs typeface="Times New Roman" pitchFamily="18" charset="0"/>
-                <a:sym typeface="American Typewriter" charset="0"/>
-              </a:rPr>
-              <a:t>F</a:t>
-            </a:r>
-            <a:endParaRPr lang="en-US" sz="2800" i="1" dirty="0">
-              <a:solidFill>
-                <a:schemeClr val="bg1"/>
-              </a:solidFill>
-              <a:latin typeface="Times New Roman" pitchFamily="18" charset="0"/>
-              <a:ea typeface="ヒラギノ明朝 ProN W3" charset="-128"/>
-              <a:cs typeface="Times New Roman" pitchFamily="18" charset="0"/>
-              <a:sym typeface="American Typewriter" charset="0"/>
-            </a:endParaRPr>
-          </a:p>
-        </p:txBody>
-      </p:sp>
-      <p:sp>
-        <p:nvSpPr>
           <p:cNvPr id="81" name="Right Arrow 80"/>
           <p:cNvSpPr/>
           <p:nvPr/>
         </p:nvSpPr>
         <p:spPr bwMode="auto">
           <a:xfrm>
-            <a:off x="6009782" y="4295352"/>
+            <a:off x="6009782" y="4849062"/>
             <a:ext cx="492619" cy="500750"/>
           </a:xfrm>
           <a:prstGeom prst="rightArrow">
@@ -8409,21 +7848,530 @@
           </a:p>
         </p:txBody>
       </p:sp>
+      <p:sp>
+        <p:nvSpPr>
+          <p:cNvPr id="62" name="Oval 61"/>
+          <p:cNvSpPr/>
+          <p:nvPr/>
+        </p:nvSpPr>
+        <p:spPr bwMode="auto">
+          <a:xfrm>
+            <a:off x="7528114" y="3436640"/>
+            <a:ext cx="819291" cy="819291"/>
+          </a:xfrm>
+          <a:prstGeom prst="ellipse">
+            <a:avLst/>
+          </a:prstGeom>
+          <a:noFill/>
+          <a:ln w="12700" cap="flat" cmpd="sng" algn="ctr">
+            <a:solidFill>
+              <a:schemeClr val="bg1"/>
+            </a:solidFill>
+            <a:prstDash val="solid"/>
+            <a:round/>
+            <a:headEnd type="none" w="med" len="med"/>
+            <a:tailEnd type="none" w="med" len="med"/>
+          </a:ln>
+          <a:effectLst/>
+        </p:spPr>
+        <p:txBody>
+          <a:bodyPr vert="horz" wrap="square" lIns="130046" tIns="78028" rIns="130046" bIns="65023" numCol="1" rtlCol="0" anchor="t" anchorCtr="0" compatLnSpc="1">
+            <a:prstTxWarp prst="textNoShape">
+              <a:avLst/>
+            </a:prstTxWarp>
+          </a:bodyPr>
+          <a:lstStyle/>
+          <a:p>
+            <a:pPr algn="ctr" defTabSz="1300460"/>
+            <a:r>
+              <a:rPr lang="en-US" sz="2800" i="1" dirty="0">
+                <a:solidFill>
+                  <a:schemeClr val="bg1"/>
+                </a:solidFill>
+                <a:latin typeface="Times New Roman" pitchFamily="18" charset="0"/>
+                <a:ea typeface="ヒラギノ明朝 ProN W3" charset="-128"/>
+                <a:cs typeface="Times New Roman" pitchFamily="18" charset="0"/>
+                <a:sym typeface="American Typewriter" charset="0"/>
+              </a:rPr>
+              <a:t>A</a:t>
+            </a:r>
+          </a:p>
+        </p:txBody>
+      </p:sp>
+      <p:sp>
+        <p:nvSpPr>
+          <p:cNvPr id="63" name="Oval 62"/>
+          <p:cNvSpPr/>
+          <p:nvPr/>
+        </p:nvSpPr>
+        <p:spPr bwMode="auto">
+          <a:xfrm>
+            <a:off x="8347405" y="4877524"/>
+            <a:ext cx="819291" cy="819291"/>
+          </a:xfrm>
+          <a:prstGeom prst="ellipse">
+            <a:avLst/>
+          </a:prstGeom>
+          <a:noFill/>
+          <a:ln w="12700" cap="flat" cmpd="sng" algn="ctr">
+            <a:solidFill>
+              <a:schemeClr val="bg1"/>
+            </a:solidFill>
+            <a:prstDash val="solid"/>
+            <a:round/>
+            <a:headEnd type="none" w="med" len="med"/>
+            <a:tailEnd type="none" w="med" len="med"/>
+          </a:ln>
+          <a:effectLst/>
+        </p:spPr>
+        <p:txBody>
+          <a:bodyPr vert="horz" wrap="square" lIns="130046" tIns="78028" rIns="130046" bIns="65023" numCol="1" rtlCol="0" anchor="t" anchorCtr="0" compatLnSpc="1">
+            <a:prstTxWarp prst="textNoShape">
+              <a:avLst/>
+            </a:prstTxWarp>
+          </a:bodyPr>
+          <a:lstStyle/>
+          <a:p>
+            <a:pPr algn="ctr" defTabSz="1300460"/>
+            <a:r>
+              <a:rPr lang="en-US" sz="2800" i="1" dirty="0" smtClean="0">
+                <a:solidFill>
+                  <a:schemeClr val="bg1"/>
+                </a:solidFill>
+                <a:latin typeface="Times New Roman" pitchFamily="18" charset="0"/>
+                <a:ea typeface="ヒラギノ明朝 ProN W3" charset="-128"/>
+                <a:cs typeface="Times New Roman" pitchFamily="18" charset="0"/>
+                <a:sym typeface="American Typewriter" charset="0"/>
+              </a:rPr>
+              <a:t>C</a:t>
+            </a:r>
+            <a:endParaRPr lang="en-US" sz="2800" i="1" dirty="0">
+              <a:solidFill>
+                <a:schemeClr val="bg1"/>
+              </a:solidFill>
+              <a:latin typeface="Times New Roman" pitchFamily="18" charset="0"/>
+              <a:ea typeface="ヒラギノ明朝 ProN W3" charset="-128"/>
+              <a:cs typeface="Times New Roman" pitchFamily="18" charset="0"/>
+              <a:sym typeface="American Typewriter" charset="0"/>
+            </a:endParaRPr>
+          </a:p>
+        </p:txBody>
+      </p:sp>
+      <p:sp>
+        <p:nvSpPr>
+          <p:cNvPr id="64" name="Oval 63"/>
+          <p:cNvSpPr/>
+          <p:nvPr/>
+        </p:nvSpPr>
+        <p:spPr bwMode="auto">
+          <a:xfrm>
+            <a:off x="9166696" y="3436639"/>
+            <a:ext cx="819291" cy="819291"/>
+          </a:xfrm>
+          <a:prstGeom prst="ellipse">
+            <a:avLst/>
+          </a:prstGeom>
+          <a:noFill/>
+          <a:ln w="12700" cap="flat" cmpd="sng" algn="ctr">
+            <a:solidFill>
+              <a:schemeClr val="bg1"/>
+            </a:solidFill>
+            <a:prstDash val="solid"/>
+            <a:round/>
+            <a:headEnd type="none" w="med" len="med"/>
+            <a:tailEnd type="none" w="med" len="med"/>
+          </a:ln>
+          <a:effectLst/>
+        </p:spPr>
+        <p:txBody>
+          <a:bodyPr vert="horz" wrap="square" lIns="130046" tIns="78028" rIns="130046" bIns="65023" numCol="1" rtlCol="0" anchor="t" anchorCtr="0" compatLnSpc="1">
+            <a:prstTxWarp prst="textNoShape">
+              <a:avLst/>
+            </a:prstTxWarp>
+          </a:bodyPr>
+          <a:lstStyle/>
+          <a:p>
+            <a:pPr algn="ctr" defTabSz="1300460"/>
+            <a:r>
+              <a:rPr lang="en-US" sz="2800" i="1" dirty="0" smtClean="0">
+                <a:solidFill>
+                  <a:schemeClr val="bg1"/>
+                </a:solidFill>
+                <a:latin typeface="Times New Roman" pitchFamily="18" charset="0"/>
+                <a:ea typeface="ヒラギノ明朝 ProN W3" charset="-128"/>
+                <a:cs typeface="Times New Roman" pitchFamily="18" charset="0"/>
+                <a:sym typeface="American Typewriter" charset="0"/>
+              </a:rPr>
+              <a:t>B</a:t>
+            </a:r>
+            <a:endParaRPr lang="en-US" sz="2800" i="1" dirty="0">
+              <a:solidFill>
+                <a:schemeClr val="bg1"/>
+              </a:solidFill>
+              <a:latin typeface="Times New Roman" pitchFamily="18" charset="0"/>
+              <a:ea typeface="ヒラギノ明朝 ProN W3" charset="-128"/>
+              <a:cs typeface="Times New Roman" pitchFamily="18" charset="0"/>
+              <a:sym typeface="American Typewriter" charset="0"/>
+            </a:endParaRPr>
+          </a:p>
+        </p:txBody>
+      </p:sp>
+      <p:cxnSp>
+        <p:nvCxnSpPr>
+          <p:cNvPr id="65" name="Straight Arrow Connector 64"/>
+          <p:cNvCxnSpPr>
+            <a:stCxn id="62" idx="5"/>
+            <a:endCxn id="63" idx="1"/>
+          </p:cNvCxnSpPr>
+          <p:nvPr/>
+        </p:nvCxnSpPr>
+        <p:spPr bwMode="auto">
+          <a:xfrm>
+            <a:off x="8227423" y="4135949"/>
+            <a:ext cx="239964" cy="861557"/>
+          </a:xfrm>
+          <a:prstGeom prst="straightConnector1">
+            <a:avLst/>
+          </a:prstGeom>
+          <a:blipFill dpi="0" rotWithShape="0">
+            <a:blip r:embed="rId2"/>
+            <a:srcRect/>
+            <a:tile tx="0" ty="0" sx="100000" sy="100000" flip="none" algn="tl"/>
+          </a:blipFill>
+          <a:ln w="12700" cap="flat" cmpd="sng" algn="ctr">
+            <a:solidFill>
+              <a:schemeClr val="bg1"/>
+            </a:solidFill>
+            <a:prstDash val="solid"/>
+            <a:round/>
+            <a:headEnd type="oval" w="lg" len="lg"/>
+            <a:tailEnd type="triangle" w="lg" len="lg"/>
+          </a:ln>
+          <a:effectLst/>
+        </p:spPr>
+      </p:cxnSp>
+      <p:cxnSp>
+        <p:nvCxnSpPr>
+          <p:cNvPr id="66" name="Straight Arrow Connector 65"/>
+          <p:cNvCxnSpPr>
+            <a:stCxn id="64" idx="3"/>
+            <a:endCxn id="63" idx="7"/>
+          </p:cNvCxnSpPr>
+          <p:nvPr/>
+        </p:nvCxnSpPr>
+        <p:spPr bwMode="auto">
+          <a:xfrm flipH="1">
+            <a:off x="9046714" y="4135948"/>
+            <a:ext cx="239964" cy="861558"/>
+          </a:xfrm>
+          <a:prstGeom prst="straightConnector1">
+            <a:avLst/>
+          </a:prstGeom>
+          <a:blipFill dpi="0" rotWithShape="0">
+            <a:blip r:embed="rId2"/>
+            <a:srcRect/>
+            <a:tile tx="0" ty="0" sx="100000" sy="100000" flip="none" algn="tl"/>
+          </a:blipFill>
+          <a:ln w="12700" cap="flat" cmpd="sng" algn="ctr">
+            <a:solidFill>
+              <a:schemeClr val="bg1"/>
+            </a:solidFill>
+            <a:prstDash val="solid"/>
+            <a:round/>
+            <a:headEnd type="oval" w="lg" len="lg"/>
+            <a:tailEnd type="triangle" w="lg" len="lg"/>
+          </a:ln>
+          <a:effectLst/>
+        </p:spPr>
+      </p:cxnSp>
+      <p:sp>
+        <p:nvSpPr>
+          <p:cNvPr id="67" name="Oval 66"/>
+          <p:cNvSpPr/>
+          <p:nvPr/>
+        </p:nvSpPr>
+        <p:spPr bwMode="auto">
+          <a:xfrm>
+            <a:off x="8347404" y="6476060"/>
+            <a:ext cx="819291" cy="819291"/>
+          </a:xfrm>
+          <a:prstGeom prst="ellipse">
+            <a:avLst/>
+          </a:prstGeom>
+          <a:noFill/>
+          <a:ln w="12700" cap="flat" cmpd="sng" algn="ctr">
+            <a:solidFill>
+              <a:schemeClr val="bg1"/>
+            </a:solidFill>
+            <a:prstDash val="solid"/>
+            <a:round/>
+            <a:headEnd type="none" w="med" len="med"/>
+            <a:tailEnd type="none" w="med" len="med"/>
+          </a:ln>
+          <a:effectLst/>
+        </p:spPr>
+        <p:txBody>
+          <a:bodyPr vert="horz" wrap="square" lIns="130046" tIns="78028" rIns="130046" bIns="65023" numCol="1" rtlCol="0" anchor="t" anchorCtr="0" compatLnSpc="1">
+            <a:prstTxWarp prst="textNoShape">
+              <a:avLst/>
+            </a:prstTxWarp>
+          </a:bodyPr>
+          <a:lstStyle/>
+          <a:p>
+            <a:pPr algn="ctr" defTabSz="1300460"/>
+            <a:r>
+              <a:rPr lang="en-US" sz="2800" i="1" dirty="0" smtClean="0">
+                <a:solidFill>
+                  <a:schemeClr val="bg1"/>
+                </a:solidFill>
+                <a:latin typeface="Times New Roman" pitchFamily="18" charset="0"/>
+                <a:ea typeface="ヒラギノ明朝 ProN W3" charset="-128"/>
+                <a:cs typeface="Times New Roman" pitchFamily="18" charset="0"/>
+                <a:sym typeface="American Typewriter" charset="0"/>
+              </a:rPr>
+              <a:t>D</a:t>
+            </a:r>
+            <a:endParaRPr lang="en-US" sz="2800" i="1" dirty="0">
+              <a:solidFill>
+                <a:schemeClr val="bg1"/>
+              </a:solidFill>
+              <a:latin typeface="Times New Roman" pitchFamily="18" charset="0"/>
+              <a:ea typeface="ヒラギノ明朝 ProN W3" charset="-128"/>
+              <a:cs typeface="Times New Roman" pitchFamily="18" charset="0"/>
+              <a:sym typeface="American Typewriter" charset="0"/>
+            </a:endParaRPr>
+          </a:p>
+        </p:txBody>
+      </p:sp>
+      <p:cxnSp>
+        <p:nvCxnSpPr>
+          <p:cNvPr id="68" name="Straight Arrow Connector 67"/>
+          <p:cNvCxnSpPr>
+            <a:stCxn id="63" idx="4"/>
+            <a:endCxn id="67" idx="0"/>
+          </p:cNvCxnSpPr>
+          <p:nvPr/>
+        </p:nvCxnSpPr>
+        <p:spPr bwMode="auto">
+          <a:xfrm flipH="1">
+            <a:off x="8757050" y="5696815"/>
+            <a:ext cx="1" cy="779245"/>
+          </a:xfrm>
+          <a:prstGeom prst="straightConnector1">
+            <a:avLst/>
+          </a:prstGeom>
+          <a:blipFill dpi="0" rotWithShape="0">
+            <a:blip r:embed="rId2"/>
+            <a:srcRect/>
+            <a:tile tx="0" ty="0" sx="100000" sy="100000" flip="none" algn="tl"/>
+          </a:blipFill>
+          <a:ln w="12700" cap="flat" cmpd="sng" algn="ctr">
+            <a:solidFill>
+              <a:schemeClr val="bg1"/>
+            </a:solidFill>
+            <a:prstDash val="solid"/>
+            <a:round/>
+            <a:headEnd type="none" w="med" len="med"/>
+            <a:tailEnd type="triangle" w="lg" len="lg"/>
+          </a:ln>
+          <a:effectLst/>
+        </p:spPr>
+      </p:cxnSp>
+      <p:sp>
+        <p:nvSpPr>
+          <p:cNvPr id="72" name="Oval 71"/>
+          <p:cNvSpPr/>
+          <p:nvPr/>
+        </p:nvSpPr>
+        <p:spPr bwMode="auto">
+          <a:xfrm>
+            <a:off x="9985987" y="4849062"/>
+            <a:ext cx="819291" cy="819291"/>
+          </a:xfrm>
+          <a:prstGeom prst="ellipse">
+            <a:avLst/>
+          </a:prstGeom>
+          <a:noFill/>
+          <a:ln w="12700" cap="flat" cmpd="sng" algn="ctr">
+            <a:solidFill>
+              <a:schemeClr val="bg1"/>
+            </a:solidFill>
+            <a:prstDash val="solid"/>
+            <a:round/>
+            <a:headEnd type="none" w="med" len="med"/>
+            <a:tailEnd type="none" w="med" len="med"/>
+          </a:ln>
+          <a:effectLst/>
+        </p:spPr>
+        <p:txBody>
+          <a:bodyPr vert="horz" wrap="square" lIns="130046" tIns="78028" rIns="130046" bIns="65023" numCol="1" rtlCol="0" anchor="t" anchorCtr="0" compatLnSpc="1">
+            <a:prstTxWarp prst="textNoShape">
+              <a:avLst/>
+            </a:prstTxWarp>
+          </a:bodyPr>
+          <a:lstStyle/>
+          <a:p>
+            <a:pPr algn="ctr" defTabSz="1300460"/>
+            <a:r>
+              <a:rPr lang="en-US" sz="2800" i="1" dirty="0">
+                <a:solidFill>
+                  <a:schemeClr val="bg1"/>
+                </a:solidFill>
+                <a:latin typeface="Times New Roman" pitchFamily="18" charset="0"/>
+                <a:ea typeface="ヒラギノ明朝 ProN W3" charset="-128"/>
+                <a:cs typeface="Times New Roman" pitchFamily="18" charset="0"/>
+                <a:sym typeface="American Typewriter" charset="0"/>
+              </a:rPr>
+              <a:t>D</a:t>
+            </a:r>
+          </a:p>
+        </p:txBody>
+      </p:sp>
+      <p:cxnSp>
+        <p:nvCxnSpPr>
+          <p:cNvPr id="79" name="Straight Arrow Connector 78"/>
+          <p:cNvCxnSpPr>
+            <a:stCxn id="64" idx="5"/>
+            <a:endCxn id="72" idx="1"/>
+          </p:cNvCxnSpPr>
+          <p:nvPr/>
+        </p:nvCxnSpPr>
+        <p:spPr bwMode="auto">
+          <a:xfrm>
+            <a:off x="9866005" y="4135948"/>
+            <a:ext cx="239964" cy="833096"/>
+          </a:xfrm>
+          <a:prstGeom prst="straightConnector1">
+            <a:avLst/>
+          </a:prstGeom>
+          <a:blipFill dpi="0" rotWithShape="0">
+            <a:blip r:embed="rId2"/>
+            <a:srcRect/>
+            <a:tile tx="0" ty="0" sx="100000" sy="100000" flip="none" algn="tl"/>
+          </a:blipFill>
+          <a:ln w="12700" cap="flat" cmpd="sng" algn="ctr">
+            <a:solidFill>
+              <a:schemeClr val="bg1"/>
+            </a:solidFill>
+            <a:prstDash val="solid"/>
+            <a:round/>
+            <a:headEnd type="oval" w="lg" len="lg"/>
+            <a:tailEnd type="oval" w="lg" len="lg"/>
+          </a:ln>
+          <a:effectLst/>
+        </p:spPr>
+      </p:cxnSp>
+      <p:sp>
+        <p:nvSpPr>
+          <p:cNvPr id="25" name="TextBox 24"/>
+          <p:cNvSpPr txBox="1"/>
+          <p:nvPr/>
+        </p:nvSpPr>
+        <p:spPr>
+          <a:xfrm>
+            <a:off x="1792327" y="7524889"/>
+            <a:ext cx="2002471" cy="492443"/>
+          </a:xfrm>
+          <a:prstGeom prst="rect">
+            <a:avLst/>
+          </a:prstGeom>
+          <a:noFill/>
+        </p:spPr>
+        <p:txBody>
+          <a:bodyPr wrap="none" rtlCol="0">
+            <a:spAutoFit/>
+          </a:bodyPr>
+          <a:lstStyle/>
+          <a:p>
+            <a:r>
+              <a:rPr lang="en-US" sz="2600" dirty="0" smtClean="0">
+                <a:solidFill>
+                  <a:srgbClr val="141313"/>
+                </a:solidFill>
+                <a:latin typeface="+mn-lt"/>
+                <a:ea typeface="ＭＳ Ｐゴシック" charset="-128"/>
+                <a:cs typeface="Arial"/>
+              </a:rPr>
+              <a:t>real </a:t>
+            </a:r>
+            <a:r>
+              <a:rPr lang="en-US" sz="2600" dirty="0">
+                <a:solidFill>
+                  <a:srgbClr val="141313"/>
+                </a:solidFill>
+                <a:latin typeface="+mn-lt"/>
+                <a:ea typeface="ＭＳ Ｐゴシック" charset="-128"/>
+                <a:cs typeface="Arial"/>
+                <a:sym typeface="Kievit-Book"/>
+              </a:rPr>
+              <a:t>network</a:t>
+            </a:r>
+          </a:p>
+        </p:txBody>
+      </p:sp>
+      <p:sp>
+        <p:nvSpPr>
+          <p:cNvPr id="26" name="TextBox 25"/>
+          <p:cNvSpPr txBox="1"/>
+          <p:nvPr/>
+        </p:nvSpPr>
+        <p:spPr>
+          <a:xfrm>
+            <a:off x="7468076" y="7505977"/>
+            <a:ext cx="2577950" cy="492443"/>
+          </a:xfrm>
+          <a:prstGeom prst="rect">
+            <a:avLst/>
+          </a:prstGeom>
+          <a:noFill/>
+        </p:spPr>
+        <p:txBody>
+          <a:bodyPr wrap="none" rtlCol="0">
+            <a:spAutoFit/>
+          </a:bodyPr>
+          <a:lstStyle/>
+          <a:p>
+            <a:r>
+              <a:rPr lang="en-US" sz="2600" dirty="0" smtClean="0">
+                <a:solidFill>
+                  <a:srgbClr val="141313"/>
+                </a:solidFill>
+                <a:latin typeface="+mn-lt"/>
+                <a:ea typeface="ＭＳ Ｐゴシック" charset="-128"/>
+                <a:cs typeface="Arial"/>
+              </a:rPr>
+              <a:t>inferred </a:t>
+            </a:r>
+            <a:r>
+              <a:rPr lang="en-US" sz="2600" dirty="0">
+                <a:solidFill>
+                  <a:srgbClr val="141313"/>
+                </a:solidFill>
+                <a:latin typeface="+mn-lt"/>
+                <a:ea typeface="ＭＳ Ｐゴシック" charset="-128"/>
+                <a:cs typeface="Arial"/>
+                <a:sym typeface="Kievit-Book"/>
+              </a:rPr>
+              <a:t>network</a:t>
+            </a:r>
+          </a:p>
+        </p:txBody>
+      </p:sp>
     </p:spTree>
     <p:extLst>
       <p:ext uri="{BB962C8B-B14F-4D97-AF65-F5344CB8AC3E}">
-        <p14:creationId xmlns:p14="http://schemas.microsoft.com/office/powerpoint/2010/main" val="710527088"/>
+        <p14:creationId xmlns:p14="http://schemas.microsoft.com/office/powerpoint/2010/main" val="1495584061"/>
       </p:ext>
     </p:extLst>
   </p:cSld>
   <p:clrMapOvr>
     <a:masterClrMapping/>
   </p:clrMapOvr>
-  <p:transition xmlns:p14="http://schemas.microsoft.com/office/powerpoint/2010/main"/>
+  <p:transition/>
   <p:timing>
     <p:tnLst>
       <p:par>
-        <p:cTn xmlns:p14="http://schemas.microsoft.com/office/powerpoint/2010/main" id="1" dur="indefinite" restart="never" nodeType="tmRoot"/>
+        <p:cTn id="1" dur="indefinite" restart="never" nodeType="tmRoot"/>
       </p:par>
     </p:tnLst>
   </p:timing>
@@ -11775,11 +11723,11 @@
   <p:clrMapOvr>
     <a:masterClrMapping/>
   </p:clrMapOvr>
-  <p:transition xmlns:p14="http://schemas.microsoft.com/office/powerpoint/2010/main"/>
+  <p:transition/>
   <p:timing>
     <p:tnLst>
       <p:par>
-        <p:cTn xmlns:p14="http://schemas.microsoft.com/office/powerpoint/2010/main" id="1" dur="indefinite" restart="never" nodeType="tmRoot"/>
+        <p:cTn id="1" dur="indefinite" restart="never" nodeType="tmRoot"/>
       </p:par>
     </p:tnLst>
   </p:timing>
@@ -11856,11 +11804,11 @@
   <p:clrMapOvr>
     <a:masterClrMapping/>
   </p:clrMapOvr>
-  <p:transition xmlns:p14="http://schemas.microsoft.com/office/powerpoint/2010/main"/>
+  <p:transition/>
   <p:timing>
     <p:tnLst>
       <p:par>
-        <p:cTn xmlns:p14="http://schemas.microsoft.com/office/powerpoint/2010/main" id="1" dur="indefinite" restart="never" nodeType="tmRoot"/>
+        <p:cTn id="1" dur="indefinite" restart="never" nodeType="tmRoot"/>
       </p:par>
     </p:tnLst>
   </p:timing>
@@ -11940,7 +11888,6 @@
               <a:rPr lang="en-US" dirty="0" smtClean="0"/>
               <a:t>Still prominent in 1848</a:t>
             </a:r>
-            <a:endParaRPr lang="en-US" dirty="0" smtClean="0"/>
           </a:p>
         </p:txBody>
       </p:sp>
@@ -11984,11 +11931,11 @@
   <p:clrMapOvr>
     <a:masterClrMapping/>
   </p:clrMapOvr>
-  <p:transition xmlns:p14="http://schemas.microsoft.com/office/powerpoint/2010/main"/>
+  <p:transition/>
   <p:timing>
     <p:tnLst>
       <p:par>
-        <p:cTn xmlns:p14="http://schemas.microsoft.com/office/powerpoint/2010/main" id="1" dur="indefinite" restart="never" nodeType="tmRoot"/>
+        <p:cTn id="1" dur="indefinite" restart="never" nodeType="tmRoot"/>
       </p:par>
     </p:tnLst>
   </p:timing>
@@ -12216,11 +12163,11 @@
   <p:clrMapOvr>
     <a:masterClrMapping/>
   </p:clrMapOvr>
-  <p:transition xmlns:p14="http://schemas.microsoft.com/office/powerpoint/2010/main"/>
+  <p:transition/>
   <p:timing>
     <p:tnLst>
       <p:par>
-        <p:cTn xmlns:p14="http://schemas.microsoft.com/office/powerpoint/2010/main" id="1" dur="indefinite" restart="never" nodeType="tmRoot"/>
+        <p:cTn id="1" dur="indefinite" restart="never" nodeType="tmRoot"/>
       </p:par>
     </p:tnLst>
   </p:timing>
@@ -12303,11 +12250,11 @@
   <p:clrMapOvr>
     <a:masterClrMapping/>
   </p:clrMapOvr>
-  <p:transition xmlns:p14="http://schemas.microsoft.com/office/powerpoint/2010/main"/>
+  <p:transition/>
   <p:timing>
     <p:tnLst>
       <p:par>
-        <p:cTn xmlns:p14="http://schemas.microsoft.com/office/powerpoint/2010/main" id="1" dur="indefinite" restart="never" nodeType="tmRoot"/>
+        <p:cTn id="1" dur="indefinite" restart="never" nodeType="tmRoot"/>
       </p:par>
     </p:tnLst>
   </p:timing>
@@ -12398,11 +12345,11 @@
   <p:clrMapOvr>
     <a:masterClrMapping/>
   </p:clrMapOvr>
-  <p:transition xmlns:p14="http://schemas.microsoft.com/office/powerpoint/2010/main"/>
+  <p:transition/>
   <p:timing>
     <p:tnLst>
       <p:par>
-        <p:cTn xmlns:p14="http://schemas.microsoft.com/office/powerpoint/2010/main" id="1" dur="indefinite" restart="never" nodeType="tmRoot"/>
+        <p:cTn id="1" dur="indefinite" restart="never" nodeType="tmRoot"/>
       </p:par>
     </p:tnLst>
   </p:timing>
@@ -12563,11 +12510,11 @@
   <p:clrMapOvr>
     <a:masterClrMapping/>
   </p:clrMapOvr>
-  <p:transition xmlns:p14="http://schemas.microsoft.com/office/powerpoint/2010/main"/>
+  <p:transition/>
   <p:timing>
     <p:tnLst>
       <p:par>
-        <p:cTn xmlns:p14="http://schemas.microsoft.com/office/powerpoint/2010/main" id="1" dur="indefinite" restart="never" nodeType="tmRoot"/>
+        <p:cTn id="1" dur="indefinite" restart="never" nodeType="tmRoot"/>
       </p:par>
     </p:tnLst>
   </p:timing>
@@ -12650,11 +12597,11 @@
   <p:clrMapOvr>
     <a:masterClrMapping/>
   </p:clrMapOvr>
-  <p:transition xmlns:p14="http://schemas.microsoft.com/office/powerpoint/2010/main"/>
+  <p:transition/>
   <p:timing>
     <p:tnLst>
       <p:par>
-        <p:cTn xmlns:p14="http://schemas.microsoft.com/office/powerpoint/2010/main" id="1" dur="indefinite" restart="never" nodeType="tmRoot"/>
+        <p:cTn id="1" dur="indefinite" restart="never" nodeType="tmRoot"/>
       </p:par>
     </p:tnLst>
   </p:timing>
@@ -12752,11 +12699,11 @@
   <p:clrMapOvr>
     <a:masterClrMapping/>
   </p:clrMapOvr>
-  <p:transition xmlns:p14="http://schemas.microsoft.com/office/powerpoint/2010/main"/>
+  <p:transition/>
   <p:timing>
     <p:tnLst>
       <p:par>
-        <p:cTn xmlns:p14="http://schemas.microsoft.com/office/powerpoint/2010/main" id="1" dur="indefinite" restart="never" nodeType="tmRoot"/>
+        <p:cTn id="1" dur="indefinite" restart="never" nodeType="tmRoot"/>
       </p:par>
     </p:tnLst>
   </p:timing>
@@ -12896,15 +12843,6 @@
               </a:rPr>
               <a:t>A</a:t>
             </a:r>
-            <a:endParaRPr lang="en-US" sz="2800" i="1" dirty="0">
-              <a:solidFill>
-                <a:schemeClr val="bg1"/>
-              </a:solidFill>
-              <a:latin typeface="Times New Roman" pitchFamily="18" charset="0"/>
-              <a:ea typeface="ヒラギノ明朝 ProN W3" charset="-128"/>
-              <a:cs typeface="Times New Roman" pitchFamily="18" charset="0"/>
-              <a:sym typeface="American Typewriter" charset="0"/>
-            </a:endParaRPr>
           </a:p>
         </p:txBody>
       </p:sp>
@@ -12955,15 +12893,6 @@
               </a:rPr>
               <a:t>B</a:t>
             </a:r>
-            <a:endParaRPr lang="en-US" sz="2800" i="1" dirty="0">
-              <a:solidFill>
-                <a:schemeClr val="bg1"/>
-              </a:solidFill>
-              <a:latin typeface="Times New Roman" pitchFamily="18" charset="0"/>
-              <a:ea typeface="ヒラギノ明朝 ProN W3" charset="-128"/>
-              <a:cs typeface="Times New Roman" pitchFamily="18" charset="0"/>
-              <a:sym typeface="American Typewriter" charset="0"/>
-            </a:endParaRPr>
           </a:p>
         </p:txBody>
       </p:sp>
@@ -13014,15 +12943,6 @@
               </a:rPr>
               <a:t>C</a:t>
             </a:r>
-            <a:endParaRPr lang="en-US" sz="2800" i="1" dirty="0">
-              <a:solidFill>
-                <a:schemeClr val="bg1"/>
-              </a:solidFill>
-              <a:latin typeface="Times New Roman" pitchFamily="18" charset="0"/>
-              <a:ea typeface="ヒラギノ明朝 ProN W3" charset="-128"/>
-              <a:cs typeface="Times New Roman" pitchFamily="18" charset="0"/>
-              <a:sym typeface="American Typewriter" charset="0"/>
-            </a:endParaRPr>
           </a:p>
         </p:txBody>
       </p:sp>
@@ -13141,15 +13061,6 @@
               </a:rPr>
               <a:t>B</a:t>
             </a:r>
-            <a:endParaRPr lang="en-US" sz="2800" i="1" dirty="0">
-              <a:solidFill>
-                <a:schemeClr val="bg1"/>
-              </a:solidFill>
-              <a:latin typeface="Times New Roman" pitchFamily="18" charset="0"/>
-              <a:ea typeface="ヒラギノ明朝 ProN W3" charset="-128"/>
-              <a:cs typeface="Times New Roman" pitchFamily="18" charset="0"/>
-              <a:sym typeface="American Typewriter" charset="0"/>
-            </a:endParaRPr>
           </a:p>
         </p:txBody>
       </p:sp>
@@ -13200,15 +13111,6 @@
               </a:rPr>
               <a:t>C</a:t>
             </a:r>
-            <a:endParaRPr lang="en-US" sz="2800" i="1" dirty="0">
-              <a:solidFill>
-                <a:schemeClr val="bg1"/>
-              </a:solidFill>
-              <a:latin typeface="Times New Roman" pitchFamily="18" charset="0"/>
-              <a:ea typeface="ヒラギノ明朝 ProN W3" charset="-128"/>
-              <a:cs typeface="Times New Roman" pitchFamily="18" charset="0"/>
-              <a:sym typeface="American Typewriter" charset="0"/>
-            </a:endParaRPr>
           </a:p>
         </p:txBody>
       </p:sp>
@@ -13293,15 +13195,6 @@
               </a:rPr>
               <a:t>A</a:t>
             </a:r>
-            <a:endParaRPr lang="en-US" sz="2800" i="1" dirty="0">
-              <a:solidFill>
-                <a:schemeClr val="bg1"/>
-              </a:solidFill>
-              <a:latin typeface="Times New Roman" pitchFamily="18" charset="0"/>
-              <a:ea typeface="ヒラギノ明朝 ProN W3" charset="-128"/>
-              <a:cs typeface="Times New Roman" pitchFamily="18" charset="0"/>
-              <a:sym typeface="American Typewriter" charset="0"/>
-            </a:endParaRPr>
           </a:p>
         </p:txBody>
       </p:sp>
@@ -13315,11 +13208,11 @@
   <p:clrMapOvr>
     <a:masterClrMapping/>
   </p:clrMapOvr>
-  <p:transition xmlns:p14="http://schemas.microsoft.com/office/powerpoint/2010/main"/>
+  <p:transition/>
   <p:timing>
     <p:tnLst>
       <p:par>
-        <p:cTn xmlns:p14="http://schemas.microsoft.com/office/powerpoint/2010/main" id="1" dur="indefinite" restart="never" nodeType="tmRoot"/>
+        <p:cTn id="1" dur="indefinite" restart="never" nodeType="tmRoot"/>
       </p:par>
     </p:tnLst>
   </p:timing>

</xml_diff>